<commit_message>
inserted new TUG Logo
</commit_message>
<xml_diff>
--- a/2016/graph_recommender_presentation_20161219/Graph_Recommender_Presentation.pptx
+++ b/2016/graph_recommender_presentation_20161219/Graph_Recommender_Presentation.pptx
@@ -5,21 +5,21 @@
     <p:sldMasterId id="2147483648" r:id="rId1"/>
   </p:sldMasterIdLst>
   <p:notesMasterIdLst>
-    <p:notesMasterId r:id="rId14"/>
+    <p:notesMasterId r:id="rId4"/>
   </p:notesMasterIdLst>
   <p:sldIdLst>
-    <p:sldId id="290" r:id="rId2"/>
-    <p:sldId id="289" r:id="rId3"/>
-    <p:sldId id="304" r:id="rId4"/>
-    <p:sldId id="300" r:id="rId5"/>
-    <p:sldId id="305" r:id="rId6"/>
-    <p:sldId id="292" r:id="rId7"/>
-    <p:sldId id="306" r:id="rId8"/>
-    <p:sldId id="307" r:id="rId9"/>
-    <p:sldId id="308" r:id="rId10"/>
-    <p:sldId id="309" r:id="rId11"/>
-    <p:sldId id="310" r:id="rId12"/>
-    <p:sldId id="261" r:id="rId13"/>
+    <p:sldId id="290" r:id="rId3"/>
+    <p:sldId id="289" r:id="rId5"/>
+    <p:sldId id="304" r:id="rId6"/>
+    <p:sldId id="300" r:id="rId7"/>
+    <p:sldId id="305" r:id="rId8"/>
+    <p:sldId id="292" r:id="rId9"/>
+    <p:sldId id="306" r:id="rId10"/>
+    <p:sldId id="307" r:id="rId11"/>
+    <p:sldId id="308" r:id="rId12"/>
+    <p:sldId id="309" r:id="rId13"/>
+    <p:sldId id="310" r:id="rId14"/>
+    <p:sldId id="261" r:id="rId15"/>
   </p:sldIdLst>
   <p:sldSz cx="9144000" cy="6858000" type="screen4x3"/>
   <p:notesSz cx="6858000" cy="9144000"/>
@@ -97,14 +97,6 @@
       </a:defRPr>
     </a:lvl9pPr>
   </p:defaultTextStyle>
-  <p:extLst>
-    <p:ext uri="{EFAFB233-063F-42B5-8137-9DF3F51BA10A}">
-      <p15:sldGuideLst xmlns:p15="http://schemas.microsoft.com/office/powerpoint/2012/main"/>
-    </p:ext>
-    <p:ext uri="{2D200454-40CA-4A62-9FC3-DE9A4176ACB9}">
-      <p15:notesGuideLst xmlns:p15="http://schemas.microsoft.com/office/powerpoint/2012/main"/>
-    </p:ext>
-  </p:extLst>
 </p:presentation>
 </file>
 
@@ -154,7 +146,6 @@
           <a:lstStyle/>
           <a:p>
             <a:pPr lvl="0"/>
-            <a:endParaRPr/>
           </a:p>
         </p:txBody>
       </p:sp>
@@ -182,22 +173,16 @@
           <a:lstStyle/>
           <a:p>
             <a:pPr lvl="0"/>
-            <a:endParaRPr/>
           </a:p>
         </p:txBody>
       </p:sp>
     </p:spTree>
-    <p:extLst>
-      <p:ext uri="{BB962C8B-B14F-4D97-AF65-F5344CB8AC3E}">
-        <p14:creationId xmlns:p14="http://schemas.microsoft.com/office/powerpoint/2010/main" val="2379741301"/>
-      </p:ext>
-    </p:extLst>
   </p:cSld>
   <p:clrMap bg1="lt1" tx1="dk1" bg2="lt2" tx2="dk2" accent1="accent1" accent2="accent2" accent3="accent3" accent4="accent4" accent5="accent5" accent6="accent6" hlink="hlink" folHlink="folHlink"/>
   <p:notesStyle>
     <a:lvl1pPr defTabSz="457200">
       <a:lnSpc>
-        <a:spcPct val="117999"/>
+        <a:spcPct val="118000"/>
       </a:lnSpc>
       <a:defRPr sz="2200">
         <a:latin typeface="+mn-lt"/>
@@ -208,7 +193,7 @@
     </a:lvl1pPr>
     <a:lvl2pPr indent="228600" defTabSz="457200">
       <a:lnSpc>
-        <a:spcPct val="117999"/>
+        <a:spcPct val="118000"/>
       </a:lnSpc>
       <a:defRPr sz="2200">
         <a:latin typeface="+mn-lt"/>
@@ -219,7 +204,7 @@
     </a:lvl2pPr>
     <a:lvl3pPr indent="457200" defTabSz="457200">
       <a:lnSpc>
-        <a:spcPct val="117999"/>
+        <a:spcPct val="118000"/>
       </a:lnSpc>
       <a:defRPr sz="2200">
         <a:latin typeface="+mn-lt"/>
@@ -230,7 +215,7 @@
     </a:lvl3pPr>
     <a:lvl4pPr indent="685800" defTabSz="457200">
       <a:lnSpc>
-        <a:spcPct val="117999"/>
+        <a:spcPct val="118000"/>
       </a:lnSpc>
       <a:defRPr sz="2200">
         <a:latin typeface="+mn-lt"/>
@@ -241,7 +226,7 @@
     </a:lvl4pPr>
     <a:lvl5pPr indent="914400" defTabSz="457200">
       <a:lnSpc>
-        <a:spcPct val="117999"/>
+        <a:spcPct val="118000"/>
       </a:lnSpc>
       <a:defRPr sz="2200">
         <a:latin typeface="+mn-lt"/>
@@ -252,7 +237,7 @@
     </a:lvl5pPr>
     <a:lvl6pPr indent="1143000" defTabSz="457200">
       <a:lnSpc>
-        <a:spcPct val="117999"/>
+        <a:spcPct val="118000"/>
       </a:lnSpc>
       <a:defRPr sz="2200">
         <a:latin typeface="+mn-lt"/>
@@ -263,7 +248,7 @@
     </a:lvl6pPr>
     <a:lvl7pPr indent="1371600" defTabSz="457200">
       <a:lnSpc>
-        <a:spcPct val="117999"/>
+        <a:spcPct val="118000"/>
       </a:lnSpc>
       <a:defRPr sz="2200">
         <a:latin typeface="+mn-lt"/>
@@ -274,7 +259,7 @@
     </a:lvl7pPr>
     <a:lvl8pPr indent="1600200" defTabSz="457200">
       <a:lnSpc>
-        <a:spcPct val="117999"/>
+        <a:spcPct val="118000"/>
       </a:lnSpc>
       <a:defRPr sz="2200">
         <a:latin typeface="+mn-lt"/>
@@ -285,7 +270,7 @@
     </a:lvl8pPr>
     <a:lvl9pPr indent="1828800" defTabSz="457200">
       <a:lnSpc>
-        <a:spcPct val="117999"/>
+        <a:spcPct val="118000"/>
       </a:lnSpc>
       <a:defRPr sz="2200">
         <a:latin typeface="+mn-lt"/>
@@ -335,7 +320,6 @@
           <a:lstStyle/>
           <a:p>
             <a:pPr lvl="0"/>
-            <a:endParaRPr/>
           </a:p>
         </p:txBody>
       </p:sp>
@@ -388,11 +372,6 @@
         </p:txBody>
       </p:sp>
     </p:spTree>
-    <p:extLst>
-      <p:ext uri="{BB962C8B-B14F-4D97-AF65-F5344CB8AC3E}">
-        <p14:creationId xmlns:p14="http://schemas.microsoft.com/office/powerpoint/2010/main" val="2541938299"/>
-      </p:ext>
-    </p:extLst>
   </p:cSld>
   <p:clrMapOvr>
     <a:masterClrMapping/>
@@ -449,11 +428,6 @@
         </p:txBody>
       </p:sp>
     </p:spTree>
-    <p:extLst>
-      <p:ext uri="{BB962C8B-B14F-4D97-AF65-F5344CB8AC3E}">
-        <p14:creationId xmlns:p14="http://schemas.microsoft.com/office/powerpoint/2010/main" val="856997550"/>
-      </p:ext>
-    </p:extLst>
   </p:cSld>
   <p:clrMapOvr>
     <a:masterClrMapping/>
@@ -513,11 +487,6 @@
         </p:txBody>
       </p:sp>
     </p:spTree>
-    <p:extLst>
-      <p:ext uri="{BB962C8B-B14F-4D97-AF65-F5344CB8AC3E}">
-        <p14:creationId xmlns:p14="http://schemas.microsoft.com/office/powerpoint/2010/main" val="3361957242"/>
-      </p:ext>
-    </p:extLst>
   </p:cSld>
   <p:clrMapOvr>
     <a:masterClrMapping/>
@@ -577,11 +546,6 @@
         </p:txBody>
       </p:sp>
     </p:spTree>
-    <p:extLst>
-      <p:ext uri="{BB962C8B-B14F-4D97-AF65-F5344CB8AC3E}">
-        <p14:creationId xmlns:p14="http://schemas.microsoft.com/office/powerpoint/2010/main" val="989408836"/>
-      </p:ext>
-    </p:extLst>
   </p:cSld>
   <p:clrMapOvr>
     <a:masterClrMapping/>
@@ -642,11 +606,6 @@
         </p:txBody>
       </p:sp>
     </p:spTree>
-    <p:extLst>
-      <p:ext uri="{BB962C8B-B14F-4D97-AF65-F5344CB8AC3E}">
-        <p14:creationId xmlns:p14="http://schemas.microsoft.com/office/powerpoint/2010/main" val="3988063499"/>
-      </p:ext>
-    </p:extLst>
   </p:cSld>
   <p:clrMapOvr>
     <a:masterClrMapping/>
@@ -691,7 +650,6 @@
           <a:lstStyle/>
           <a:p>
             <a:pPr lvl="0"/>
-            <a:endParaRPr/>
           </a:p>
         </p:txBody>
       </p:sp>
@@ -718,10 +676,10 @@
                 <a:spcPct val="100000"/>
               </a:lnSpc>
               <a:defRPr sz="1800">
-                <a:latin typeface="Arial"/>
-                <a:ea typeface="Arial"/>
-                <a:cs typeface="Arial"/>
-                <a:sym typeface="Arial"/>
+                <a:latin typeface="Arial" charset="0"/>
+                <a:ea typeface="Arial" charset="0"/>
+                <a:cs typeface="Arial" charset="0"/>
+                <a:sym typeface="Arial" charset="0"/>
               </a:defRPr>
             </a:lvl1pPr>
           </a:lstStyle>
@@ -735,11 +693,6 @@
         </p:txBody>
       </p:sp>
     </p:spTree>
-    <p:extLst>
-      <p:ext uri="{BB962C8B-B14F-4D97-AF65-F5344CB8AC3E}">
-        <p14:creationId xmlns:p14="http://schemas.microsoft.com/office/powerpoint/2010/main" val="452979616"/>
-      </p:ext>
-    </p:extLst>
   </p:cSld>
   <p:clrMapOvr>
     <a:masterClrMapping/>
@@ -828,7 +781,7 @@
             <a:spLocks noGrp="1"/>
           </p:cNvSpPr>
           <p:nvPr>
-            <p:ph type="title"/>
+            <p:ph type="title" hasCustomPrompt="1"/>
           </p:nvPr>
         </p:nvSpPr>
         <p:spPr>
@@ -879,7 +832,7 @@
             <a:spLocks noGrp="1"/>
           </p:cNvSpPr>
           <p:nvPr>
-            <p:ph type="body" idx="1"/>
+            <p:ph type="body" idx="1" hasCustomPrompt="1"/>
           </p:nvPr>
         </p:nvSpPr>
         <p:spPr>
@@ -948,6 +901,11 @@
               </a:rPr>
               <a:t>Textmasterformat bearbeiten</a:t>
             </a:r>
+            <a:endParaRPr sz="3200">
+              <a:solidFill>
+                <a:srgbClr val="17375E"/>
+              </a:solidFill>
+            </a:endParaRPr>
           </a:p>
           <a:p>
             <a:pPr lvl="1">
@@ -965,6 +923,11 @@
               </a:rPr>
               <a:t>Zweite Ebene</a:t>
             </a:r>
+            <a:endParaRPr sz="3200">
+              <a:solidFill>
+                <a:srgbClr val="17375E"/>
+              </a:solidFill>
+            </a:endParaRPr>
           </a:p>
           <a:p>
             <a:pPr lvl="2">
@@ -982,6 +945,11 @@
               </a:rPr>
               <a:t>Dritte Ebene</a:t>
             </a:r>
+            <a:endParaRPr sz="3200">
+              <a:solidFill>
+                <a:srgbClr val="17375E"/>
+              </a:solidFill>
+            </a:endParaRPr>
           </a:p>
           <a:p>
             <a:pPr lvl="3">
@@ -999,6 +967,11 @@
               </a:rPr>
               <a:t>Vierte Ebene</a:t>
             </a:r>
+            <a:endParaRPr sz="3200">
+              <a:solidFill>
+                <a:srgbClr val="17375E"/>
+              </a:solidFill>
+            </a:endParaRPr>
           </a:p>
           <a:p>
             <a:pPr lvl="4">
@@ -1057,7 +1030,7 @@
         <p:nvSpPr>
           <p:cNvPr id="3" name="Shape 3"/>
           <p:cNvSpPr/>
-          <p:nvPr/>
+          <p:nvPr userDrawn="1"/>
         </p:nvSpPr>
         <p:spPr>
           <a:xfrm>
@@ -1068,7 +1041,9 @@
             <a:avLst/>
           </a:prstGeom>
           <a:ln>
-            <a:solidFill/>
+            <a:solidFill>
+              <a:srgbClr val="FFFFFF"/>
+            </a:solidFill>
             <a:round/>
           </a:ln>
         </p:spPr>
@@ -1079,7 +1054,6 @@
             <a:pPr lvl="0" defTabSz="457200">
               <a:defRPr sz="1200"/>
             </a:pPr>
-            <a:endParaRPr/>
           </a:p>
         </p:txBody>
       </p:sp>
@@ -1104,11 +1078,6 @@
           <a:ln w="12700">
             <a:miter lim="400000"/>
           </a:ln>
-          <a:extLst>
-            <a:ext uri="{C572A759-6A51-4108-AA02-DFA0A04FC94B}">
-              <ma14:wrappingTextBoxFlag xmlns="" xmlns:ma14="http://schemas.microsoft.com/office/mac/drawingml/2011/main" val="1"/>
-            </a:ext>
-          </a:extLst>
         </p:spPr>
         <p:txBody>
           <a:bodyPr lIns="45718" tIns="45718" rIns="45718" bIns="45718">
@@ -1328,11 +1297,6 @@
           <a:ln w="12700">
             <a:miter lim="400000"/>
           </a:ln>
-          <a:extLst>
-            <a:ext uri="{C572A759-6A51-4108-AA02-DFA0A04FC94B}">
-              <ma14:wrappingTextBoxFlag xmlns="" xmlns:ma14="http://schemas.microsoft.com/office/mac/drawingml/2011/main" val="1"/>
-            </a:ext>
-          </a:extLst>
         </p:spPr>
         <p:txBody>
           <a:bodyPr lIns="45718" tIns="45718" rIns="45718" bIns="45718" anchor="ctr"/>
@@ -1462,7 +1426,6 @@
               <a:buSzTx/>
               <a:buFontTx/>
               <a:buNone/>
-              <a:tabLst/>
             </a:pPr>
             <a:r>
               <a:rPr kumimoji="0" lang="en-US" sz="1200" b="1" i="0" u="none" strike="noStrike" cap="none" spc="0" normalizeH="0" baseline="0" dirty="0">
@@ -1539,7 +1502,6 @@
               <a:buSzTx/>
               <a:buFontTx/>
               <a:buNone/>
-              <a:tabLst/>
             </a:pPr>
             <a:r>
               <a:rPr kumimoji="0" lang="en-US" sz="1200" b="1" i="0" u="none" strike="noStrike" cap="none" spc="0" normalizeH="0" baseline="0" dirty="0" smtClean="0">
@@ -1588,7 +1550,7 @@
           <p:nvPr userDrawn="1"/>
         </p:nvPicPr>
         <p:blipFill>
-          <a:blip r:embed="rId4" cstate="print">
+          <a:blip r:embed="rId3" cstate="print">
             <a:extLst>
               <a:ext uri="{28A0092B-C50C-407E-A947-70E740481C1C}">
                 <a14:useLocalDpi xmlns:a14="http://schemas.microsoft.com/office/drawing/2010/main" val="0"/>
@@ -1601,7 +1563,7 @@
         </p:blipFill>
         <p:spPr>
           <a:xfrm>
-            <a:off x="6458321" y="-82905"/>
+            <a:off x="6768201" y="-115925"/>
             <a:ext cx="1311354" cy="601680"/>
           </a:xfrm>
           <a:prstGeom prst="rect">
@@ -1611,28 +1573,22 @@
       </p:pic>
       <p:pic>
         <p:nvPicPr>
-          <p:cNvPr id="4" name="Picture 3"/>
+          <p:cNvPr id="2" name="Grafik 3"/>
           <p:cNvPicPr>
             <a:picLocks noChangeAspect="1"/>
           </p:cNvPicPr>
           <p:nvPr userDrawn="1"/>
         </p:nvPicPr>
         <p:blipFill>
-          <a:blip r:embed="rId5" cstate="print">
-            <a:extLst>
-              <a:ext uri="{28A0092B-C50C-407E-A947-70E740481C1C}">
-                <a14:useLocalDpi xmlns:a14="http://schemas.microsoft.com/office/drawing/2010/main" val="0"/>
-              </a:ext>
-            </a:extLst>
-          </a:blip>
+          <a:blip r:embed="rId4"/>
           <a:stretch>
             <a:fillRect/>
           </a:stretch>
         </p:blipFill>
         <p:spPr>
           <a:xfrm>
-            <a:off x="7882948" y="-23449"/>
-            <a:ext cx="973915" cy="486958"/>
+            <a:off x="8237361" y="1140"/>
+            <a:ext cx="412510" cy="357701"/>
           </a:xfrm>
           <a:prstGeom prst="rect">
             <a:avLst/>
@@ -1643,8 +1599,8 @@
   </p:cSld>
   <p:clrMap bg1="lt1" tx1="dk1" bg2="lt2" tx2="dk2" accent1="accent1" accent2="accent2" accent3="accent3" accent4="accent4" accent5="accent5" accent6="accent6" hlink="hlink" folHlink="folHlink"/>
   <p:sldLayoutIdLst>
-    <p:sldLayoutId id="2147483651" r:id="rId1"/>
-    <p:sldLayoutId id="2147483654" r:id="rId2"/>
+    <p:sldLayoutId id="2147483649" r:id="rId1"/>
+    <p:sldLayoutId id="2147483650" r:id="rId2"/>
   </p:sldLayoutIdLst>
   <p:transition spd="med"/>
   <p:hf hdr="0" ftr="0" dt="0"/>
@@ -1756,7 +1712,7 @@
           <a:spcPts val="700"/>
         </a:spcBef>
         <a:buSzPct val="100000"/>
-        <a:buFont typeface="Wingdings"/>
+        <a:buFont typeface="Wingdings" charset="2"/>
         <a:buChar char="▪"/>
         <a:defRPr sz="3200">
           <a:solidFill>
@@ -1768,12 +1724,12 @@
           <a:sym typeface="Calibri"/>
         </a:defRPr>
       </a:lvl1pPr>
-      <a:lvl2pPr marL="783771" indent="-326571">
+      <a:lvl2pPr marL="783590" indent="-326390">
         <a:spcBef>
           <a:spcPts val="700"/>
         </a:spcBef>
         <a:buSzPct val="100000"/>
-        <a:buFont typeface="Wingdings"/>
+        <a:buFont typeface="Wingdings" charset="2"/>
         <a:buChar char="▪"/>
         <a:defRPr sz="3200">
           <a:solidFill>
@@ -1790,7 +1746,7 @@
           <a:spcPts val="700"/>
         </a:spcBef>
         <a:buSzPct val="100000"/>
-        <a:buFont typeface="Wingdings"/>
+        <a:buFont typeface="Wingdings" charset="2"/>
         <a:buChar char="▪"/>
         <a:defRPr sz="3200">
           <a:solidFill>
@@ -1807,7 +1763,7 @@
           <a:spcPts val="700"/>
         </a:spcBef>
         <a:buSzPct val="100000"/>
-        <a:buFont typeface="Wingdings"/>
+        <a:buFont typeface="Wingdings" charset="2"/>
         <a:buChar char="▪"/>
         <a:defRPr sz="3200">
           <a:solidFill>
@@ -1824,7 +1780,7 @@
           <a:spcPts val="700"/>
         </a:spcBef>
         <a:buSzPct val="100000"/>
-        <a:buFont typeface="Wingdings"/>
+        <a:buFont typeface="Wingdings" charset="2"/>
         <a:buChar char="▪"/>
         <a:defRPr sz="3200">
           <a:solidFill>
@@ -1841,7 +1797,7 @@
           <a:spcPts val="700"/>
         </a:spcBef>
         <a:buSzPct val="100000"/>
-        <a:buFont typeface="Wingdings"/>
+        <a:buFont typeface="Wingdings" charset="2"/>
         <a:buChar char="•"/>
         <a:defRPr sz="3200">
           <a:solidFill>
@@ -1858,7 +1814,7 @@
           <a:spcPts val="700"/>
         </a:spcBef>
         <a:buSzPct val="100000"/>
-        <a:buFont typeface="Wingdings"/>
+        <a:buFont typeface="Wingdings" charset="2"/>
         <a:buChar char="•"/>
         <a:defRPr sz="3200">
           <a:solidFill>
@@ -1870,12 +1826,12 @@
           <a:sym typeface="Calibri"/>
         </a:defRPr>
       </a:lvl7pPr>
-      <a:lvl8pPr marL="3566159" indent="-365759">
+      <a:lvl8pPr marL="3566160" indent="-365760">
         <a:spcBef>
           <a:spcPts val="700"/>
         </a:spcBef>
         <a:buSzPct val="100000"/>
-        <a:buFont typeface="Wingdings"/>
+        <a:buFont typeface="Wingdings" charset="2"/>
         <a:buChar char="•"/>
         <a:defRPr sz="3200">
           <a:solidFill>
@@ -1887,12 +1843,12 @@
           <a:sym typeface="Calibri"/>
         </a:defRPr>
       </a:lvl8pPr>
-      <a:lvl9pPr marL="4023359" indent="-365759">
+      <a:lvl9pPr marL="4023360" indent="-365760">
         <a:spcBef>
           <a:spcPts val="700"/>
         </a:spcBef>
         <a:buSzPct val="100000"/>
-        <a:buFont typeface="Wingdings"/>
+        <a:buFont typeface="Wingdings" charset="2"/>
         <a:buChar char="•"/>
         <a:defRPr sz="3200">
           <a:solidFill>
@@ -2083,6 +2039,14 @@
               </a:rPr>
               <a:t>, 2016-12-19</a:t>
             </a:r>
+            <a:endParaRPr lang="en-US" sz="2400" b="1" dirty="0">
+              <a:solidFill>
+                <a:srgbClr val="1F497D"/>
+              </a:solidFill>
+              <a:latin typeface="Calibri"/>
+              <a:ea typeface="Calibri"/>
+              <a:cs typeface="Calibri"/>
+            </a:endParaRPr>
           </a:p>
           <a:p>
             <a:pPr algn="ctr"/>
@@ -2166,6 +2130,15 @@
               </a:rPr>
               <a:t>Bernd Malle, PhD Student</a:t>
             </a:r>
+            <a:endParaRPr lang="en-US" sz="2400" b="1" dirty="0">
+              <a:solidFill>
+                <a:srgbClr val="1F497D"/>
+              </a:solidFill>
+              <a:latin typeface="Calibri"/>
+              <a:ea typeface="Calibri"/>
+              <a:cs typeface="Calibri"/>
+              <a:sym typeface="Calibri"/>
+            </a:endParaRPr>
           </a:p>
           <a:p>
             <a:pPr lvl="0" algn="ctr"/>
@@ -2229,6 +2202,15 @@
               </a:rPr>
               <a:t>Student</a:t>
             </a:r>
+            <a:endParaRPr lang="en-US" sz="2400" b="1" dirty="0">
+              <a:solidFill>
+                <a:srgbClr val="1F497D"/>
+              </a:solidFill>
+              <a:latin typeface="Calibri"/>
+              <a:ea typeface="Calibri"/>
+              <a:cs typeface="Calibri"/>
+              <a:sym typeface="Calibri"/>
+            </a:endParaRPr>
           </a:p>
           <a:p>
             <a:pPr lvl="0" algn="ctr"/>
@@ -2293,7 +2275,7 @@
                 <a:latin typeface="+mn-lt"/>
                 <a:ea typeface="+mn-ea"/>
                 <a:cs typeface="+mn-cs"/>
-                <a:hlinkClick r:id="rId3"/>
+                <a:hlinkClick r:id="rId1"/>
               </a:rPr>
               <a:t>b.malle@hci-kdd.org</a:t>
             </a:r>
@@ -2312,7 +2294,7 @@
             <a:pPr algn="ctr"/>
             <a:r>
               <a:rPr lang="en-US" sz="2400" b="1" u="sng" dirty="0">
-                <a:hlinkClick r:id="rId4"/>
+                <a:hlinkClick r:id="rId2"/>
               </a:rPr>
               <a:t>b.gansinger@hci-kdd.org</a:t>
             </a:r>
@@ -2338,7 +2320,7 @@
           <p:nvPr/>
         </p:nvPicPr>
         <p:blipFill>
-          <a:blip r:embed="rId5">
+          <a:blip r:embed="rId3">
             <a:extLst>
               <a:ext uri="{28A0092B-C50C-407E-A947-70E740481C1C}">
                 <a14:useLocalDpi xmlns:a14="http://schemas.microsoft.com/office/drawing/2010/main" val="0"/>
@@ -2351,7 +2333,7 @@
         </p:blipFill>
         <p:spPr>
           <a:xfrm>
-            <a:off x="734392" y="4001070"/>
+            <a:off x="1201117" y="4023930"/>
             <a:ext cx="3238500" cy="1485900"/>
           </a:xfrm>
           <a:prstGeom prst="rect">
@@ -2361,28 +2343,22 @@
       </p:pic>
       <p:pic>
         <p:nvPicPr>
-          <p:cNvPr id="4" name="Picture 3"/>
+          <p:cNvPr id="2" name="Grafik 3"/>
           <p:cNvPicPr>
             <a:picLocks noChangeAspect="1"/>
           </p:cNvPicPr>
-          <p:nvPr/>
+          <p:nvPr userDrawn="1"/>
         </p:nvPicPr>
         <p:blipFill>
-          <a:blip r:embed="rId6" cstate="print">
-            <a:extLst>
-              <a:ext uri="{28A0092B-C50C-407E-A947-70E740481C1C}">
-                <a14:useLocalDpi xmlns:a14="http://schemas.microsoft.com/office/drawing/2010/main" val="0"/>
-              </a:ext>
-            </a:extLst>
-          </a:blip>
+          <a:blip r:embed="rId4"/>
           <a:stretch>
             <a:fillRect/>
           </a:stretch>
         </p:blipFill>
         <p:spPr>
           <a:xfrm>
-            <a:off x="5405055" y="4167324"/>
-            <a:ext cx="2306782" cy="1153391"/>
+            <a:off x="6113780" y="4314825"/>
+            <a:ext cx="949960" cy="822960"/>
           </a:xfrm>
           <a:prstGeom prst="rect">
             <a:avLst/>
@@ -2390,11 +2366,6 @@
         </p:spPr>
       </p:pic>
     </p:spTree>
-    <p:extLst>
-      <p:ext uri="{BB962C8B-B14F-4D97-AF65-F5344CB8AC3E}">
-        <p14:creationId xmlns:p14="http://schemas.microsoft.com/office/powerpoint/2010/main" val="1345696782"/>
-      </p:ext>
-    </p:extLst>
   </p:cSld>
   <p:clrMapOvr>
     <a:masterClrMapping/>
@@ -2430,9 +2401,7 @@
       <p:sp>
         <p:nvSpPr>
           <p:cNvPr id="4" name="Title 1"/>
-          <p:cNvSpPr txBox="1">
-            <a:spLocks/>
-          </p:cNvSpPr>
+          <p:cNvSpPr txBox="1"/>
           <p:nvPr/>
         </p:nvSpPr>
         <p:spPr>
@@ -2446,11 +2415,6 @@
           <a:ln w="12700">
             <a:miter lim="400000"/>
           </a:ln>
-          <a:extLst>
-            <a:ext uri="{C572A759-6A51-4108-AA02-DFA0A04FC94B}">
-              <ma14:wrappingTextBoxFlag xmlns="" xmlns:ma14="http://schemas.microsoft.com/office/mac/drawingml/2011/main" val="1"/>
-            </a:ext>
-          </a:extLst>
         </p:spPr>
         <p:txBody>
           <a:bodyPr lIns="45718" tIns="45718" rIns="45718" bIns="45718" anchor="ctr">
@@ -2558,7 +2522,7 @@
             </a:lvl9pPr>
           </a:lstStyle>
           <a:p>
-            <a:pPr defTabSz="676655">
+            <a:pPr defTabSz="676275">
               <a:spcBef>
                 <a:spcPts val="0"/>
               </a:spcBef>
@@ -2588,11 +2552,6 @@
         </p:txBody>
       </p:sp>
     </p:spTree>
-    <p:extLst>
-      <p:ext uri="{BB962C8B-B14F-4D97-AF65-F5344CB8AC3E}">
-        <p14:creationId xmlns:p14="http://schemas.microsoft.com/office/powerpoint/2010/main" val="1401593997"/>
-      </p:ext>
-    </p:extLst>
   </p:cSld>
   <p:clrMapOvr>
     <a:masterClrMapping/>
@@ -2621,9 +2580,7 @@
       <p:sp>
         <p:nvSpPr>
           <p:cNvPr id="4" name="Title 1"/>
-          <p:cNvSpPr txBox="1">
-            <a:spLocks/>
-          </p:cNvSpPr>
+          <p:cNvSpPr txBox="1"/>
           <p:nvPr/>
         </p:nvSpPr>
         <p:spPr>
@@ -2637,11 +2594,6 @@
           <a:ln w="12700">
             <a:miter lim="400000"/>
           </a:ln>
-          <a:extLst>
-            <a:ext uri="{C572A759-6A51-4108-AA02-DFA0A04FC94B}">
-              <ma14:wrappingTextBoxFlag xmlns="" xmlns:ma14="http://schemas.microsoft.com/office/mac/drawingml/2011/main" val="1"/>
-            </a:ext>
-          </a:extLst>
         </p:spPr>
         <p:txBody>
           <a:bodyPr lIns="45718" tIns="45718" rIns="45718" bIns="45718" anchor="ctr">
@@ -2813,6 +2765,7 @@
               <a:rPr lang="en-US" sz="2800" dirty="0" smtClean="0"/>
               <a:t>Scaling of graph algorithm to real-sized DBs?</a:t>
             </a:r>
+            <a:endParaRPr lang="en-US" sz="2800" dirty="0" smtClean="0"/>
           </a:p>
           <a:p>
             <a:pPr marL="514350" indent="-514350" algn="l">
@@ -2829,6 +2782,7 @@
               <a:rPr lang="en-US" sz="2800" dirty="0" smtClean="0"/>
               <a:t>Implementation of local sphere idea?</a:t>
             </a:r>
+            <a:endParaRPr lang="en-US" sz="2800" dirty="0" smtClean="0"/>
           </a:p>
           <a:p>
             <a:pPr marL="514350" indent="-514350" algn="l">
@@ -2845,54 +2799,58 @@
               <a:rPr lang="en-US" sz="2800" dirty="0" smtClean="0"/>
               <a:t>Perturbation of graphs:</a:t>
             </a:r>
-          </a:p>
-          <a:p>
-            <a:pPr marL="955221" lvl="1" indent="-514350" algn="l">
+            <a:endParaRPr lang="en-US" sz="2800" dirty="0" smtClean="0"/>
+          </a:p>
+          <a:p>
+            <a:pPr marL="955040" lvl="1" indent="-514350" algn="l">
               <a:spcBef>
                 <a:spcPts val="0"/>
               </a:spcBef>
               <a:spcAft>
                 <a:spcPts val="1200"/>
               </a:spcAft>
-              <a:buFont typeface="Arial" panose="020B0604020202020204" pitchFamily="34" charset="0"/>
+              <a:buFont typeface="Arial" charset="0"/>
               <a:buChar char="•"/>
             </a:pPr>
             <a:r>
               <a:rPr lang="en-US" sz="2400" dirty="0" smtClean="0"/>
               <a:t>adding / removing nodes / edges</a:t>
             </a:r>
-          </a:p>
-          <a:p>
-            <a:pPr marL="955221" lvl="1" indent="-514350" algn="l">
+            <a:endParaRPr lang="en-US" sz="2400" dirty="0" smtClean="0"/>
+          </a:p>
+          <a:p>
+            <a:pPr marL="955040" lvl="1" indent="-514350" algn="l">
               <a:spcBef>
                 <a:spcPts val="0"/>
               </a:spcBef>
               <a:spcAft>
                 <a:spcPts val="1200"/>
               </a:spcAft>
-              <a:buFont typeface="Arial" panose="020B0604020202020204" pitchFamily="34" charset="0"/>
+              <a:buFont typeface="Arial" charset="0"/>
               <a:buChar char="•"/>
             </a:pPr>
             <a:r>
               <a:rPr lang="en-US" sz="2400" dirty="0" smtClean="0"/>
               <a:t>Perturbing node feature vectors</a:t>
             </a:r>
-          </a:p>
-          <a:p>
-            <a:pPr marL="955221" lvl="1" indent="-514350" algn="l">
+            <a:endParaRPr lang="en-US" sz="2400" dirty="0" smtClean="0"/>
+          </a:p>
+          <a:p>
+            <a:pPr marL="955040" lvl="1" indent="-514350" algn="l">
               <a:spcBef>
                 <a:spcPts val="0"/>
               </a:spcBef>
               <a:spcAft>
                 <a:spcPts val="1200"/>
               </a:spcAft>
-              <a:buFont typeface="Arial" panose="020B0604020202020204" pitchFamily="34" charset="0"/>
+              <a:buFont typeface="Arial" charset="0"/>
               <a:buChar char="•"/>
             </a:pPr>
             <a:r>
               <a:rPr lang="en-US" sz="2400" dirty="0" smtClean="0"/>
               <a:t>Targeting specific graph metrics:</a:t>
             </a:r>
+            <a:endParaRPr lang="en-US" sz="2400" dirty="0" smtClean="0"/>
           </a:p>
           <a:p>
             <a:pPr marL="1390650" lvl="2" indent="-514350" algn="l">
@@ -2902,13 +2860,14 @@
               <a:spcAft>
                 <a:spcPts val="1200"/>
               </a:spcAft>
-              <a:buFont typeface="Wingdings" panose="05000000000000000000" pitchFamily="2" charset="2"/>
+              <a:buFont typeface="Wingdings" charset="2"/>
               <a:buChar char="Ø"/>
             </a:pPr>
             <a:r>
               <a:rPr lang="en-US" sz="2400" dirty="0" smtClean="0"/>
               <a:t>Centralities</a:t>
             </a:r>
+            <a:endParaRPr lang="en-US" sz="2400" dirty="0" smtClean="0"/>
           </a:p>
           <a:p>
             <a:pPr marL="1390650" lvl="2" indent="-514350" algn="l">
@@ -2918,13 +2877,14 @@
               <a:spcAft>
                 <a:spcPts val="1200"/>
               </a:spcAft>
-              <a:buFont typeface="Wingdings" panose="05000000000000000000" pitchFamily="2" charset="2"/>
+              <a:buFont typeface="Wingdings" charset="2"/>
               <a:buChar char="Ø"/>
             </a:pPr>
             <a:r>
               <a:rPr lang="en-US" sz="2400" dirty="0" smtClean="0"/>
               <a:t>Components</a:t>
             </a:r>
+            <a:endParaRPr lang="en-US" sz="2400" dirty="0" smtClean="0"/>
           </a:p>
           <a:p>
             <a:pPr marL="1390650" lvl="2" indent="-514350" algn="l">
@@ -2934,7 +2894,7 @@
               <a:spcAft>
                 <a:spcPts val="1200"/>
               </a:spcAft>
-              <a:buFont typeface="Wingdings" panose="05000000000000000000" pitchFamily="2" charset="2"/>
+              <a:buFont typeface="Wingdings" charset="2"/>
               <a:buChar char="Ø"/>
             </a:pPr>
             <a:r>
@@ -2959,7 +2919,7 @@
           </a:p>
           <a:p>
             <a:pPr>
-              <a:buFont typeface="Arial" panose="020B0604020202020204" pitchFamily="34" charset="0"/>
+              <a:buFont typeface="Arial" charset="0"/>
               <a:buChar char="•"/>
             </a:pPr>
             <a:endParaRPr lang="en-US" sz="2800" dirty="0"/>
@@ -2967,11 +2927,6 @@
         </p:txBody>
       </p:sp>
     </p:spTree>
-    <p:extLst>
-      <p:ext uri="{BB962C8B-B14F-4D97-AF65-F5344CB8AC3E}">
-        <p14:creationId xmlns:p14="http://schemas.microsoft.com/office/powerpoint/2010/main" val="2631022994"/>
-      </p:ext>
-    </p:extLst>
   </p:cSld>
   <p:clrMapOvr>
     <a:masterClrMapping/>
@@ -3004,9 +2959,7 @@
           <p:nvPr/>
         </p:nvPicPr>
         <p:blipFill>
-          <a:blip r:embed="rId3">
-            <a:extLst/>
-          </a:blip>
+          <a:blip r:embed="rId1"/>
           <a:stretch>
             <a:fillRect/>
           </a:stretch>
@@ -3021,6 +2974,8 @@
           </a:prstGeom>
           <a:ln w="12700">
             <a:miter lim="400000"/>
+            <a:headEnd/>
+            <a:tailEnd/>
           </a:ln>
         </p:spPr>
       </p:pic>
@@ -3111,9 +3066,7 @@
       <p:sp>
         <p:nvSpPr>
           <p:cNvPr id="2" name="Title 1"/>
-          <p:cNvSpPr txBox="1">
-            <a:spLocks/>
-          </p:cNvSpPr>
+          <p:cNvSpPr txBox="1"/>
           <p:nvPr/>
         </p:nvSpPr>
         <p:spPr>
@@ -3240,9 +3193,7 @@
       <p:sp>
         <p:nvSpPr>
           <p:cNvPr id="3" name="Shape 34"/>
-          <p:cNvSpPr txBox="1">
-            <a:spLocks/>
-          </p:cNvSpPr>
+          <p:cNvSpPr txBox="1"/>
           <p:nvPr/>
         </p:nvSpPr>
         <p:spPr>
@@ -3264,7 +3215,7 @@
                 <a:spcPts val="700"/>
               </a:spcBef>
               <a:buSzPct val="100000"/>
-              <a:buFont typeface="Wingdings"/>
+              <a:buFont typeface="Wingdings" charset="2"/>
               <a:buChar char="▪"/>
               <a:defRPr sz="3200">
                 <a:solidFill>
@@ -3276,12 +3227,12 @@
                 <a:sym typeface="Calibri"/>
               </a:defRPr>
             </a:lvl1pPr>
-            <a:lvl2pPr marL="783771" indent="-326571">
+            <a:lvl2pPr marL="783590" indent="-326390">
               <a:spcBef>
                 <a:spcPts val="700"/>
               </a:spcBef>
               <a:buSzPct val="100000"/>
-              <a:buFont typeface="Wingdings"/>
+              <a:buFont typeface="Wingdings" charset="2"/>
               <a:buChar char="▪"/>
               <a:defRPr sz="3200">
                 <a:solidFill>
@@ -3298,7 +3249,7 @@
                 <a:spcPts val="700"/>
               </a:spcBef>
               <a:buSzPct val="100000"/>
-              <a:buFont typeface="Wingdings"/>
+              <a:buFont typeface="Wingdings" charset="2"/>
               <a:buChar char="▪"/>
               <a:defRPr sz="3200">
                 <a:solidFill>
@@ -3315,7 +3266,7 @@
                 <a:spcPts val="700"/>
               </a:spcBef>
               <a:buSzPct val="100000"/>
-              <a:buFont typeface="Wingdings"/>
+              <a:buFont typeface="Wingdings" charset="2"/>
               <a:buChar char="▪"/>
               <a:defRPr sz="3200">
                 <a:solidFill>
@@ -3332,7 +3283,7 @@
                 <a:spcPts val="700"/>
               </a:spcBef>
               <a:buSzPct val="100000"/>
-              <a:buFont typeface="Wingdings"/>
+              <a:buFont typeface="Wingdings" charset="2"/>
               <a:buChar char="▪"/>
               <a:defRPr sz="3200">
                 <a:solidFill>
@@ -3349,7 +3300,7 @@
                 <a:spcPts val="700"/>
               </a:spcBef>
               <a:buSzPct val="100000"/>
-              <a:buFont typeface="Wingdings"/>
+              <a:buFont typeface="Wingdings" charset="2"/>
               <a:buChar char="•"/>
               <a:defRPr sz="3200">
                 <a:solidFill>
@@ -3366,7 +3317,7 @@
                 <a:spcPts val="700"/>
               </a:spcBef>
               <a:buSzPct val="100000"/>
-              <a:buFont typeface="Wingdings"/>
+              <a:buFont typeface="Wingdings" charset="2"/>
               <a:buChar char="•"/>
               <a:defRPr sz="3200">
                 <a:solidFill>
@@ -3378,12 +3329,12 @@
                 <a:sym typeface="Calibri"/>
               </a:defRPr>
             </a:lvl7pPr>
-            <a:lvl8pPr marL="3566159" indent="-365759">
+            <a:lvl8pPr marL="3566160" indent="-365760">
               <a:spcBef>
                 <a:spcPts val="700"/>
               </a:spcBef>
               <a:buSzPct val="100000"/>
-              <a:buFont typeface="Wingdings"/>
+              <a:buFont typeface="Wingdings" charset="2"/>
               <a:buChar char="•"/>
               <a:defRPr sz="3200">
                 <a:solidFill>
@@ -3395,12 +3346,12 @@
                 <a:sym typeface="Calibri"/>
               </a:defRPr>
             </a:lvl8pPr>
-            <a:lvl9pPr marL="4023359" indent="-365759">
+            <a:lvl9pPr marL="4023360" indent="-365760">
               <a:spcBef>
                 <a:spcPts val="700"/>
               </a:spcBef>
               <a:buSzPct val="100000"/>
-              <a:buFont typeface="Wingdings"/>
+              <a:buFont typeface="Wingdings" charset="2"/>
               <a:buChar char="•"/>
               <a:defRPr sz="3200">
                 <a:solidFill>
@@ -3414,7 +3365,7 @@
             </a:lvl9pPr>
           </a:lstStyle>
           <a:p>
-            <a:pPr marL="457200" indent="-457200" defTabSz="676655">
+            <a:pPr marL="457200" indent="-457200" defTabSz="676275">
               <a:spcBef>
                 <a:spcPts val="0"/>
               </a:spcBef>
@@ -3442,9 +3393,16 @@
               </a:rPr>
               <a:t>Main idea for local graph recommenders</a:t>
             </a:r>
-          </a:p>
-          <a:p>
-            <a:pPr marL="457200" indent="-457200" defTabSz="676655">
+            <a:endParaRPr lang="en-US" sz="2800" dirty="0" smtClean="0">
+              <a:solidFill>
+                <a:schemeClr val="accent1">
+                  <a:lumMod val="50000"/>
+                </a:schemeClr>
+              </a:solidFill>
+            </a:endParaRPr>
+          </a:p>
+          <a:p>
+            <a:pPr marL="457200" indent="-457200" defTabSz="676275">
               <a:spcBef>
                 <a:spcPts val="0"/>
               </a:spcBef>
@@ -3472,9 +3430,16 @@
               </a:rPr>
               <a:t>Desired outcome</a:t>
             </a:r>
-          </a:p>
-          <a:p>
-            <a:pPr marL="457200" indent="-457200" defTabSz="676655">
+            <a:endParaRPr lang="en-US" sz="2800" dirty="0" smtClean="0">
+              <a:solidFill>
+                <a:schemeClr val="accent1">
+                  <a:lumMod val="50000"/>
+                </a:schemeClr>
+              </a:solidFill>
+            </a:endParaRPr>
+          </a:p>
+          <a:p>
+            <a:pPr marL="457200" indent="-457200" defTabSz="676275">
               <a:spcBef>
                 <a:spcPts val="0"/>
               </a:spcBef>
@@ -3511,7 +3476,7 @@
             </a:endParaRPr>
           </a:p>
           <a:p>
-            <a:pPr marL="457200" indent="-457200" defTabSz="676655">
+            <a:pPr marL="457200" indent="-457200" defTabSz="676275">
               <a:spcBef>
                 <a:spcPts val="0"/>
               </a:spcBef>
@@ -3539,9 +3504,16 @@
               </a:rPr>
               <a:t>Visualization</a:t>
             </a:r>
-          </a:p>
-          <a:p>
-            <a:pPr marL="457200" indent="-457200" defTabSz="676655">
+            <a:endParaRPr lang="en-US" sz="2800" dirty="0" smtClean="0">
+              <a:solidFill>
+                <a:schemeClr val="accent1">
+                  <a:lumMod val="50000"/>
+                </a:schemeClr>
+              </a:solidFill>
+            </a:endParaRPr>
+          </a:p>
+          <a:p>
+            <a:pPr marL="457200" indent="-457200" defTabSz="676275">
               <a:spcBef>
                 <a:spcPts val="0"/>
               </a:spcBef>
@@ -3569,9 +3541,16 @@
               </a:rPr>
               <a:t>Datasets (anonymized FB graphs)</a:t>
             </a:r>
-          </a:p>
-          <a:p>
-            <a:pPr marL="457200" indent="-457200" defTabSz="676655">
+            <a:endParaRPr lang="en-US" sz="2800" dirty="0" smtClean="0">
+              <a:solidFill>
+                <a:schemeClr val="accent1">
+                  <a:lumMod val="50000"/>
+                </a:schemeClr>
+              </a:solidFill>
+            </a:endParaRPr>
+          </a:p>
+          <a:p>
+            <a:pPr marL="457200" indent="-457200" defTabSz="676275">
               <a:spcBef>
                 <a:spcPts val="0"/>
               </a:spcBef>
@@ -3599,9 +3578,16 @@
               </a:rPr>
               <a:t>Enriching anonymized graphs</a:t>
             </a:r>
-          </a:p>
-          <a:p>
-            <a:pPr marL="457200" indent="-457200" defTabSz="676655">
+            <a:endParaRPr lang="en-US" sz="2800" dirty="0" smtClean="0">
+              <a:solidFill>
+                <a:schemeClr val="accent1">
+                  <a:lumMod val="50000"/>
+                </a:schemeClr>
+              </a:solidFill>
+            </a:endParaRPr>
+          </a:p>
+          <a:p>
+            <a:pPr marL="457200" indent="-457200" defTabSz="676275">
               <a:spcBef>
                 <a:spcPts val="0"/>
               </a:spcBef>
@@ -3629,9 +3615,16 @@
               </a:rPr>
               <a:t>Graph recommender algorithm</a:t>
             </a:r>
-          </a:p>
-          <a:p>
-            <a:pPr marL="457200" indent="-457200" defTabSz="676655">
+            <a:endParaRPr lang="en-US" sz="2800" dirty="0" smtClean="0">
+              <a:solidFill>
+                <a:schemeClr val="accent1">
+                  <a:lumMod val="50000"/>
+                </a:schemeClr>
+              </a:solidFill>
+            </a:endParaRPr>
+          </a:p>
+          <a:p>
+            <a:pPr marL="457200" indent="-457200" defTabSz="676275">
               <a:spcBef>
                 <a:spcPts val="0"/>
               </a:spcBef>
@@ -3659,9 +3652,16 @@
               </a:rPr>
               <a:t>Future work</a:t>
             </a:r>
-          </a:p>
-          <a:p>
-            <a:pPr marL="457200" indent="-457200" defTabSz="676655">
+            <a:endParaRPr lang="en-US" sz="2800" dirty="0" smtClean="0">
+              <a:solidFill>
+                <a:schemeClr val="accent1">
+                  <a:lumMod val="50000"/>
+                </a:schemeClr>
+              </a:solidFill>
+            </a:endParaRPr>
+          </a:p>
+          <a:p>
+            <a:pPr marL="457200" indent="-457200" defTabSz="676275">
               <a:spcBef>
                 <a:spcPts val="0"/>
               </a:spcBef>
@@ -3690,11 +3690,6 @@
         </p:txBody>
       </p:sp>
     </p:spTree>
-    <p:extLst>
-      <p:ext uri="{BB962C8B-B14F-4D97-AF65-F5344CB8AC3E}">
-        <p14:creationId xmlns:p14="http://schemas.microsoft.com/office/powerpoint/2010/main" val="2596498085"/>
-      </p:ext>
-    </p:extLst>
   </p:cSld>
   <p:clrMapOvr>
     <a:masterClrMapping/>
@@ -3730,9 +3725,7 @@
       <p:sp>
         <p:nvSpPr>
           <p:cNvPr id="5" name="Title 1"/>
-          <p:cNvSpPr txBox="1">
-            <a:spLocks/>
-          </p:cNvSpPr>
+          <p:cNvSpPr txBox="1"/>
           <p:nvPr/>
         </p:nvSpPr>
         <p:spPr>
@@ -3862,7 +3855,6 @@
               <a:buSzTx/>
               <a:buFontTx/>
               <a:buNone/>
-              <a:tabLst/>
             </a:pPr>
             <a:r>
               <a:rPr lang="en-US" dirty="0"/>
@@ -3881,7 +3873,7 @@
           <p:nvPr/>
         </p:nvPicPr>
         <p:blipFill>
-          <a:blip r:embed="rId2">
+          <a:blip r:embed="rId1">
             <a:extLst>
               <a:ext uri="{28A0092B-C50C-407E-A947-70E740481C1C}">
                 <a14:useLocalDpi xmlns:a14="http://schemas.microsoft.com/office/drawing/2010/main" val="0"/>
@@ -3928,7 +3920,7 @@
                 <a:solidFill>
                   <a:srgbClr val="222222"/>
                 </a:solidFill>
-                <a:latin typeface="Arial" panose="020B0604020202020204" pitchFamily="34" charset="0"/>
+                <a:latin typeface="Arial" charset="0"/>
               </a:rPr>
               <a:t>Leskovec</a:t>
             </a:r>
@@ -3937,7 +3929,7 @@
                 <a:solidFill>
                   <a:srgbClr val="222222"/>
                 </a:solidFill>
-                <a:latin typeface="Arial" panose="020B0604020202020204" pitchFamily="34" charset="0"/>
+                <a:latin typeface="Arial" charset="0"/>
               </a:rPr>
               <a:t>, Jure, </a:t>
             </a:r>
@@ -3946,7 +3938,7 @@
                 <a:solidFill>
                   <a:srgbClr val="222222"/>
                 </a:solidFill>
-                <a:latin typeface="Arial" panose="020B0604020202020204" pitchFamily="34" charset="0"/>
+                <a:latin typeface="Arial" charset="0"/>
               </a:rPr>
               <a:t>Ajit</a:t>
             </a:r>
@@ -3955,7 +3947,7 @@
                 <a:solidFill>
                   <a:srgbClr val="222222"/>
                 </a:solidFill>
-                <a:latin typeface="Arial" panose="020B0604020202020204" pitchFamily="34" charset="0"/>
+                <a:latin typeface="Arial" charset="0"/>
               </a:rPr>
               <a:t> Singh, and Jon Kleinberg. "Patterns of influence in a recommendation network." </a:t>
             </a:r>
@@ -3964,7 +3956,7 @@
                 <a:solidFill>
                   <a:srgbClr val="222222"/>
                 </a:solidFill>
-                <a:latin typeface="Arial" panose="020B0604020202020204" pitchFamily="34" charset="0"/>
+                <a:latin typeface="Arial" charset="0"/>
               </a:rPr>
               <a:t>Pacific-Asia Conference on Knowledge Discovery and Data Mining</a:t>
             </a:r>
@@ -3973,7 +3965,7 @@
                 <a:solidFill>
                   <a:srgbClr val="222222"/>
                 </a:solidFill>
-                <a:latin typeface="Arial" panose="020B0604020202020204" pitchFamily="34" charset="0"/>
+                <a:latin typeface="Arial" charset="0"/>
               </a:rPr>
               <a:t>. Springer Berlin Heidelberg, 2006.</a:t>
             </a:r>
@@ -4020,7 +4012,7 @@
           </a:bodyPr>
           <a:lstStyle/>
           <a:p>
-            <a:pPr marR="0" algn="l" defTabSz="676655" rtl="0" fontAlgn="auto" latinLnBrk="1" hangingPunct="0">
+            <a:pPr marR="0" algn="l" defTabSz="676275" rtl="0" fontAlgn="auto" latinLnBrk="1" hangingPunct="0">
               <a:lnSpc>
                 <a:spcPct val="100000"/>
               </a:lnSpc>
@@ -4031,7 +4023,6 @@
                 <a:srgbClr val="1F497D"/>
               </a:buClr>
               <a:buSzPct val="100000"/>
-              <a:tabLst/>
               <a:defRPr sz="1800">
                 <a:solidFill>
                   <a:srgbClr val="000000"/>
@@ -4090,9 +4081,19 @@
               </a:rPr>
               <a:t>users showed that:</a:t>
             </a:r>
-          </a:p>
-          <a:p>
-            <a:pPr marR="0" algn="l" defTabSz="676655" rtl="0" fontAlgn="auto" latinLnBrk="1" hangingPunct="0">
+            <a:endParaRPr lang="en-US" sz="2400" dirty="0" smtClean="0">
+              <a:solidFill>
+                <a:schemeClr val="accent1">
+                  <a:lumMod val="50000"/>
+                </a:schemeClr>
+              </a:solidFill>
+              <a:latin typeface="Calibri"/>
+              <a:ea typeface="Calibri"/>
+              <a:cs typeface="Calibri"/>
+            </a:endParaRPr>
+          </a:p>
+          <a:p>
+            <a:pPr marR="0" algn="l" defTabSz="676275" rtl="0" fontAlgn="auto" latinLnBrk="1" hangingPunct="0">
               <a:lnSpc>
                 <a:spcPct val="100000"/>
               </a:lnSpc>
@@ -4103,7 +4104,6 @@
                 <a:srgbClr val="1F497D"/>
               </a:buClr>
               <a:buSzPct val="100000"/>
-              <a:tabLst/>
               <a:defRPr sz="1800">
                 <a:solidFill>
                   <a:srgbClr val="000000"/>
@@ -4122,7 +4122,7 @@
             </a:endParaRPr>
           </a:p>
           <a:p>
-            <a:pPr marL="342900" marR="0" indent="-342900" algn="l" defTabSz="676655" rtl="0" fontAlgn="auto" latinLnBrk="1" hangingPunct="0">
+            <a:pPr marL="342900" marR="0" indent="-342900" algn="l" defTabSz="676275" rtl="0" fontAlgn="auto" latinLnBrk="1" hangingPunct="0">
               <a:lnSpc>
                 <a:spcPct val="100000"/>
               </a:lnSpc>
@@ -4133,9 +4133,8 @@
                 <a:srgbClr val="1F497D"/>
               </a:buClr>
               <a:buSzPct val="100000"/>
-              <a:buFont typeface="Arial" panose="020B0604020202020204" pitchFamily="34" charset="0"/>
+              <a:buFont typeface="Arial" charset="0"/>
               <a:buChar char="•"/>
-              <a:tabLst/>
               <a:defRPr sz="1800">
                 <a:solidFill>
                   <a:srgbClr val="000000"/>
@@ -4155,9 +4154,19 @@
               </a:rPr>
               <a:t>The average size of cascades was relatively small (maximum ~10 for all but DVDs)</a:t>
             </a:r>
-          </a:p>
-          <a:p>
-            <a:pPr marL="342900" marR="0" indent="-342900" algn="l" defTabSz="676655" rtl="0" fontAlgn="auto" latinLnBrk="1" hangingPunct="0">
+            <a:endParaRPr lang="en-US" sz="2400" dirty="0" smtClean="0">
+              <a:solidFill>
+                <a:schemeClr val="accent1">
+                  <a:lumMod val="50000"/>
+                </a:schemeClr>
+              </a:solidFill>
+              <a:latin typeface="Calibri"/>
+              <a:ea typeface="Calibri"/>
+              <a:cs typeface="Calibri"/>
+            </a:endParaRPr>
+          </a:p>
+          <a:p>
+            <a:pPr marL="342900" marR="0" indent="-342900" algn="l" defTabSz="676275" rtl="0" fontAlgn="auto" latinLnBrk="1" hangingPunct="0">
               <a:lnSpc>
                 <a:spcPct val="100000"/>
               </a:lnSpc>
@@ -4168,9 +4177,8 @@
                 <a:srgbClr val="1F497D"/>
               </a:buClr>
               <a:buSzPct val="100000"/>
-              <a:buFont typeface="Arial" panose="020B0604020202020204" pitchFamily="34" charset="0"/>
+              <a:buFont typeface="Arial" charset="0"/>
               <a:buChar char="•"/>
-              <a:tabLst/>
               <a:defRPr sz="1800">
                 <a:solidFill>
                   <a:srgbClr val="000000"/>
@@ -4204,11 +4212,6 @@
         </p:txBody>
       </p:sp>
     </p:spTree>
-    <p:extLst>
-      <p:ext uri="{BB962C8B-B14F-4D97-AF65-F5344CB8AC3E}">
-        <p14:creationId xmlns:p14="http://schemas.microsoft.com/office/powerpoint/2010/main" val="1564206221"/>
-      </p:ext>
-    </p:extLst>
   </p:cSld>
   <p:clrMapOvr>
     <a:masterClrMapping/>
@@ -4244,9 +4247,7 @@
       <p:sp>
         <p:nvSpPr>
           <p:cNvPr id="5" name="Title 1"/>
-          <p:cNvSpPr txBox="1">
-            <a:spLocks/>
-          </p:cNvSpPr>
+          <p:cNvSpPr txBox="1"/>
           <p:nvPr/>
         </p:nvSpPr>
         <p:spPr>
@@ -4376,7 +4377,6 @@
               <a:buSzTx/>
               <a:buFontTx/>
               <a:buNone/>
-              <a:tabLst/>
             </a:pPr>
             <a:r>
               <a:rPr lang="en-US" dirty="0"/>
@@ -4399,7 +4399,7 @@
           <p:nvPr/>
         </p:nvPicPr>
         <p:blipFill>
-          <a:blip r:embed="rId2">
+          <a:blip r:embed="rId1">
             <a:extLst>
               <a:ext uri="{28A0092B-C50C-407E-A947-70E740481C1C}">
                 <a14:useLocalDpi xmlns:a14="http://schemas.microsoft.com/office/drawing/2010/main" val="0"/>
@@ -4423,9 +4423,7 @@
       <p:sp>
         <p:nvSpPr>
           <p:cNvPr id="6" name="Title 1"/>
-          <p:cNvSpPr txBox="1">
-            <a:spLocks/>
-          </p:cNvSpPr>
+          <p:cNvSpPr txBox="1"/>
           <p:nvPr/>
         </p:nvSpPr>
         <p:spPr>
@@ -4555,7 +4553,6 @@
               <a:buSzTx/>
               <a:buFontTx/>
               <a:buNone/>
-              <a:tabLst/>
             </a:pPr>
             <a:r>
               <a:rPr lang="en-US" sz="3200" dirty="0" smtClean="0"/>
@@ -4570,11 +4567,6 @@
         </p:txBody>
       </p:sp>
     </p:spTree>
-    <p:extLst>
-      <p:ext uri="{BB962C8B-B14F-4D97-AF65-F5344CB8AC3E}">
-        <p14:creationId xmlns:p14="http://schemas.microsoft.com/office/powerpoint/2010/main" val="1359851055"/>
-      </p:ext>
-    </p:extLst>
   </p:cSld>
   <p:clrMapOvr>
     <a:masterClrMapping/>
@@ -4658,40 +4650,43 @@
           <a:lstStyle/>
           <a:p>
             <a:pPr>
-              <a:buFont typeface="Arial" panose="020B0604020202020204" pitchFamily="34" charset="0"/>
+              <a:buFont typeface="Arial" charset="0"/>
               <a:buChar char="•"/>
             </a:pPr>
             <a:r>
               <a:rPr lang="en-US" sz="2800" dirty="0" smtClean="0"/>
               <a:t>Better understanding of the influence factors in graph based recommendations</a:t>
             </a:r>
+            <a:endParaRPr lang="en-US" sz="2800" dirty="0" smtClean="0"/>
           </a:p>
           <a:p>
             <a:pPr>
-              <a:buFont typeface="Arial" panose="020B0604020202020204" pitchFamily="34" charset="0"/>
+              <a:buFont typeface="Arial" charset="0"/>
               <a:buChar char="•"/>
             </a:pPr>
             <a:endParaRPr lang="en-US" sz="1400" dirty="0" smtClean="0"/>
           </a:p>
           <a:p>
             <a:pPr>
-              <a:buFont typeface="Arial" panose="020B0604020202020204" pitchFamily="34" charset="0"/>
+              <a:buFont typeface="Arial" charset="0"/>
               <a:buChar char="•"/>
             </a:pPr>
             <a:r>
               <a:rPr lang="en-US" sz="2800" dirty="0" smtClean="0"/>
               <a:t>Better understanding of the complexity / runtime behavior of graph based recommenders</a:t>
             </a:r>
+            <a:endParaRPr lang="en-US" sz="2800" dirty="0" smtClean="0"/>
           </a:p>
           <a:p>
             <a:pPr lvl="1">
-              <a:buFont typeface="Arial" panose="020B0604020202020204" pitchFamily="34" charset="0"/>
+              <a:buFont typeface="Arial" charset="0"/>
               <a:buChar char="•"/>
             </a:pPr>
             <a:r>
               <a:rPr lang="en-US" sz="2400" dirty="0" smtClean="0"/>
               <a:t>Especially useful for larger graphs outside our experimental scope</a:t>
             </a:r>
+            <a:endParaRPr lang="en-US" sz="2400" dirty="0" smtClean="0"/>
           </a:p>
           <a:p>
             <a:pPr marL="514350" indent="-514350">
@@ -4702,24 +4697,25 @@
           </a:p>
           <a:p>
             <a:pPr>
-              <a:buFont typeface="Arial" panose="020B0604020202020204" pitchFamily="34" charset="0"/>
+              <a:buFont typeface="Arial" charset="0"/>
               <a:buChar char="•"/>
             </a:pPr>
             <a:r>
               <a:rPr lang="en-US" sz="2800" dirty="0" smtClean="0"/>
               <a:t>Basis for further experiments in ML on perturbed knowledge bases</a:t>
             </a:r>
+            <a:endParaRPr lang="en-US" sz="2800" dirty="0" smtClean="0"/>
           </a:p>
           <a:p>
             <a:pPr>
-              <a:buFont typeface="Arial" panose="020B0604020202020204" pitchFamily="34" charset="0"/>
+              <a:buFont typeface="Arial" charset="0"/>
               <a:buChar char="•"/>
             </a:pPr>
             <a:endParaRPr lang="en-US" sz="1400" dirty="0"/>
           </a:p>
           <a:p>
             <a:pPr>
-              <a:buFont typeface="Arial" panose="020B0604020202020204" pitchFamily="34" charset="0"/>
+              <a:buFont typeface="Arial" charset="0"/>
               <a:buChar char="•"/>
             </a:pPr>
             <a:r>
@@ -4731,11 +4727,6 @@
         </p:txBody>
       </p:sp>
     </p:spTree>
-    <p:extLst>
-      <p:ext uri="{BB962C8B-B14F-4D97-AF65-F5344CB8AC3E}">
-        <p14:creationId xmlns:p14="http://schemas.microsoft.com/office/powerpoint/2010/main" val="2186964654"/>
-      </p:ext>
-    </p:extLst>
   </p:cSld>
   <p:clrMapOvr>
     <a:masterClrMapping/>
@@ -4836,6 +4827,7 @@
               <a:rPr lang="en-US" sz="2800" dirty="0"/>
               <a:t>navigate to the Website</a:t>
             </a:r>
+            <a:endParaRPr lang="en-US" sz="2800" dirty="0"/>
           </a:p>
           <a:p>
             <a:pPr marL="514350" indent="-514350" algn="l">
@@ -4860,6 +4852,7 @@
               <a:rPr lang="en-US" sz="2800" dirty="0" smtClean="0"/>
               <a:t>graphs</a:t>
             </a:r>
+            <a:endParaRPr lang="en-US" sz="2800" dirty="0" smtClean="0"/>
           </a:p>
           <a:p>
             <a:pPr marL="514350" indent="-514350" algn="l">
@@ -4876,6 +4869,7 @@
               <a:rPr lang="en-US" sz="2800" dirty="0" smtClean="0"/>
               <a:t>Recommendation mode: single / all users</a:t>
             </a:r>
+            <a:endParaRPr lang="en-US" sz="2800" dirty="0" smtClean="0"/>
           </a:p>
           <a:p>
             <a:pPr marL="514350" indent="-514350" algn="l">
@@ -4921,16 +4915,17 @@
               <a:rPr lang="en-US" sz="2800" dirty="0" smtClean="0"/>
               <a:t>The feedback alters the underlying feature vectors</a:t>
             </a:r>
-          </a:p>
-          <a:p>
-            <a:pPr marL="955221" lvl="1" indent="-514350" algn="l">
+            <a:endParaRPr lang="en-US" sz="2800" dirty="0" smtClean="0"/>
+          </a:p>
+          <a:p>
+            <a:pPr marL="955040" lvl="1" indent="-514350" algn="l">
               <a:spcBef>
                 <a:spcPts val="0"/>
               </a:spcBef>
               <a:spcAft>
                 <a:spcPts val="1200"/>
               </a:spcAft>
-              <a:buFont typeface="Arial" panose="020B0604020202020204" pitchFamily="34" charset="0"/>
+              <a:buFont typeface="Arial" charset="0"/>
               <a:buChar char="•"/>
             </a:pPr>
             <a:r>
@@ -4954,6 +4949,7 @@
               <a:rPr lang="en-US" sz="2800" dirty="0" smtClean="0"/>
               <a:t>Recommendations are re-computed… this cycle continues until researcher has enough data to write a paper about it ;)</a:t>
             </a:r>
+            <a:endParaRPr lang="en-US" sz="2800" dirty="0" smtClean="0"/>
           </a:p>
           <a:p>
             <a:pPr marL="514350" indent="-514350">
@@ -4971,7 +4967,7 @@
           </a:p>
           <a:p>
             <a:pPr>
-              <a:buFont typeface="Arial" panose="020B0604020202020204" pitchFamily="34" charset="0"/>
+              <a:buFont typeface="Arial" charset="0"/>
               <a:buChar char="•"/>
             </a:pPr>
             <a:endParaRPr lang="en-US" sz="2800" dirty="0"/>
@@ -4979,11 +4975,6 @@
         </p:txBody>
       </p:sp>
     </p:spTree>
-    <p:extLst>
-      <p:ext uri="{BB962C8B-B14F-4D97-AF65-F5344CB8AC3E}">
-        <p14:creationId xmlns:p14="http://schemas.microsoft.com/office/powerpoint/2010/main" val="1119222618"/>
-      </p:ext>
-    </p:extLst>
   </p:cSld>
   <p:clrMapOvr>
     <a:masterClrMapping/>
@@ -5019,9 +5010,7 @@
       <p:sp>
         <p:nvSpPr>
           <p:cNvPr id="4" name="Title 1"/>
-          <p:cNvSpPr txBox="1">
-            <a:spLocks/>
-          </p:cNvSpPr>
+          <p:cNvSpPr txBox="1"/>
           <p:nvPr/>
         </p:nvSpPr>
         <p:spPr>
@@ -5035,11 +5024,6 @@
           <a:ln w="12700">
             <a:miter lim="400000"/>
           </a:ln>
-          <a:extLst>
-            <a:ext uri="{C572A759-6A51-4108-AA02-DFA0A04FC94B}">
-              <ma14:wrappingTextBoxFlag xmlns="" xmlns:ma14="http://schemas.microsoft.com/office/mac/drawingml/2011/main" val="1"/>
-            </a:ext>
-          </a:extLst>
         </p:spPr>
         <p:txBody>
           <a:bodyPr lIns="45718" tIns="45718" rIns="45718" bIns="45718" anchor="ctr">
@@ -5164,7 +5148,7 @@
           <p:nvPr/>
         </p:nvPicPr>
         <p:blipFill>
-          <a:blip r:embed="rId3">
+          <a:blip r:embed="rId1">
             <a:extLst>
               <a:ext uri="{28A0092B-C50C-407E-A947-70E740481C1C}">
                 <a14:useLocalDpi xmlns:a14="http://schemas.microsoft.com/office/drawing/2010/main" val="0"/>
@@ -5186,11 +5170,6 @@
         </p:spPr>
       </p:pic>
     </p:spTree>
-    <p:extLst>
-      <p:ext uri="{BB962C8B-B14F-4D97-AF65-F5344CB8AC3E}">
-        <p14:creationId xmlns:p14="http://schemas.microsoft.com/office/powerpoint/2010/main" val="3756173392"/>
-      </p:ext>
-    </p:extLst>
   </p:cSld>
   <p:clrMapOvr>
     <a:masterClrMapping/>
@@ -5219,9 +5198,7 @@
       <p:sp>
         <p:nvSpPr>
           <p:cNvPr id="4" name="Title 1"/>
-          <p:cNvSpPr txBox="1">
-            <a:spLocks/>
-          </p:cNvSpPr>
+          <p:cNvSpPr txBox="1"/>
           <p:nvPr/>
         </p:nvSpPr>
         <p:spPr>
@@ -5235,11 +5212,6 @@
           <a:ln w="12700">
             <a:miter lim="400000"/>
           </a:ln>
-          <a:extLst>
-            <a:ext uri="{C572A759-6A51-4108-AA02-DFA0A04FC94B}">
-              <ma14:wrappingTextBoxFlag xmlns="" xmlns:ma14="http://schemas.microsoft.com/office/mac/drawingml/2011/main" val="1"/>
-            </a:ext>
-          </a:extLst>
         </p:spPr>
         <p:txBody>
           <a:bodyPr lIns="45718" tIns="45718" rIns="45718" bIns="45718" anchor="ctr">
@@ -5386,7 +5358,7 @@
           <p:nvPr/>
         </p:nvPicPr>
         <p:blipFill>
-          <a:blip r:embed="rId2">
+          <a:blip r:embed="rId1">
             <a:extLst>
               <a:ext uri="{28A0092B-C50C-407E-A947-70E740481C1C}">
                 <a14:useLocalDpi xmlns:a14="http://schemas.microsoft.com/office/drawing/2010/main" val="0"/>
@@ -5428,47 +5400,47 @@
           <a:lstStyle/>
           <a:p>
             <a:pPr>
-              <a:buFont typeface="Arial" panose="020B0604020202020204" pitchFamily="34" charset="0"/>
+              <a:buFont typeface="Arial" charset="0"/>
               <a:buChar char="•"/>
             </a:pPr>
             <a:r>
               <a:rPr lang="en-US" sz="2800" dirty="0" smtClean="0"/>
               <a:t>Anonymized FB graphs provided by SNAP (Stanford Network Analysis Project)</a:t>
             </a:r>
+            <a:endParaRPr lang="en-US" sz="2800" dirty="0" smtClean="0"/>
           </a:p>
           <a:p>
             <a:pPr>
-              <a:buFont typeface="Arial" panose="020B0604020202020204" pitchFamily="34" charset="0"/>
+              <a:buFont typeface="Arial" charset="0"/>
               <a:buChar char="•"/>
             </a:pPr>
             <a:r>
               <a:rPr lang="en-US" sz="2800" dirty="0" smtClean="0"/>
-              <a:t>10 FB EGO-graphs: social network from the perspective of one user =&gt; shows only relations </a:t>
-            </a:r>
-            <a:r>
-              <a:rPr lang="en-US" sz="2800" dirty="0" smtClean="0"/>
-              <a:t>among friends</a:t>
-            </a:r>
+              <a:t>10 FB EGO-graphs: social network from the perspective of one user =&gt; shows only relations among friends</a:t>
+            </a:r>
+            <a:endParaRPr lang="en-US" sz="2800" dirty="0" smtClean="0"/>
           </a:p>
           <a:p>
             <a:pPr>
-              <a:buFont typeface="Arial" panose="020B0604020202020204" pitchFamily="34" charset="0"/>
+              <a:buFont typeface="Arial" charset="0"/>
               <a:buChar char="•"/>
             </a:pPr>
             <a:r>
               <a:rPr lang="en-US" sz="2800" dirty="0" smtClean="0"/>
               <a:t>Just the structure is provided</a:t>
             </a:r>
+            <a:endParaRPr lang="en-US" sz="2800" dirty="0" smtClean="0"/>
           </a:p>
           <a:p>
             <a:pPr>
-              <a:buFont typeface="Arial" panose="020B0604020202020204" pitchFamily="34" charset="0"/>
+              <a:buFont typeface="Arial" charset="0"/>
               <a:buChar char="•"/>
             </a:pPr>
             <a:r>
               <a:rPr lang="en-US" sz="2800" dirty="0" smtClean="0"/>
               <a:t>Content has to be re-generated</a:t>
             </a:r>
+            <a:endParaRPr lang="en-US" sz="2800" dirty="0" smtClean="0"/>
           </a:p>
           <a:p>
             <a:pPr marL="0" indent="0">
@@ -5490,7 +5462,7 @@
           <p:nvPr/>
         </p:nvPicPr>
         <p:blipFill>
-          <a:blip r:embed="rId3" cstate="print">
+          <a:blip r:embed="rId2" cstate="print">
             <a:extLst>
               <a:ext uri="{28A0092B-C50C-407E-A947-70E740481C1C}">
                 <a14:useLocalDpi xmlns:a14="http://schemas.microsoft.com/office/drawing/2010/main" val="0"/>
@@ -5579,7 +5551,7 @@
           <p:nvPr/>
         </p:nvPicPr>
         <p:blipFill>
-          <a:blip r:embed="rId4" cstate="print">
+          <a:blip r:embed="rId3" cstate="print">
             <a:extLst>
               <a:ext uri="{28A0092B-C50C-407E-A947-70E740481C1C}">
                 <a14:useLocalDpi xmlns:a14="http://schemas.microsoft.com/office/drawing/2010/main" val="0"/>
@@ -5601,11 +5573,6 @@
         </p:spPr>
       </p:pic>
     </p:spTree>
-    <p:extLst>
-      <p:ext uri="{BB962C8B-B14F-4D97-AF65-F5344CB8AC3E}">
-        <p14:creationId xmlns:p14="http://schemas.microsoft.com/office/powerpoint/2010/main" val="2282793886"/>
-      </p:ext>
-    </p:extLst>
   </p:cSld>
   <p:clrMapOvr>
     <a:masterClrMapping/>
@@ -5634,9 +5601,7 @@
       <p:sp>
         <p:nvSpPr>
           <p:cNvPr id="4" name="Title 1"/>
-          <p:cNvSpPr txBox="1">
-            <a:spLocks/>
-          </p:cNvSpPr>
+          <p:cNvSpPr txBox="1"/>
           <p:nvPr/>
         </p:nvSpPr>
         <p:spPr>
@@ -5650,11 +5615,6 @@
           <a:ln w="12700">
             <a:miter lim="400000"/>
           </a:ln>
-          <a:extLst>
-            <a:ext uri="{C572A759-6A51-4108-AA02-DFA0A04FC94B}">
-              <ma14:wrappingTextBoxFlag xmlns="" xmlns:ma14="http://schemas.microsoft.com/office/mac/drawingml/2011/main" val="1"/>
-            </a:ext>
-          </a:extLst>
         </p:spPr>
         <p:txBody>
           <a:bodyPr lIns="45718" tIns="45718" rIns="45718" bIns="45718" anchor="ctr">
@@ -5793,11 +5753,6 @@
         </p:txBody>
       </p:sp>
     </p:spTree>
-    <p:extLst>
-      <p:ext uri="{BB962C8B-B14F-4D97-AF65-F5344CB8AC3E}">
-        <p14:creationId xmlns:p14="http://schemas.microsoft.com/office/powerpoint/2010/main" val="1139457689"/>
-      </p:ext>
-    </p:extLst>
   </p:cSld>
   <p:clrMapOvr>
     <a:masterClrMapping/>
@@ -6006,7 +5961,6 @@
           <a:prstDash val="solid"/>
           <a:bevel/>
         </a:ln>
-        <a:effectLst/>
       </a:spPr>
       <a:bodyPr rot="0" spcFirstLastPara="1" vertOverflow="overflow" horzOverflow="overflow" vert="horz" wrap="square" lIns="45718" tIns="45718" rIns="45718" bIns="45718" numCol="1" spcCol="38100" rtlCol="0" anchor="ctr">
         <a:spAutoFit/>
@@ -6026,7 +5980,6 @@
           <a:buSzTx/>
           <a:buFontTx/>
           <a:buNone/>
-          <a:tabLst/>
           <a:defRPr kumimoji="0" sz="1800" b="0" i="0" u="none" strike="noStrike" cap="none" spc="0" normalizeH="0" baseline="0">
             <a:ln>
               <a:noFill/>
@@ -6056,7 +6009,6 @@
           <a:buSzTx/>
           <a:buFontTx/>
           <a:buNone/>
-          <a:tabLst/>
           <a:defRPr kumimoji="0" sz="1800" b="0" i="0" u="none" strike="noStrike" cap="none" spc="0" normalizeH="0" baseline="0">
             <a:ln>
               <a:noFill/>
@@ -6082,7 +6034,6 @@
           <a:buSzTx/>
           <a:buFontTx/>
           <a:buNone/>
-          <a:tabLst/>
           <a:defRPr kumimoji="0" sz="1800" b="0" i="0" u="none" strike="noStrike" cap="none" spc="0" normalizeH="0" baseline="0">
             <a:ln>
               <a:noFill/>
@@ -6108,7 +6059,6 @@
           <a:buSzTx/>
           <a:buFontTx/>
           <a:buNone/>
-          <a:tabLst/>
           <a:defRPr kumimoji="0" sz="1800" b="0" i="0" u="none" strike="noStrike" cap="none" spc="0" normalizeH="0" baseline="0">
             <a:ln>
               <a:noFill/>
@@ -6134,7 +6084,6 @@
           <a:buSzTx/>
           <a:buFontTx/>
           <a:buNone/>
-          <a:tabLst/>
           <a:defRPr kumimoji="0" sz="1800" b="0" i="0" u="none" strike="noStrike" cap="none" spc="0" normalizeH="0" baseline="0">
             <a:ln>
               <a:noFill/>
@@ -6160,7 +6109,6 @@
           <a:buSzTx/>
           <a:buFontTx/>
           <a:buNone/>
-          <a:tabLst/>
           <a:defRPr kumimoji="0" sz="1800" b="0" i="0" u="none" strike="noStrike" cap="none" spc="0" normalizeH="0" baseline="0">
             <a:ln>
               <a:noFill/>
@@ -6186,7 +6134,6 @@
           <a:buSzTx/>
           <a:buFontTx/>
           <a:buNone/>
-          <a:tabLst/>
           <a:defRPr kumimoji="0" sz="1800" b="0" i="0" u="none" strike="noStrike" cap="none" spc="0" normalizeH="0" baseline="0">
             <a:ln>
               <a:noFill/>
@@ -6212,7 +6159,6 @@
           <a:buSzTx/>
           <a:buFontTx/>
           <a:buNone/>
-          <a:tabLst/>
           <a:defRPr kumimoji="0" sz="1800" b="0" i="0" u="none" strike="noStrike" cap="none" spc="0" normalizeH="0" baseline="0">
             <a:ln>
               <a:noFill/>
@@ -6238,7 +6184,6 @@
           <a:buSzTx/>
           <a:buFontTx/>
           <a:buNone/>
-          <a:tabLst/>
           <a:defRPr kumimoji="0" sz="1800" b="0" i="0" u="none" strike="noStrike" cap="none" spc="0" normalizeH="0" baseline="0">
             <a:ln>
               <a:noFill/>
@@ -6264,7 +6209,6 @@
           <a:buSzTx/>
           <a:buFontTx/>
           <a:buNone/>
-          <a:tabLst/>
           <a:defRPr kumimoji="0" sz="1800" b="0" i="0" u="none" strike="noStrike" cap="none" spc="0" normalizeH="0" baseline="0">
             <a:ln>
               <a:noFill/>
@@ -6300,7 +6244,6 @@
           <a:prstDash val="solid"/>
           <a:bevel/>
         </a:ln>
-        <a:effectLst/>
       </a:spPr>
       <a:bodyPr rot="0" spcFirstLastPara="1" vertOverflow="overflow" horzOverflow="overflow" vert="horz" wrap="square" lIns="91439" tIns="45719" rIns="91439" bIns="45719" numCol="1" spcCol="38100" rtlCol="0" anchor="t">
         <a:noAutofit/>
@@ -6320,7 +6263,6 @@
           <a:buSzTx/>
           <a:buFontTx/>
           <a:buNone/>
-          <a:tabLst/>
           <a:defRPr kumimoji="0" sz="1800" b="0" i="0" u="none" strike="noStrike" cap="none" spc="0" normalizeH="0" baseline="0">
             <a:ln>
               <a:noFill/>
@@ -6346,7 +6288,6 @@
           <a:buSzTx/>
           <a:buFontTx/>
           <a:buNone/>
-          <a:tabLst/>
           <a:defRPr kumimoji="0" sz="1800" b="0" i="0" u="none" strike="noStrike" cap="none" spc="0" normalizeH="0" baseline="0">
             <a:ln>
               <a:noFill/>
@@ -6372,7 +6313,6 @@
           <a:buSzTx/>
           <a:buFontTx/>
           <a:buNone/>
-          <a:tabLst/>
           <a:defRPr kumimoji="0" sz="1800" b="0" i="0" u="none" strike="noStrike" cap="none" spc="0" normalizeH="0" baseline="0">
             <a:ln>
               <a:noFill/>
@@ -6398,7 +6338,6 @@
           <a:buSzTx/>
           <a:buFontTx/>
           <a:buNone/>
-          <a:tabLst/>
           <a:defRPr kumimoji="0" sz="1800" b="0" i="0" u="none" strike="noStrike" cap="none" spc="0" normalizeH="0" baseline="0">
             <a:ln>
               <a:noFill/>
@@ -6424,7 +6363,6 @@
           <a:buSzTx/>
           <a:buFontTx/>
           <a:buNone/>
-          <a:tabLst/>
           <a:defRPr kumimoji="0" sz="1800" b="0" i="0" u="none" strike="noStrike" cap="none" spc="0" normalizeH="0" baseline="0">
             <a:ln>
               <a:noFill/>
@@ -6450,7 +6388,6 @@
           <a:buSzTx/>
           <a:buFontTx/>
           <a:buNone/>
-          <a:tabLst/>
           <a:defRPr kumimoji="0" sz="1800" b="0" i="0" u="none" strike="noStrike" cap="none" spc="0" normalizeH="0" baseline="0">
             <a:ln>
               <a:noFill/>
@@ -6476,7 +6413,6 @@
           <a:buSzTx/>
           <a:buFontTx/>
           <a:buNone/>
-          <a:tabLst/>
           <a:defRPr kumimoji="0" sz="1800" b="0" i="0" u="none" strike="noStrike" cap="none" spc="0" normalizeH="0" baseline="0">
             <a:ln>
               <a:noFill/>
@@ -6502,7 +6438,6 @@
           <a:buSzTx/>
           <a:buFontTx/>
           <a:buNone/>
-          <a:tabLst/>
           <a:defRPr kumimoji="0" sz="1800" b="0" i="0" u="none" strike="noStrike" cap="none" spc="0" normalizeH="0" baseline="0">
             <a:ln>
               <a:noFill/>
@@ -6528,7 +6463,6 @@
           <a:buSzTx/>
           <a:buFontTx/>
           <a:buNone/>
-          <a:tabLst/>
           <a:defRPr kumimoji="0" sz="1800" b="0" i="0" u="none" strike="noStrike" cap="none" spc="0" normalizeH="0" baseline="0">
             <a:ln>
               <a:noFill/>
@@ -6554,7 +6488,6 @@
           <a:buSzTx/>
           <a:buFontTx/>
           <a:buNone/>
-          <a:tabLst/>
           <a:defRPr kumimoji="0" sz="1800" b="0" i="0" u="none" strike="noStrike" cap="none" spc="0" normalizeH="0" baseline="0">
             <a:ln>
               <a:noFill/>
@@ -6587,7 +6520,6 @@
           <a:noFill/>
           <a:miter lim="400000"/>
         </a:ln>
-        <a:effectLst/>
       </a:spPr>
       <a:bodyPr rot="0" spcFirstLastPara="1" vertOverflow="overflow" horzOverflow="overflow" vert="horz" wrap="square" lIns="45718" tIns="45718" rIns="45718" bIns="45718" numCol="1" spcCol="38100" rtlCol="0" anchor="t">
         <a:spAutoFit/>
@@ -6607,7 +6539,6 @@
           <a:buSzTx/>
           <a:buFontTx/>
           <a:buNone/>
-          <a:tabLst/>
           <a:defRPr kumimoji="0" sz="1800" b="0" i="0" u="none" strike="noStrike" cap="none" spc="0" normalizeH="0" baseline="0">
             <a:ln>
               <a:noFill/>
@@ -6637,7 +6568,6 @@
           <a:buSzTx/>
           <a:buFontTx/>
           <a:buNone/>
-          <a:tabLst/>
           <a:defRPr kumimoji="0" sz="1800" b="0" i="0" u="none" strike="noStrike" cap="none" spc="0" normalizeH="0" baseline="0">
             <a:ln>
               <a:noFill/>
@@ -6663,7 +6593,6 @@
           <a:buSzTx/>
           <a:buFontTx/>
           <a:buNone/>
-          <a:tabLst/>
           <a:defRPr kumimoji="0" sz="1800" b="0" i="0" u="none" strike="noStrike" cap="none" spc="0" normalizeH="0" baseline="0">
             <a:ln>
               <a:noFill/>
@@ -6689,7 +6618,6 @@
           <a:buSzTx/>
           <a:buFontTx/>
           <a:buNone/>
-          <a:tabLst/>
           <a:defRPr kumimoji="0" sz="1800" b="0" i="0" u="none" strike="noStrike" cap="none" spc="0" normalizeH="0" baseline="0">
             <a:ln>
               <a:noFill/>
@@ -6715,7 +6643,6 @@
           <a:buSzTx/>
           <a:buFontTx/>
           <a:buNone/>
-          <a:tabLst/>
           <a:defRPr kumimoji="0" sz="1800" b="0" i="0" u="none" strike="noStrike" cap="none" spc="0" normalizeH="0" baseline="0">
             <a:ln>
               <a:noFill/>
@@ -6741,7 +6668,6 @@
           <a:buSzTx/>
           <a:buFontTx/>
           <a:buNone/>
-          <a:tabLst/>
           <a:defRPr kumimoji="0" sz="1800" b="0" i="0" u="none" strike="noStrike" cap="none" spc="0" normalizeH="0" baseline="0">
             <a:ln>
               <a:noFill/>
@@ -6767,7 +6693,6 @@
           <a:buSzTx/>
           <a:buFontTx/>
           <a:buNone/>
-          <a:tabLst/>
           <a:defRPr kumimoji="0" sz="1800" b="0" i="0" u="none" strike="noStrike" cap="none" spc="0" normalizeH="0" baseline="0">
             <a:ln>
               <a:noFill/>
@@ -6793,7 +6718,6 @@
           <a:buSzTx/>
           <a:buFontTx/>
           <a:buNone/>
-          <a:tabLst/>
           <a:defRPr kumimoji="0" sz="1800" b="0" i="0" u="none" strike="noStrike" cap="none" spc="0" normalizeH="0" baseline="0">
             <a:ln>
               <a:noFill/>
@@ -6819,7 +6743,6 @@
           <a:buSzTx/>
           <a:buFontTx/>
           <a:buNone/>
-          <a:tabLst/>
           <a:defRPr kumimoji="0" sz="1800" b="0" i="0" u="none" strike="noStrike" cap="none" spc="0" normalizeH="0" baseline="0">
             <a:ln>
               <a:noFill/>
@@ -6845,7 +6768,6 @@
           <a:buSzTx/>
           <a:buFontTx/>
           <a:buNone/>
-          <a:tabLst/>
           <a:defRPr kumimoji="0" sz="1800" b="0" i="0" u="none" strike="noStrike" cap="none" spc="0" normalizeH="0" baseline="0">
             <a:ln>
               <a:noFill/>
@@ -6873,6 +6795,11 @@
     </a:txDef>
   </a:objectDefaults>
   <a:extraClrSchemeLst/>
+  <a:extLst>
+    <a:ext uri="{05A4C25C-085E-4340-85A3-A5531E510DB2}">
+      <thm15:themeFamily xmlns:thm15="http://schemas.microsoft.com/office/thememl/2012/main" name="Office Theme" id="{62F939B6-93AF-4DB8-9C6B-D6C7DFDC589F}" vid="{4A3C46E8-61CC-4603-A589-7422A47A8E4A}"/>
+    </a:ext>
+  </a:extLst>
 </a:theme>
 </file>
 
@@ -7076,7 +7003,6 @@
           <a:prstDash val="solid"/>
           <a:bevel/>
         </a:ln>
-        <a:effectLst/>
       </a:spPr>
       <a:bodyPr rot="0" spcFirstLastPara="1" vertOverflow="overflow" horzOverflow="overflow" vert="horz" wrap="square" lIns="45718" tIns="45718" rIns="45718" bIns="45718" numCol="1" spcCol="38100" rtlCol="0" anchor="ctr">
         <a:spAutoFit/>
@@ -7096,7 +7022,6 @@
           <a:buSzTx/>
           <a:buFontTx/>
           <a:buNone/>
-          <a:tabLst/>
           <a:defRPr kumimoji="0" sz="1800" b="0" i="0" u="none" strike="noStrike" cap="none" spc="0" normalizeH="0" baseline="0">
             <a:ln>
               <a:noFill/>
@@ -7126,7 +7051,6 @@
           <a:buSzTx/>
           <a:buFontTx/>
           <a:buNone/>
-          <a:tabLst/>
           <a:defRPr kumimoji="0" sz="1800" b="0" i="0" u="none" strike="noStrike" cap="none" spc="0" normalizeH="0" baseline="0">
             <a:ln>
               <a:noFill/>
@@ -7152,7 +7076,6 @@
           <a:buSzTx/>
           <a:buFontTx/>
           <a:buNone/>
-          <a:tabLst/>
           <a:defRPr kumimoji="0" sz="1800" b="0" i="0" u="none" strike="noStrike" cap="none" spc="0" normalizeH="0" baseline="0">
             <a:ln>
               <a:noFill/>
@@ -7178,7 +7101,6 @@
           <a:buSzTx/>
           <a:buFontTx/>
           <a:buNone/>
-          <a:tabLst/>
           <a:defRPr kumimoji="0" sz="1800" b="0" i="0" u="none" strike="noStrike" cap="none" spc="0" normalizeH="0" baseline="0">
             <a:ln>
               <a:noFill/>
@@ -7204,7 +7126,6 @@
           <a:buSzTx/>
           <a:buFontTx/>
           <a:buNone/>
-          <a:tabLst/>
           <a:defRPr kumimoji="0" sz="1800" b="0" i="0" u="none" strike="noStrike" cap="none" spc="0" normalizeH="0" baseline="0">
             <a:ln>
               <a:noFill/>
@@ -7230,7 +7151,6 @@
           <a:buSzTx/>
           <a:buFontTx/>
           <a:buNone/>
-          <a:tabLst/>
           <a:defRPr kumimoji="0" sz="1800" b="0" i="0" u="none" strike="noStrike" cap="none" spc="0" normalizeH="0" baseline="0">
             <a:ln>
               <a:noFill/>
@@ -7256,7 +7176,6 @@
           <a:buSzTx/>
           <a:buFontTx/>
           <a:buNone/>
-          <a:tabLst/>
           <a:defRPr kumimoji="0" sz="1800" b="0" i="0" u="none" strike="noStrike" cap="none" spc="0" normalizeH="0" baseline="0">
             <a:ln>
               <a:noFill/>
@@ -7282,7 +7201,6 @@
           <a:buSzTx/>
           <a:buFontTx/>
           <a:buNone/>
-          <a:tabLst/>
           <a:defRPr kumimoji="0" sz="1800" b="0" i="0" u="none" strike="noStrike" cap="none" spc="0" normalizeH="0" baseline="0">
             <a:ln>
               <a:noFill/>
@@ -7308,7 +7226,6 @@
           <a:buSzTx/>
           <a:buFontTx/>
           <a:buNone/>
-          <a:tabLst/>
           <a:defRPr kumimoji="0" sz="1800" b="0" i="0" u="none" strike="noStrike" cap="none" spc="0" normalizeH="0" baseline="0">
             <a:ln>
               <a:noFill/>
@@ -7334,7 +7251,6 @@
           <a:buSzTx/>
           <a:buFontTx/>
           <a:buNone/>
-          <a:tabLst/>
           <a:defRPr kumimoji="0" sz="1800" b="0" i="0" u="none" strike="noStrike" cap="none" spc="0" normalizeH="0" baseline="0">
             <a:ln>
               <a:noFill/>
@@ -7370,7 +7286,6 @@
           <a:prstDash val="solid"/>
           <a:bevel/>
         </a:ln>
-        <a:effectLst/>
       </a:spPr>
       <a:bodyPr rot="0" spcFirstLastPara="1" vertOverflow="overflow" horzOverflow="overflow" vert="horz" wrap="square" lIns="91439" tIns="45719" rIns="91439" bIns="45719" numCol="1" spcCol="38100" rtlCol="0" anchor="t">
         <a:noAutofit/>
@@ -7390,7 +7305,6 @@
           <a:buSzTx/>
           <a:buFontTx/>
           <a:buNone/>
-          <a:tabLst/>
           <a:defRPr kumimoji="0" sz="1800" b="0" i="0" u="none" strike="noStrike" cap="none" spc="0" normalizeH="0" baseline="0">
             <a:ln>
               <a:noFill/>
@@ -7416,7 +7330,6 @@
           <a:buSzTx/>
           <a:buFontTx/>
           <a:buNone/>
-          <a:tabLst/>
           <a:defRPr kumimoji="0" sz="1800" b="0" i="0" u="none" strike="noStrike" cap="none" spc="0" normalizeH="0" baseline="0">
             <a:ln>
               <a:noFill/>
@@ -7442,7 +7355,6 @@
           <a:buSzTx/>
           <a:buFontTx/>
           <a:buNone/>
-          <a:tabLst/>
           <a:defRPr kumimoji="0" sz="1800" b="0" i="0" u="none" strike="noStrike" cap="none" spc="0" normalizeH="0" baseline="0">
             <a:ln>
               <a:noFill/>
@@ -7468,7 +7380,6 @@
           <a:buSzTx/>
           <a:buFontTx/>
           <a:buNone/>
-          <a:tabLst/>
           <a:defRPr kumimoji="0" sz="1800" b="0" i="0" u="none" strike="noStrike" cap="none" spc="0" normalizeH="0" baseline="0">
             <a:ln>
               <a:noFill/>
@@ -7494,7 +7405,6 @@
           <a:buSzTx/>
           <a:buFontTx/>
           <a:buNone/>
-          <a:tabLst/>
           <a:defRPr kumimoji="0" sz="1800" b="0" i="0" u="none" strike="noStrike" cap="none" spc="0" normalizeH="0" baseline="0">
             <a:ln>
               <a:noFill/>
@@ -7520,7 +7430,6 @@
           <a:buSzTx/>
           <a:buFontTx/>
           <a:buNone/>
-          <a:tabLst/>
           <a:defRPr kumimoji="0" sz="1800" b="0" i="0" u="none" strike="noStrike" cap="none" spc="0" normalizeH="0" baseline="0">
             <a:ln>
               <a:noFill/>
@@ -7546,7 +7455,6 @@
           <a:buSzTx/>
           <a:buFontTx/>
           <a:buNone/>
-          <a:tabLst/>
           <a:defRPr kumimoji="0" sz="1800" b="0" i="0" u="none" strike="noStrike" cap="none" spc="0" normalizeH="0" baseline="0">
             <a:ln>
               <a:noFill/>
@@ -7572,7 +7480,6 @@
           <a:buSzTx/>
           <a:buFontTx/>
           <a:buNone/>
-          <a:tabLst/>
           <a:defRPr kumimoji="0" sz="1800" b="0" i="0" u="none" strike="noStrike" cap="none" spc="0" normalizeH="0" baseline="0">
             <a:ln>
               <a:noFill/>
@@ -7598,7 +7505,6 @@
           <a:buSzTx/>
           <a:buFontTx/>
           <a:buNone/>
-          <a:tabLst/>
           <a:defRPr kumimoji="0" sz="1800" b="0" i="0" u="none" strike="noStrike" cap="none" spc="0" normalizeH="0" baseline="0">
             <a:ln>
               <a:noFill/>
@@ -7624,7 +7530,6 @@
           <a:buSzTx/>
           <a:buFontTx/>
           <a:buNone/>
-          <a:tabLst/>
           <a:defRPr kumimoji="0" sz="1800" b="0" i="0" u="none" strike="noStrike" cap="none" spc="0" normalizeH="0" baseline="0">
             <a:ln>
               <a:noFill/>
@@ -7657,7 +7562,6 @@
           <a:noFill/>
           <a:miter lim="400000"/>
         </a:ln>
-        <a:effectLst/>
       </a:spPr>
       <a:bodyPr rot="0" spcFirstLastPara="1" vertOverflow="overflow" horzOverflow="overflow" vert="horz" wrap="square" lIns="45718" tIns="45718" rIns="45718" bIns="45718" numCol="1" spcCol="38100" rtlCol="0" anchor="t">
         <a:spAutoFit/>
@@ -7677,7 +7581,6 @@
           <a:buSzTx/>
           <a:buFontTx/>
           <a:buNone/>
-          <a:tabLst/>
           <a:defRPr kumimoji="0" sz="1800" b="0" i="0" u="none" strike="noStrike" cap="none" spc="0" normalizeH="0" baseline="0">
             <a:ln>
               <a:noFill/>
@@ -7707,7 +7610,6 @@
           <a:buSzTx/>
           <a:buFontTx/>
           <a:buNone/>
-          <a:tabLst/>
           <a:defRPr kumimoji="0" sz="1800" b="0" i="0" u="none" strike="noStrike" cap="none" spc="0" normalizeH="0" baseline="0">
             <a:ln>
               <a:noFill/>
@@ -7733,7 +7635,6 @@
           <a:buSzTx/>
           <a:buFontTx/>
           <a:buNone/>
-          <a:tabLst/>
           <a:defRPr kumimoji="0" sz="1800" b="0" i="0" u="none" strike="noStrike" cap="none" spc="0" normalizeH="0" baseline="0">
             <a:ln>
               <a:noFill/>
@@ -7759,7 +7660,6 @@
           <a:buSzTx/>
           <a:buFontTx/>
           <a:buNone/>
-          <a:tabLst/>
           <a:defRPr kumimoji="0" sz="1800" b="0" i="0" u="none" strike="noStrike" cap="none" spc="0" normalizeH="0" baseline="0">
             <a:ln>
               <a:noFill/>
@@ -7785,7 +7685,6 @@
           <a:buSzTx/>
           <a:buFontTx/>
           <a:buNone/>
-          <a:tabLst/>
           <a:defRPr kumimoji="0" sz="1800" b="0" i="0" u="none" strike="noStrike" cap="none" spc="0" normalizeH="0" baseline="0">
             <a:ln>
               <a:noFill/>
@@ -7811,7 +7710,6 @@
           <a:buSzTx/>
           <a:buFontTx/>
           <a:buNone/>
-          <a:tabLst/>
           <a:defRPr kumimoji="0" sz="1800" b="0" i="0" u="none" strike="noStrike" cap="none" spc="0" normalizeH="0" baseline="0">
             <a:ln>
               <a:noFill/>
@@ -7837,7 +7735,6 @@
           <a:buSzTx/>
           <a:buFontTx/>
           <a:buNone/>
-          <a:tabLst/>
           <a:defRPr kumimoji="0" sz="1800" b="0" i="0" u="none" strike="noStrike" cap="none" spc="0" normalizeH="0" baseline="0">
             <a:ln>
               <a:noFill/>
@@ -7863,7 +7760,6 @@
           <a:buSzTx/>
           <a:buFontTx/>
           <a:buNone/>
-          <a:tabLst/>
           <a:defRPr kumimoji="0" sz="1800" b="0" i="0" u="none" strike="noStrike" cap="none" spc="0" normalizeH="0" baseline="0">
             <a:ln>
               <a:noFill/>
@@ -7889,7 +7785,6 @@
           <a:buSzTx/>
           <a:buFontTx/>
           <a:buNone/>
-          <a:tabLst/>
           <a:defRPr kumimoji="0" sz="1800" b="0" i="0" u="none" strike="noStrike" cap="none" spc="0" normalizeH="0" baseline="0">
             <a:ln>
               <a:noFill/>
@@ -7915,7 +7810,6 @@
           <a:buSzTx/>
           <a:buFontTx/>
           <a:buNone/>
-          <a:tabLst/>
           <a:defRPr kumimoji="0" sz="1800" b="0" i="0" u="none" strike="noStrike" cap="none" spc="0" normalizeH="0" baseline="0">
             <a:ln>
               <a:noFill/>
@@ -7943,5 +7837,10 @@
     </a:txDef>
   </a:objectDefaults>
   <a:extraClrSchemeLst/>
+  <a:extLst>
+    <a:ext uri="{05A4C25C-085E-4340-85A3-A5531E510DB2}">
+      <thm15:themeFamily xmlns:thm15="http://schemas.microsoft.com/office/thememl/2012/main" name="Office Theme" id="{62F939B6-93AF-4DB8-9C6B-D6C7DFDC589F}" vid="{4A3C46E8-61CC-4603-A589-7422A47A8E4A}"/>
+    </a:ext>
+  </a:extLst>
 </a:theme>
 </file>
</xml_diff>

<commit_message>
Completed and prepared presentations
</commit_message>
<xml_diff>
--- a/2016/graph_recommender_presentation_20161219/Graph_Recommender_Presentation.pptx
+++ b/2016/graph_recommender_presentation_20161219/Graph_Recommender_Presentation.pptx
@@ -5,19 +5,21 @@
     <p:sldMasterId id="2147483648" r:id="rId1"/>
   </p:sldMasterIdLst>
   <p:notesMasterIdLst>
-    <p:notesMasterId r:id="rId4"/>
+    <p:notesMasterId r:id="rId16"/>
   </p:notesMasterIdLst>
   <p:sldIdLst>
-    <p:sldId id="290" r:id="rId3"/>
-    <p:sldId id="289" r:id="rId5"/>
-    <p:sldId id="304" r:id="rId6"/>
-    <p:sldId id="300" r:id="rId7"/>
-    <p:sldId id="305" r:id="rId8"/>
-    <p:sldId id="292" r:id="rId9"/>
-    <p:sldId id="306" r:id="rId10"/>
-    <p:sldId id="307" r:id="rId11"/>
-    <p:sldId id="308" r:id="rId12"/>
-    <p:sldId id="309" r:id="rId13"/>
+    <p:sldId id="290" r:id="rId2"/>
+    <p:sldId id="289" r:id="rId3"/>
+    <p:sldId id="304" r:id="rId4"/>
+    <p:sldId id="300" r:id="rId5"/>
+    <p:sldId id="305" r:id="rId6"/>
+    <p:sldId id="292" r:id="rId7"/>
+    <p:sldId id="306" r:id="rId8"/>
+    <p:sldId id="309" r:id="rId9"/>
+    <p:sldId id="307" r:id="rId10"/>
+    <p:sldId id="308" r:id="rId11"/>
+    <p:sldId id="311" r:id="rId12"/>
+    <p:sldId id="312" r:id="rId13"/>
     <p:sldId id="310" r:id="rId14"/>
     <p:sldId id="261" r:id="rId15"/>
   </p:sldIdLst>
@@ -97,6 +99,14 @@
       </a:defRPr>
     </a:lvl9pPr>
   </p:defaultTextStyle>
+  <p:extLst>
+    <p:ext uri="{EFAFB233-063F-42B5-8137-9DF3F51BA10A}">
+      <p15:sldGuideLst xmlns:p15="http://schemas.microsoft.com/office/powerpoint/2012/main"/>
+    </p:ext>
+    <p:ext uri="{2D200454-40CA-4A62-9FC3-DE9A4176ACB9}">
+      <p15:notesGuideLst xmlns:p15="http://schemas.microsoft.com/office/powerpoint/2012/main"/>
+    </p:ext>
+  </p:extLst>
 </p:presentation>
 </file>
 
@@ -146,6 +156,7 @@
           <a:lstStyle/>
           <a:p>
             <a:pPr lvl="0"/>
+            <a:endParaRPr/>
           </a:p>
         </p:txBody>
       </p:sp>
@@ -173,10 +184,16 @@
           <a:lstStyle/>
           <a:p>
             <a:pPr lvl="0"/>
+            <a:endParaRPr/>
           </a:p>
         </p:txBody>
       </p:sp>
     </p:spTree>
+    <p:extLst>
+      <p:ext uri="{BB962C8B-B14F-4D97-AF65-F5344CB8AC3E}">
+        <p14:creationId xmlns:p14="http://schemas.microsoft.com/office/powerpoint/2010/main" val="3487133758"/>
+      </p:ext>
+    </p:extLst>
   </p:cSld>
   <p:clrMap bg1="lt1" tx1="dk1" bg2="lt2" tx2="dk2" accent1="accent1" accent2="accent2" accent3="accent3" accent4="accent4" accent5="accent5" accent6="accent6" hlink="hlink" folHlink="folHlink"/>
   <p:notesStyle>
@@ -320,6 +337,7 @@
           <a:lstStyle/>
           <a:p>
             <a:pPr lvl="0"/>
+            <a:endParaRPr/>
           </a:p>
         </p:txBody>
       </p:sp>
@@ -372,6 +390,11 @@
         </p:txBody>
       </p:sp>
     </p:spTree>
+    <p:extLst>
+      <p:ext uri="{BB962C8B-B14F-4D97-AF65-F5344CB8AC3E}">
+        <p14:creationId xmlns:p14="http://schemas.microsoft.com/office/powerpoint/2010/main" val="180768797"/>
+      </p:ext>
+    </p:extLst>
   </p:cSld>
   <p:clrMapOvr>
     <a:masterClrMapping/>
@@ -428,6 +451,11 @@
         </p:txBody>
       </p:sp>
     </p:spTree>
+    <p:extLst>
+      <p:ext uri="{BB962C8B-B14F-4D97-AF65-F5344CB8AC3E}">
+        <p14:creationId xmlns:p14="http://schemas.microsoft.com/office/powerpoint/2010/main" val="1607572459"/>
+      </p:ext>
+    </p:extLst>
   </p:cSld>
   <p:clrMapOvr>
     <a:masterClrMapping/>
@@ -487,6 +515,11 @@
         </p:txBody>
       </p:sp>
     </p:spTree>
+    <p:extLst>
+      <p:ext uri="{BB962C8B-B14F-4D97-AF65-F5344CB8AC3E}">
+        <p14:creationId xmlns:p14="http://schemas.microsoft.com/office/powerpoint/2010/main" val="4087290917"/>
+      </p:ext>
+    </p:extLst>
   </p:cSld>
   <p:clrMapOvr>
     <a:masterClrMapping/>
@@ -546,6 +579,11 @@
         </p:txBody>
       </p:sp>
     </p:spTree>
+    <p:extLst>
+      <p:ext uri="{BB962C8B-B14F-4D97-AF65-F5344CB8AC3E}">
+        <p14:creationId xmlns:p14="http://schemas.microsoft.com/office/powerpoint/2010/main" val="3992965522"/>
+      </p:ext>
+    </p:extLst>
   </p:cSld>
   <p:clrMapOvr>
     <a:masterClrMapping/>
@@ -606,6 +644,11 @@
         </p:txBody>
       </p:sp>
     </p:spTree>
+    <p:extLst>
+      <p:ext uri="{BB962C8B-B14F-4D97-AF65-F5344CB8AC3E}">
+        <p14:creationId xmlns:p14="http://schemas.microsoft.com/office/powerpoint/2010/main" val="1678300488"/>
+      </p:ext>
+    </p:extLst>
   </p:cSld>
   <p:clrMapOvr>
     <a:masterClrMapping/>
@@ -650,6 +693,7 @@
           <a:lstStyle/>
           <a:p>
             <a:pPr lvl="0"/>
+            <a:endParaRPr/>
           </a:p>
         </p:txBody>
       </p:sp>
@@ -693,6 +737,11 @@
         </p:txBody>
       </p:sp>
     </p:spTree>
+    <p:extLst>
+      <p:ext uri="{BB962C8B-B14F-4D97-AF65-F5344CB8AC3E}">
+        <p14:creationId xmlns:p14="http://schemas.microsoft.com/office/powerpoint/2010/main" val="510732966"/>
+      </p:ext>
+    </p:extLst>
   </p:cSld>
   <p:clrMapOvr>
     <a:masterClrMapping/>
@@ -901,11 +950,6 @@
               </a:rPr>
               <a:t>Textmasterformat bearbeiten</a:t>
             </a:r>
-            <a:endParaRPr sz="3200">
-              <a:solidFill>
-                <a:srgbClr val="17375E"/>
-              </a:solidFill>
-            </a:endParaRPr>
           </a:p>
           <a:p>
             <a:pPr lvl="1">
@@ -923,11 +967,6 @@
               </a:rPr>
               <a:t>Zweite Ebene</a:t>
             </a:r>
-            <a:endParaRPr sz="3200">
-              <a:solidFill>
-                <a:srgbClr val="17375E"/>
-              </a:solidFill>
-            </a:endParaRPr>
           </a:p>
           <a:p>
             <a:pPr lvl="2">
@@ -945,11 +984,6 @@
               </a:rPr>
               <a:t>Dritte Ebene</a:t>
             </a:r>
-            <a:endParaRPr sz="3200">
-              <a:solidFill>
-                <a:srgbClr val="17375E"/>
-              </a:solidFill>
-            </a:endParaRPr>
           </a:p>
           <a:p>
             <a:pPr lvl="3">
@@ -967,11 +1001,6 @@
               </a:rPr>
               <a:t>Vierte Ebene</a:t>
             </a:r>
-            <a:endParaRPr sz="3200">
-              <a:solidFill>
-                <a:srgbClr val="17375E"/>
-              </a:solidFill>
-            </a:endParaRPr>
           </a:p>
           <a:p>
             <a:pPr lvl="4">
@@ -1054,6 +1083,7 @@
             <a:pPr lvl="0" defTabSz="457200">
               <a:defRPr sz="1200"/>
             </a:pPr>
+            <a:endParaRPr/>
           </a:p>
         </p:txBody>
       </p:sp>
@@ -1288,8 +1318,8 @@
         </p:nvSpPr>
         <p:spPr>
           <a:xfrm>
-            <a:off x="0" y="0"/>
-            <a:ext cx="6345049" cy="427420"/>
+            <a:off x="693964" y="0"/>
+            <a:ext cx="6743700" cy="427420"/>
           </a:xfrm>
           <a:prstGeom prst="rect">
             <a:avLst/>
@@ -1428,7 +1458,7 @@
               <a:buNone/>
             </a:pPr>
             <a:r>
-              <a:rPr kumimoji="0" lang="en-US" sz="1200" b="1" i="0" u="none" strike="noStrike" cap="none" spc="0" normalizeH="0" baseline="0" dirty="0">
+              <a:rPr kumimoji="0" lang="en-US" sz="1200" b="1" i="0" u="none" strike="noStrike" cap="none" spc="0" normalizeH="0" baseline="0" dirty="0" smtClean="0">
                 <a:ln>
                   <a:noFill/>
                 </a:ln>
@@ -1444,8 +1474,24 @@
                 <a:cs typeface="+mj-cs"/>
                 <a:sym typeface="Helvetica"/>
               </a:rPr>
-              <a:t>Bernd Malle &lt;b.malle@hci-kdd.org&gt;</a:t>
-            </a:r>
+              <a:t>Holzinger Group</a:t>
+            </a:r>
+            <a:endParaRPr kumimoji="0" lang="en-US" sz="1200" b="1" i="0" u="none" strike="noStrike" cap="none" spc="0" normalizeH="0" baseline="0" dirty="0">
+              <a:ln>
+                <a:noFill/>
+              </a:ln>
+              <a:solidFill>
+                <a:schemeClr val="accent1">
+                  <a:lumMod val="50000"/>
+                </a:schemeClr>
+              </a:solidFill>
+              <a:effectLst/>
+              <a:uFillTx/>
+              <a:latin typeface="+mj-lt"/>
+              <a:ea typeface="+mj-ea"/>
+              <a:cs typeface="+mj-cs"/>
+              <a:sym typeface="Helvetica"/>
+            </a:endParaRPr>
           </a:p>
         </p:txBody>
       </p:sp>
@@ -1550,7 +1596,7 @@
           <p:nvPr userDrawn="1"/>
         </p:nvPicPr>
         <p:blipFill>
-          <a:blip r:embed="rId3" cstate="print">
+          <a:blip r:embed="rId4" cstate="print">
             <a:extLst>
               <a:ext uri="{28A0092B-C50C-407E-A947-70E740481C1C}">
                 <a14:useLocalDpi xmlns:a14="http://schemas.microsoft.com/office/drawing/2010/main" val="0"/>
@@ -1563,7 +1609,7 @@
         </p:blipFill>
         <p:spPr>
           <a:xfrm>
-            <a:off x="6768201" y="-115925"/>
+            <a:off x="7545509" y="-121990"/>
             <a:ext cx="1311354" cy="601680"/>
           </a:xfrm>
           <a:prstGeom prst="rect">
@@ -1580,14 +1626,14 @@
           <p:nvPr userDrawn="1"/>
         </p:nvPicPr>
         <p:blipFill>
-          <a:blip r:embed="rId4"/>
+          <a:blip r:embed="rId5"/>
           <a:stretch>
             <a:fillRect/>
           </a:stretch>
         </p:blipFill>
         <p:spPr>
           <a:xfrm>
-            <a:off x="8237361" y="1140"/>
+            <a:off x="64557" y="0"/>
             <a:ext cx="412510" cy="357701"/>
           </a:xfrm>
           <a:prstGeom prst="rect">
@@ -2039,14 +2085,6 @@
               </a:rPr>
               <a:t>, 2016-12-19</a:t>
             </a:r>
-            <a:endParaRPr lang="en-US" sz="2400" b="1" dirty="0">
-              <a:solidFill>
-                <a:srgbClr val="1F497D"/>
-              </a:solidFill>
-              <a:latin typeface="Calibri"/>
-              <a:ea typeface="Calibri"/>
-              <a:cs typeface="Calibri"/>
-            </a:endParaRPr>
           </a:p>
           <a:p>
             <a:pPr algn="ctr"/>
@@ -2130,15 +2168,6 @@
               </a:rPr>
               <a:t>Bernd Malle, PhD Student</a:t>
             </a:r>
-            <a:endParaRPr lang="en-US" sz="2400" b="1" dirty="0">
-              <a:solidFill>
-                <a:srgbClr val="1F497D"/>
-              </a:solidFill>
-              <a:latin typeface="Calibri"/>
-              <a:ea typeface="Calibri"/>
-              <a:cs typeface="Calibri"/>
-              <a:sym typeface="Calibri"/>
-            </a:endParaRPr>
           </a:p>
           <a:p>
             <a:pPr lvl="0" algn="ctr"/>
@@ -2202,15 +2231,6 @@
               </a:rPr>
               <a:t>Student</a:t>
             </a:r>
-            <a:endParaRPr lang="en-US" sz="2400" b="1" dirty="0">
-              <a:solidFill>
-                <a:srgbClr val="1F497D"/>
-              </a:solidFill>
-              <a:latin typeface="Calibri"/>
-              <a:ea typeface="Calibri"/>
-              <a:cs typeface="Calibri"/>
-              <a:sym typeface="Calibri"/>
-            </a:endParaRPr>
           </a:p>
           <a:p>
             <a:pPr lvl="0" algn="ctr"/>
@@ -2275,7 +2295,7 @@
                 <a:latin typeface="+mn-lt"/>
                 <a:ea typeface="+mn-ea"/>
                 <a:cs typeface="+mn-cs"/>
-                <a:hlinkClick r:id="rId1"/>
+                <a:hlinkClick r:id="rId3"/>
               </a:rPr>
               <a:t>b.malle@hci-kdd.org</a:t>
             </a:r>
@@ -2294,7 +2314,7 @@
             <a:pPr algn="ctr"/>
             <a:r>
               <a:rPr lang="en-US" sz="2400" b="1" u="sng" dirty="0">
-                <a:hlinkClick r:id="rId2"/>
+                <a:hlinkClick r:id="rId4"/>
               </a:rPr>
               <a:t>b.gansinger@hci-kdd.org</a:t>
             </a:r>
@@ -2320,7 +2340,7 @@
           <p:nvPr/>
         </p:nvPicPr>
         <p:blipFill>
-          <a:blip r:embed="rId3">
+          <a:blip r:embed="rId5">
             <a:extLst>
               <a:ext uri="{28A0092B-C50C-407E-A947-70E740481C1C}">
                 <a14:useLocalDpi xmlns:a14="http://schemas.microsoft.com/office/drawing/2010/main" val="0"/>
@@ -2333,7 +2353,7 @@
         </p:blipFill>
         <p:spPr>
           <a:xfrm>
-            <a:off x="1201117" y="4023930"/>
+            <a:off x="1333500" y="3983355"/>
             <a:ext cx="3238500" cy="1485900"/>
           </a:xfrm>
           <a:prstGeom prst="rect">
@@ -2350,7 +2370,7 @@
           <p:nvPr userDrawn="1"/>
         </p:nvPicPr>
         <p:blipFill>
-          <a:blip r:embed="rId4"/>
+          <a:blip r:embed="rId6"/>
           <a:stretch>
             <a:fillRect/>
           </a:stretch>
@@ -2546,7 +2566,440 @@
                   </a:schemeClr>
                 </a:solidFill>
               </a:rPr>
-              <a:t>Graph recommender algorithm</a:t>
+              <a:t>Enriching anonymized graphs </a:t>
+            </a:r>
+            <a:r>
+              <a:rPr lang="en-US" sz="2400" dirty="0" smtClean="0">
+                <a:solidFill>
+                  <a:schemeClr val="accent1">
+                    <a:lumMod val="50000"/>
+                  </a:schemeClr>
+                </a:solidFill>
+              </a:rPr>
+              <a:t>1/2</a:t>
+            </a:r>
+            <a:endParaRPr lang="en-US" sz="2400" dirty="0">
+              <a:solidFill>
+                <a:schemeClr val="accent1">
+                  <a:lumMod val="50000"/>
+                </a:schemeClr>
+              </a:solidFill>
+            </a:endParaRPr>
+          </a:p>
+        </p:txBody>
+      </p:sp>
+      <p:pic>
+        <p:nvPicPr>
+          <p:cNvPr id="2" name="Picture 1"/>
+          <p:cNvPicPr>
+            <a:picLocks noChangeAspect="1"/>
+          </p:cNvPicPr>
+          <p:nvPr/>
+        </p:nvPicPr>
+        <p:blipFill>
+          <a:blip r:embed="rId2">
+            <a:extLst>
+              <a:ext uri="{28A0092B-C50C-407E-A947-70E740481C1C}">
+                <a14:useLocalDpi xmlns:a14="http://schemas.microsoft.com/office/drawing/2010/main" val="0"/>
+              </a:ext>
+            </a:extLst>
+          </a:blip>
+          <a:stretch>
+            <a:fillRect/>
+          </a:stretch>
+        </p:blipFill>
+        <p:spPr>
+          <a:xfrm>
+            <a:off x="261064" y="602079"/>
+            <a:ext cx="4791744" cy="2029108"/>
+          </a:xfrm>
+          <a:prstGeom prst="rect">
+            <a:avLst/>
+          </a:prstGeom>
+        </p:spPr>
+      </p:pic>
+      <p:pic>
+        <p:nvPicPr>
+          <p:cNvPr id="3" name="Picture 2"/>
+          <p:cNvPicPr>
+            <a:picLocks noChangeAspect="1"/>
+          </p:cNvPicPr>
+          <p:nvPr/>
+        </p:nvPicPr>
+        <p:blipFill>
+          <a:blip r:embed="rId3">
+            <a:extLst>
+              <a:ext uri="{28A0092B-C50C-407E-A947-70E740481C1C}">
+                <a14:useLocalDpi xmlns:a14="http://schemas.microsoft.com/office/drawing/2010/main" val="0"/>
+              </a:ext>
+            </a:extLst>
+          </a:blip>
+          <a:stretch>
+            <a:fillRect/>
+          </a:stretch>
+        </p:blipFill>
+        <p:spPr>
+          <a:xfrm>
+            <a:off x="3071004" y="3494459"/>
+            <a:ext cx="5855892" cy="2913343"/>
+          </a:xfrm>
+          <a:prstGeom prst="rect">
+            <a:avLst/>
+          </a:prstGeom>
+        </p:spPr>
+      </p:pic>
+      <p:pic>
+        <p:nvPicPr>
+          <p:cNvPr id="5" name="Picture 4"/>
+          <p:cNvPicPr>
+            <a:picLocks noChangeAspect="1"/>
+          </p:cNvPicPr>
+          <p:nvPr/>
+        </p:nvPicPr>
+        <p:blipFill>
+          <a:blip r:embed="rId4" cstate="print">
+            <a:extLst>
+              <a:ext uri="{28A0092B-C50C-407E-A947-70E740481C1C}">
+                <a14:useLocalDpi xmlns:a14="http://schemas.microsoft.com/office/drawing/2010/main" val="0"/>
+              </a:ext>
+            </a:extLst>
+          </a:blip>
+          <a:stretch>
+            <a:fillRect/>
+          </a:stretch>
+        </p:blipFill>
+        <p:spPr>
+          <a:xfrm>
+            <a:off x="5328210" y="742908"/>
+            <a:ext cx="1406698" cy="1747451"/>
+          </a:xfrm>
+          <a:prstGeom prst="rect">
+            <a:avLst/>
+          </a:prstGeom>
+        </p:spPr>
+      </p:pic>
+      <p:sp>
+        <p:nvSpPr>
+          <p:cNvPr id="7" name="Shape 141"/>
+          <p:cNvSpPr/>
+          <p:nvPr/>
+        </p:nvSpPr>
+        <p:spPr>
+          <a:xfrm rot="3541888">
+            <a:off x="3874796" y="2822727"/>
+            <a:ext cx="666387" cy="387927"/>
+          </a:xfrm>
+          <a:prstGeom prst="notchedRightArrow">
+            <a:avLst>
+              <a:gd name="adj1" fmla="val 50000"/>
+              <a:gd name="adj2" fmla="val 50000"/>
+            </a:avLst>
+          </a:prstGeom>
+          <a:solidFill>
+            <a:srgbClr val="FFFFFF"/>
+          </a:solidFill>
+          <a:ln w="25400" cap="flat" cmpd="sng">
+            <a:solidFill>
+              <a:srgbClr val="4F81BD"/>
+            </a:solidFill>
+            <a:prstDash val="solid"/>
+            <a:bevel/>
+            <a:headEnd type="none" w="med" len="med"/>
+            <a:tailEnd type="none" w="med" len="med"/>
+          </a:ln>
+        </p:spPr>
+        <p:txBody>
+          <a:bodyPr lIns="45700" tIns="45700" rIns="45700" bIns="45700" anchor="ctr" anchorCtr="0">
+            <a:noAutofit/>
+          </a:bodyPr>
+          <a:lstStyle/>
+          <a:p>
+            <a:pPr marL="0" marR="0" lvl="0" indent="0" algn="l" rtl="0">
+              <a:lnSpc>
+                <a:spcPct val="100000"/>
+              </a:lnSpc>
+              <a:spcBef>
+                <a:spcPts val="0"/>
+              </a:spcBef>
+              <a:spcAft>
+                <a:spcPts val="0"/>
+              </a:spcAft>
+              <a:buFont typeface="Helvetica Neue"/>
+              <a:buNone/>
+            </a:pPr>
+            <a:endParaRPr sz="1800" b="0" i="0" u="none" strike="noStrike" cap="none">
+              <a:solidFill>
+                <a:srgbClr val="000000"/>
+              </a:solidFill>
+              <a:latin typeface="Helvetica Neue"/>
+              <a:ea typeface="Helvetica Neue"/>
+              <a:cs typeface="Helvetica Neue"/>
+              <a:sym typeface="Helvetica Neue"/>
+            </a:endParaRPr>
+          </a:p>
+        </p:txBody>
+      </p:sp>
+      <p:sp>
+        <p:nvSpPr>
+          <p:cNvPr id="8" name="Shape 141"/>
+          <p:cNvSpPr/>
+          <p:nvPr/>
+        </p:nvSpPr>
+        <p:spPr>
+          <a:xfrm rot="3541888">
+            <a:off x="3348585" y="2822725"/>
+            <a:ext cx="666387" cy="387927"/>
+          </a:xfrm>
+          <a:prstGeom prst="notchedRightArrow">
+            <a:avLst>
+              <a:gd name="adj1" fmla="val 50000"/>
+              <a:gd name="adj2" fmla="val 50000"/>
+            </a:avLst>
+          </a:prstGeom>
+          <a:solidFill>
+            <a:srgbClr val="FFFFFF"/>
+          </a:solidFill>
+          <a:ln w="25400" cap="flat" cmpd="sng">
+            <a:solidFill>
+              <a:srgbClr val="4F81BD"/>
+            </a:solidFill>
+            <a:prstDash val="solid"/>
+            <a:bevel/>
+            <a:headEnd type="none" w="med" len="med"/>
+            <a:tailEnd type="none" w="med" len="med"/>
+          </a:ln>
+        </p:spPr>
+        <p:txBody>
+          <a:bodyPr lIns="45700" tIns="45700" rIns="45700" bIns="45700" anchor="ctr" anchorCtr="0">
+            <a:noAutofit/>
+          </a:bodyPr>
+          <a:lstStyle/>
+          <a:p>
+            <a:pPr marL="0" marR="0" lvl="0" indent="0" algn="l" rtl="0">
+              <a:lnSpc>
+                <a:spcPct val="100000"/>
+              </a:lnSpc>
+              <a:spcBef>
+                <a:spcPts val="0"/>
+              </a:spcBef>
+              <a:spcAft>
+                <a:spcPts val="0"/>
+              </a:spcAft>
+              <a:buFont typeface="Helvetica Neue"/>
+              <a:buNone/>
+            </a:pPr>
+            <a:endParaRPr sz="1800" b="0" i="0" u="none" strike="noStrike" cap="none">
+              <a:solidFill>
+                <a:srgbClr val="000000"/>
+              </a:solidFill>
+              <a:latin typeface="Helvetica Neue"/>
+              <a:ea typeface="Helvetica Neue"/>
+              <a:cs typeface="Helvetica Neue"/>
+              <a:sym typeface="Helvetica Neue"/>
+            </a:endParaRPr>
+          </a:p>
+        </p:txBody>
+      </p:sp>
+      <p:sp>
+        <p:nvSpPr>
+          <p:cNvPr id="10" name="Rectangle 9"/>
+          <p:cNvSpPr/>
+          <p:nvPr/>
+        </p:nvSpPr>
+        <p:spPr>
+          <a:xfrm>
+            <a:off x="6734908" y="473474"/>
+            <a:ext cx="938267" cy="2092881"/>
+          </a:xfrm>
+          <a:prstGeom prst="rect">
+            <a:avLst/>
+          </a:prstGeom>
+          <a:noFill/>
+        </p:spPr>
+        <p:txBody>
+          <a:bodyPr wrap="square" lIns="91440" tIns="45720" rIns="91440" bIns="45720">
+            <a:spAutoFit/>
+          </a:bodyPr>
+          <a:lstStyle/>
+          <a:p>
+            <a:pPr algn="ctr"/>
+            <a:r>
+              <a:rPr lang="en-US" sz="13000" b="1" cap="none" spc="0" dirty="0" smtClean="0">
+                <a:ln w="22225">
+                  <a:solidFill>
+                    <a:schemeClr val="accent2"/>
+                  </a:solidFill>
+                  <a:prstDash val="solid"/>
+                </a:ln>
+                <a:solidFill>
+                  <a:schemeClr val="accent2">
+                    <a:lumMod val="40000"/>
+                    <a:lumOff val="60000"/>
+                  </a:schemeClr>
+                </a:solidFill>
+                <a:effectLst/>
+              </a:rPr>
+              <a:t>?</a:t>
+            </a:r>
+            <a:endParaRPr lang="en-US" sz="13000" b="1" cap="none" spc="0" dirty="0">
+              <a:ln w="22225">
+                <a:solidFill>
+                  <a:schemeClr val="accent2"/>
+                </a:solidFill>
+                <a:prstDash val="solid"/>
+              </a:ln>
+              <a:solidFill>
+                <a:schemeClr val="accent2">
+                  <a:lumMod val="40000"/>
+                  <a:lumOff val="60000"/>
+                </a:schemeClr>
+              </a:solidFill>
+              <a:effectLst/>
+            </a:endParaRPr>
+          </a:p>
+        </p:txBody>
+      </p:sp>
+      <p:sp>
+        <p:nvSpPr>
+          <p:cNvPr id="11" name="TextBox 10"/>
+          <p:cNvSpPr txBox="1"/>
+          <p:nvPr/>
+        </p:nvSpPr>
+        <p:spPr>
+          <a:xfrm>
+            <a:off x="1867995" y="2807745"/>
+            <a:ext cx="5460520" cy="369328"/>
+          </a:xfrm>
+          <a:prstGeom prst="rect">
+            <a:avLst/>
+          </a:prstGeom>
+          <a:noFill/>
+          <a:ln w="12700" cap="flat">
+            <a:noFill/>
+            <a:miter lim="400000"/>
+          </a:ln>
+        </p:spPr>
+        <p:style>
+          <a:lnRef idx="0">
+            <a:scrgbClr r="0" g="0" b="0"/>
+          </a:lnRef>
+          <a:fillRef idx="0">
+            <a:scrgbClr r="0" g="0" b="0"/>
+          </a:fillRef>
+          <a:effectRef idx="0">
+            <a:scrgbClr r="0" g="0" b="0"/>
+          </a:effectRef>
+          <a:fontRef idx="none"/>
+        </p:style>
+        <p:txBody>
+          <a:bodyPr rot="0" spcFirstLastPara="1" vertOverflow="overflow" horzOverflow="overflow" vert="horz" wrap="square" lIns="45718" tIns="45718" rIns="45718" bIns="45718" numCol="1" spcCol="38100" rtlCol="0" anchor="t">
+            <a:spAutoFit/>
+          </a:bodyPr>
+          <a:lstStyle/>
+          <a:p>
+            <a:pPr marL="0" marR="0" indent="0" algn="l" defTabSz="914400" rtl="0" fontAlgn="auto" latinLnBrk="1" hangingPunct="0">
+              <a:lnSpc>
+                <a:spcPct val="100000"/>
+              </a:lnSpc>
+              <a:spcBef>
+                <a:spcPts val="0"/>
+              </a:spcBef>
+              <a:spcAft>
+                <a:spcPts val="0"/>
+              </a:spcAft>
+              <a:buClrTx/>
+              <a:buSzTx/>
+              <a:buFontTx/>
+              <a:buNone/>
+            </a:pPr>
+            <a:r>
+              <a:rPr kumimoji="0" lang="en-US" sz="1800" b="0" i="0" u="none" strike="noStrike" cap="none" spc="0" normalizeH="0" baseline="0" dirty="0" smtClean="0">
+                <a:ln>
+                  <a:noFill/>
+                </a:ln>
+                <a:solidFill>
+                  <a:srgbClr val="000000"/>
+                </a:solidFill>
+                <a:effectLst/>
+                <a:uFillTx/>
+                <a:latin typeface="+mj-lt"/>
+                <a:ea typeface="+mj-ea"/>
+                <a:cs typeface="+mj-cs"/>
+                <a:sym typeface="Helvetica"/>
+              </a:rPr>
+              <a:t>Random fake		data generator…?</a:t>
+            </a:r>
+            <a:endParaRPr kumimoji="0" lang="en-US" sz="1800" b="0" i="0" u="none" strike="noStrike" cap="none" spc="0" normalizeH="0" baseline="0" dirty="0">
+              <a:ln>
+                <a:noFill/>
+              </a:ln>
+              <a:solidFill>
+                <a:srgbClr val="000000"/>
+              </a:solidFill>
+              <a:effectLst/>
+              <a:uFillTx/>
+              <a:latin typeface="+mj-lt"/>
+              <a:ea typeface="+mj-ea"/>
+              <a:cs typeface="+mj-cs"/>
+              <a:sym typeface="Helvetica"/>
+            </a:endParaRPr>
+          </a:p>
+        </p:txBody>
+      </p:sp>
+      <p:pic>
+        <p:nvPicPr>
+          <p:cNvPr id="12" name="Picture 11"/>
+          <p:cNvPicPr>
+            <a:picLocks noChangeAspect="1"/>
+          </p:cNvPicPr>
+          <p:nvPr/>
+        </p:nvPicPr>
+        <p:blipFill>
+          <a:blip r:embed="rId5">
+            <a:extLst>
+              <a:ext uri="{28A0092B-C50C-407E-A947-70E740481C1C}">
+                <a14:useLocalDpi xmlns:a14="http://schemas.microsoft.com/office/drawing/2010/main" val="0"/>
+              </a:ext>
+            </a:extLst>
+          </a:blip>
+          <a:stretch>
+            <a:fillRect/>
+          </a:stretch>
+        </p:blipFill>
+        <p:spPr>
+          <a:xfrm>
+            <a:off x="1055195" y="4110317"/>
+            <a:ext cx="1625600" cy="1625600"/>
+          </a:xfrm>
+          <a:prstGeom prst="rect">
+            <a:avLst/>
+          </a:prstGeom>
+        </p:spPr>
+      </p:pic>
+      <p:sp>
+        <p:nvSpPr>
+          <p:cNvPr id="13" name="Rectangle 12"/>
+          <p:cNvSpPr/>
+          <p:nvPr/>
+        </p:nvSpPr>
+        <p:spPr>
+          <a:xfrm>
+            <a:off x="26255" y="5828181"/>
+            <a:ext cx="4572000" cy="246221"/>
+          </a:xfrm>
+          <a:prstGeom prst="rect">
+            <a:avLst/>
+          </a:prstGeom>
+        </p:spPr>
+        <p:txBody>
+          <a:bodyPr>
+            <a:spAutoFit/>
+          </a:bodyPr>
+          <a:lstStyle/>
+          <a:p>
+            <a:r>
+              <a:rPr lang="en-US" sz="1000" dirty="0"/>
+              <a:t>https://randomuser.me/api/portraits/women/68.jpg</a:t>
             </a:r>
           </a:p>
         </p:txBody>
@@ -2701,25 +3154,31 @@
             </a:lvl9pPr>
           </a:lstStyle>
           <a:p>
-            <a:r>
-              <a:rPr lang="en-US" sz="2400" dirty="0">
+            <a:pPr defTabSz="676275">
+              <a:spcBef>
+                <a:spcPts val="0"/>
+              </a:spcBef>
+              <a:spcAft>
+                <a:spcPts val="600"/>
+              </a:spcAft>
+              <a:buClr>
+                <a:srgbClr val="1F497D"/>
+              </a:buClr>
+              <a:defRPr sz="1800">
+                <a:solidFill>
+                  <a:srgbClr val="000000"/>
+                </a:solidFill>
+              </a:defRPr>
+            </a:pPr>
+            <a:r>
+              <a:rPr lang="en-US" sz="2400" dirty="0" smtClean="0">
                 <a:solidFill>
                   <a:schemeClr val="accent1">
                     <a:lumMod val="50000"/>
                   </a:schemeClr>
                 </a:solidFill>
               </a:rPr>
-              <a:t>Future </a:t>
-            </a:r>
-            <a:r>
-              <a:rPr lang="en-US" sz="2400" dirty="0" smtClean="0">
-                <a:solidFill>
-                  <a:schemeClr val="accent1">
-                    <a:lumMod val="50000"/>
-                  </a:schemeClr>
-                </a:solidFill>
-              </a:rPr>
-              <a:t>work</a:t>
+              <a:t>Enriching anonymized graphs 2/2</a:t>
             </a:r>
             <a:endParaRPr lang="en-US" sz="2400" dirty="0">
               <a:solidFill>
@@ -2731,202 +3190,300 @@
           </a:p>
         </p:txBody>
       </p:sp>
+      <p:pic>
+        <p:nvPicPr>
+          <p:cNvPr id="3" name="Picture 2"/>
+          <p:cNvPicPr>
+            <a:picLocks noChangeAspect="1"/>
+          </p:cNvPicPr>
+          <p:nvPr/>
+        </p:nvPicPr>
+        <p:blipFill>
+          <a:blip r:embed="rId2">
+            <a:extLst>
+              <a:ext uri="{28A0092B-C50C-407E-A947-70E740481C1C}">
+                <a14:useLocalDpi xmlns:a14="http://schemas.microsoft.com/office/drawing/2010/main" val="0"/>
+              </a:ext>
+            </a:extLst>
+          </a:blip>
+          <a:stretch>
+            <a:fillRect/>
+          </a:stretch>
+        </p:blipFill>
+        <p:spPr>
+          <a:xfrm>
+            <a:off x="2541757" y="3767233"/>
+            <a:ext cx="4925112" cy="952633"/>
+          </a:xfrm>
+          <a:prstGeom prst="rect">
+            <a:avLst/>
+          </a:prstGeom>
+        </p:spPr>
+      </p:pic>
       <p:sp>
         <p:nvSpPr>
-          <p:cNvPr id="3" name="Text Placeholder 2"/>
-          <p:cNvSpPr>
-            <a:spLocks noGrp="1"/>
-          </p:cNvSpPr>
-          <p:nvPr>
-            <p:ph type="body" idx="1"/>
-          </p:nvPr>
+          <p:cNvPr id="5" name="Shape 141"/>
+          <p:cNvSpPr/>
+          <p:nvPr/>
         </p:nvSpPr>
         <p:spPr>
-          <a:xfrm>
-            <a:off x="321276" y="914400"/>
-            <a:ext cx="8468497" cy="5272216"/>
+          <a:xfrm rot="3541888">
+            <a:off x="3232072" y="3142349"/>
+            <a:ext cx="666387" cy="387927"/>
           </a:xfrm>
+          <a:prstGeom prst="notchedRightArrow">
+            <a:avLst>
+              <a:gd name="adj1" fmla="val 50000"/>
+              <a:gd name="adj2" fmla="val 50000"/>
+            </a:avLst>
+          </a:prstGeom>
+          <a:solidFill>
+            <a:srgbClr val="FFFFFF"/>
+          </a:solidFill>
+          <a:ln w="25400" cap="flat" cmpd="sng">
+            <a:solidFill>
+              <a:srgbClr val="4F81BD"/>
+            </a:solidFill>
+            <a:prstDash val="solid"/>
+            <a:bevel/>
+            <a:headEnd type="none" w="med" len="med"/>
+            <a:tailEnd type="none" w="med" len="med"/>
+          </a:ln>
         </p:spPr>
         <p:txBody>
-          <a:bodyPr/>
+          <a:bodyPr lIns="45700" tIns="45700" rIns="45700" bIns="45700" anchor="ctr" anchorCtr="0">
+            <a:noAutofit/>
+          </a:bodyPr>
           <a:lstStyle/>
           <a:p>
-            <a:pPr marL="514350" indent="-514350" algn="l">
+            <a:pPr marL="0" marR="0" lvl="0" indent="0" algn="l" rtl="0">
+              <a:lnSpc>
+                <a:spcPct val="100000"/>
+              </a:lnSpc>
               <a:spcBef>
                 <a:spcPts val="0"/>
               </a:spcBef>
               <a:spcAft>
-                <a:spcPts val="1200"/>
+                <a:spcPts val="0"/>
               </a:spcAft>
-              <a:buFont typeface="+mj-lt"/>
-              <a:buAutoNum type="arabicPeriod"/>
-            </a:pPr>
-            <a:r>
-              <a:rPr lang="en-US" sz="2800" dirty="0" smtClean="0"/>
-              <a:t>Scaling of graph algorithm to real-sized DBs?</a:t>
-            </a:r>
-            <a:endParaRPr lang="en-US" sz="2800" dirty="0" smtClean="0"/>
-          </a:p>
-          <a:p>
-            <a:pPr marL="514350" indent="-514350" algn="l">
+              <a:buFont typeface="Helvetica Neue"/>
+              <a:buNone/>
+            </a:pPr>
+            <a:endParaRPr sz="1800" b="0" i="0" u="none" strike="noStrike" cap="none">
+              <a:solidFill>
+                <a:srgbClr val="000000"/>
+              </a:solidFill>
+              <a:latin typeface="Helvetica Neue"/>
+              <a:ea typeface="Helvetica Neue"/>
+              <a:cs typeface="Helvetica Neue"/>
+              <a:sym typeface="Helvetica Neue"/>
+            </a:endParaRPr>
+          </a:p>
+        </p:txBody>
+      </p:sp>
+      <p:sp>
+        <p:nvSpPr>
+          <p:cNvPr id="6" name="Shape 141"/>
+          <p:cNvSpPr/>
+          <p:nvPr/>
+        </p:nvSpPr>
+        <p:spPr>
+          <a:xfrm rot="3541888">
+            <a:off x="2705861" y="3142347"/>
+            <a:ext cx="666387" cy="387927"/>
+          </a:xfrm>
+          <a:prstGeom prst="notchedRightArrow">
+            <a:avLst>
+              <a:gd name="adj1" fmla="val 50000"/>
+              <a:gd name="adj2" fmla="val 50000"/>
+            </a:avLst>
+          </a:prstGeom>
+          <a:solidFill>
+            <a:srgbClr val="FFFFFF"/>
+          </a:solidFill>
+          <a:ln w="25400" cap="flat" cmpd="sng">
+            <a:solidFill>
+              <a:srgbClr val="4F81BD"/>
+            </a:solidFill>
+            <a:prstDash val="solid"/>
+            <a:bevel/>
+            <a:headEnd type="none" w="med" len="med"/>
+            <a:tailEnd type="none" w="med" len="med"/>
+          </a:ln>
+        </p:spPr>
+        <p:txBody>
+          <a:bodyPr lIns="45700" tIns="45700" rIns="45700" bIns="45700" anchor="ctr" anchorCtr="0">
+            <a:noAutofit/>
+          </a:bodyPr>
+          <a:lstStyle/>
+          <a:p>
+            <a:pPr marL="0" marR="0" lvl="0" indent="0" algn="l" rtl="0">
+              <a:lnSpc>
+                <a:spcPct val="100000"/>
+              </a:lnSpc>
               <a:spcBef>
                 <a:spcPts val="0"/>
               </a:spcBef>
               <a:spcAft>
-                <a:spcPts val="1200"/>
+                <a:spcPts val="0"/>
               </a:spcAft>
-              <a:buFont typeface="+mj-lt"/>
-              <a:buAutoNum type="arabicPeriod"/>
-            </a:pPr>
-            <a:r>
-              <a:rPr lang="en-US" sz="2800" dirty="0" smtClean="0"/>
-              <a:t>Implementation of local sphere idea?</a:t>
-            </a:r>
-            <a:endParaRPr lang="en-US" sz="2800" dirty="0" smtClean="0"/>
-          </a:p>
-          <a:p>
-            <a:pPr marL="514350" indent="-514350" algn="l">
+              <a:buFont typeface="Helvetica Neue"/>
+              <a:buNone/>
+            </a:pPr>
+            <a:endParaRPr sz="1800" b="0" i="0" u="none" strike="noStrike" cap="none">
+              <a:solidFill>
+                <a:srgbClr val="000000"/>
+              </a:solidFill>
+              <a:latin typeface="Helvetica Neue"/>
+              <a:ea typeface="Helvetica Neue"/>
+              <a:cs typeface="Helvetica Neue"/>
+              <a:sym typeface="Helvetica Neue"/>
+            </a:endParaRPr>
+          </a:p>
+        </p:txBody>
+      </p:sp>
+      <p:pic>
+        <p:nvPicPr>
+          <p:cNvPr id="7" name="Picture 6"/>
+          <p:cNvPicPr>
+            <a:picLocks noChangeAspect="1"/>
+          </p:cNvPicPr>
+          <p:nvPr/>
+        </p:nvPicPr>
+        <p:blipFill>
+          <a:blip r:embed="rId3">
+            <a:extLst>
+              <a:ext uri="{28A0092B-C50C-407E-A947-70E740481C1C}">
+                <a14:useLocalDpi xmlns:a14="http://schemas.microsoft.com/office/drawing/2010/main" val="0"/>
+              </a:ext>
+            </a:extLst>
+          </a:blip>
+          <a:stretch>
+            <a:fillRect/>
+          </a:stretch>
+        </p:blipFill>
+        <p:spPr>
+          <a:xfrm>
+            <a:off x="194888" y="828648"/>
+            <a:ext cx="6649378" cy="2076740"/>
+          </a:xfrm>
+          <a:prstGeom prst="rect">
+            <a:avLst/>
+          </a:prstGeom>
+        </p:spPr>
+      </p:pic>
+      <p:sp>
+        <p:nvSpPr>
+          <p:cNvPr id="8" name="TextBox 7"/>
+          <p:cNvSpPr txBox="1"/>
+          <p:nvPr/>
+        </p:nvSpPr>
+        <p:spPr>
+          <a:xfrm>
+            <a:off x="482001" y="5104659"/>
+            <a:ext cx="8015018" cy="954103"/>
+          </a:xfrm>
+          <a:prstGeom prst="rect">
+            <a:avLst/>
+          </a:prstGeom>
+          <a:noFill/>
+          <a:ln w="12700" cap="flat">
+            <a:noFill/>
+            <a:miter lim="400000"/>
+          </a:ln>
+        </p:spPr>
+        <p:style>
+          <a:lnRef idx="0">
+            <a:scrgbClr r="0" g="0" b="0"/>
+          </a:lnRef>
+          <a:fillRef idx="0">
+            <a:scrgbClr r="0" g="0" b="0"/>
+          </a:fillRef>
+          <a:effectRef idx="0">
+            <a:scrgbClr r="0" g="0" b="0"/>
+          </a:effectRef>
+          <a:fontRef idx="none"/>
+        </p:style>
+        <p:txBody>
+          <a:bodyPr rot="0" spcFirstLastPara="1" vertOverflow="overflow" horzOverflow="overflow" vert="horz" wrap="square" lIns="45718" tIns="45718" rIns="45718" bIns="45718" numCol="1" spcCol="38100" rtlCol="0" anchor="t">
+            <a:spAutoFit/>
+          </a:bodyPr>
+          <a:lstStyle/>
+          <a:p>
+            <a:pPr marL="0" marR="0" indent="0" algn="l" defTabSz="914400" rtl="0" fontAlgn="auto" latinLnBrk="1" hangingPunct="0">
+              <a:lnSpc>
+                <a:spcPct val="100000"/>
+              </a:lnSpc>
               <a:spcBef>
                 <a:spcPts val="0"/>
               </a:spcBef>
               <a:spcAft>
-                <a:spcPts val="1200"/>
+                <a:spcPts val="0"/>
               </a:spcAft>
-              <a:buFont typeface="+mj-lt"/>
-              <a:buAutoNum type="arabicPeriod"/>
-            </a:pPr>
-            <a:r>
-              <a:rPr lang="en-US" sz="2800" dirty="0" smtClean="0"/>
-              <a:t>Perturbation of graphs:</a:t>
-            </a:r>
-            <a:endParaRPr lang="en-US" sz="2800" dirty="0" smtClean="0"/>
-          </a:p>
-          <a:p>
-            <a:pPr marL="955040" lvl="1" indent="-514350" algn="l">
-              <a:spcBef>
-                <a:spcPts val="0"/>
-              </a:spcBef>
-              <a:spcAft>
-                <a:spcPts val="1200"/>
-              </a:spcAft>
-              <a:buFont typeface="Arial" charset="0"/>
-              <a:buChar char="•"/>
-            </a:pPr>
-            <a:r>
-              <a:rPr lang="en-US" sz="2400" dirty="0" smtClean="0"/>
-              <a:t>adding / removing nodes / edges</a:t>
-            </a:r>
-            <a:endParaRPr lang="en-US" sz="2400" dirty="0" smtClean="0"/>
-          </a:p>
-          <a:p>
-            <a:pPr marL="955040" lvl="1" indent="-514350" algn="l">
-              <a:spcBef>
-                <a:spcPts val="0"/>
-              </a:spcBef>
-              <a:spcAft>
-                <a:spcPts val="1200"/>
-              </a:spcAft>
-              <a:buFont typeface="Arial" charset="0"/>
-              <a:buChar char="•"/>
-            </a:pPr>
-            <a:r>
-              <a:rPr lang="en-US" sz="2400" dirty="0" smtClean="0"/>
-              <a:t>Perturbing node feature vectors</a:t>
-            </a:r>
-            <a:endParaRPr lang="en-US" sz="2400" dirty="0" smtClean="0"/>
-          </a:p>
-          <a:p>
-            <a:pPr marL="955040" lvl="1" indent="-514350" algn="l">
-              <a:spcBef>
-                <a:spcPts val="0"/>
-              </a:spcBef>
-              <a:spcAft>
-                <a:spcPts val="1200"/>
-              </a:spcAft>
-              <a:buFont typeface="Arial" charset="0"/>
-              <a:buChar char="•"/>
-            </a:pPr>
-            <a:r>
-              <a:rPr lang="en-US" sz="2400" dirty="0" smtClean="0"/>
-              <a:t>Targeting specific graph metrics:</a:t>
-            </a:r>
-            <a:endParaRPr lang="en-US" sz="2400" dirty="0" smtClean="0"/>
-          </a:p>
-          <a:p>
-            <a:pPr marL="1390650" lvl="2" indent="-514350" algn="l">
-              <a:spcBef>
-                <a:spcPts val="0"/>
-              </a:spcBef>
-              <a:spcAft>
-                <a:spcPts val="1200"/>
-              </a:spcAft>
-              <a:buFont typeface="Wingdings" charset="2"/>
-              <a:buChar char="Ø"/>
-            </a:pPr>
-            <a:r>
-              <a:rPr lang="en-US" sz="2400" dirty="0" smtClean="0"/>
-              <a:t>Centralities</a:t>
-            </a:r>
-            <a:endParaRPr lang="en-US" sz="2400" dirty="0" smtClean="0"/>
-          </a:p>
-          <a:p>
-            <a:pPr marL="1390650" lvl="2" indent="-514350" algn="l">
-              <a:spcBef>
-                <a:spcPts val="0"/>
-              </a:spcBef>
-              <a:spcAft>
-                <a:spcPts val="1200"/>
-              </a:spcAft>
-              <a:buFont typeface="Wingdings" charset="2"/>
-              <a:buChar char="Ø"/>
-            </a:pPr>
-            <a:r>
-              <a:rPr lang="en-US" sz="2400" dirty="0" smtClean="0"/>
-              <a:t>Components</a:t>
-            </a:r>
-            <a:endParaRPr lang="en-US" sz="2400" dirty="0" smtClean="0"/>
-          </a:p>
-          <a:p>
-            <a:pPr marL="1390650" lvl="2" indent="-514350" algn="l">
-              <a:spcBef>
-                <a:spcPts val="0"/>
-              </a:spcBef>
-              <a:spcAft>
-                <a:spcPts val="1200"/>
-              </a:spcAft>
-              <a:buFont typeface="Wingdings" charset="2"/>
-              <a:buChar char="Ø"/>
-            </a:pPr>
-            <a:r>
-              <a:rPr lang="en-US" sz="2400" dirty="0" smtClean="0"/>
-              <a:t>Flow properties (throughput …)</a:t>
-            </a:r>
-            <a:endParaRPr lang="en-US" sz="2400" dirty="0"/>
-          </a:p>
-          <a:p>
-            <a:pPr marL="514350" indent="-514350">
-              <a:buFont typeface="+mj-lt"/>
-              <a:buAutoNum type="arabicPeriod"/>
-            </a:pPr>
-            <a:endParaRPr lang="en-US" sz="2800" i="1" dirty="0" smtClean="0"/>
-          </a:p>
-          <a:p>
-            <a:pPr marL="514350" indent="-514350">
-              <a:buFont typeface="+mj-lt"/>
-              <a:buAutoNum type="arabicPeriod"/>
-            </a:pPr>
-            <a:endParaRPr lang="en-US" sz="2800" dirty="0"/>
-          </a:p>
-          <a:p>
-            <a:pPr>
-              <a:buFont typeface="Arial" charset="0"/>
-              <a:buChar char="•"/>
-            </a:pPr>
-            <a:endParaRPr lang="en-US" sz="2800" dirty="0"/>
+              <a:buClrTx/>
+              <a:buSzTx/>
+              <a:buFontTx/>
+              <a:buNone/>
+            </a:pPr>
+            <a:r>
+              <a:rPr lang="en-US" sz="2800" dirty="0">
+                <a:solidFill>
+                  <a:srgbClr val="17375E"/>
+                </a:solidFill>
+                <a:latin typeface="Calibri"/>
+                <a:ea typeface="Calibri"/>
+                <a:cs typeface="Calibri"/>
+                <a:sym typeface="Calibri"/>
+              </a:rPr>
+              <a:t>OK</a:t>
+            </a:r>
+            <a:r>
+              <a:rPr lang="en-US" sz="2800" dirty="0" smtClean="0">
+                <a:solidFill>
+                  <a:srgbClr val="000000"/>
+                </a:solidFill>
+              </a:rPr>
+              <a:t> – </a:t>
+            </a:r>
+            <a:r>
+              <a:rPr lang="en-US" sz="2800" dirty="0">
+                <a:solidFill>
+                  <a:srgbClr val="17375E"/>
+                </a:solidFill>
+                <a:latin typeface="Calibri"/>
+                <a:ea typeface="Calibri"/>
+                <a:cs typeface="Calibri"/>
+              </a:rPr>
+              <a:t>so we have enough data, but how to assign them realistically to our </a:t>
+            </a:r>
+            <a:r>
+              <a:rPr lang="en-US" sz="2800" dirty="0" smtClean="0">
+                <a:solidFill>
+                  <a:srgbClr val="17375E"/>
+                </a:solidFill>
+                <a:latin typeface="Calibri"/>
+                <a:ea typeface="Calibri"/>
+                <a:cs typeface="Calibri"/>
+              </a:rPr>
+              <a:t>users considering the FB graph?</a:t>
+            </a:r>
+            <a:endParaRPr lang="en-US" sz="2800" dirty="0">
+              <a:solidFill>
+                <a:srgbClr val="17375E"/>
+              </a:solidFill>
+              <a:latin typeface="Calibri"/>
+              <a:ea typeface="Calibri"/>
+              <a:cs typeface="Calibri"/>
+            </a:endParaRPr>
           </a:p>
         </p:txBody>
       </p:sp>
     </p:spTree>
+    <p:extLst>
+      <p:ext uri="{BB962C8B-B14F-4D97-AF65-F5344CB8AC3E}">
+        <p14:creationId xmlns:p14="http://schemas.microsoft.com/office/powerpoint/2010/main" val="1268399397"/>
+      </p:ext>
+    </p:extLst>
   </p:cSld>
   <p:clrMapOvr>
     <a:masterClrMapping/>
@@ -2952,6 +3509,672 @@
           <a:chExt cx="0" cy="0"/>
         </a:xfrm>
       </p:grpSpPr>
+      <p:sp>
+        <p:nvSpPr>
+          <p:cNvPr id="3" name="Text Placeholder 2"/>
+          <p:cNvSpPr>
+            <a:spLocks noGrp="1"/>
+          </p:cNvSpPr>
+          <p:nvPr>
+            <p:ph type="body" idx="1"/>
+          </p:nvPr>
+        </p:nvSpPr>
+        <p:spPr>
+          <a:xfrm>
+            <a:off x="306273" y="700143"/>
+            <a:ext cx="8363274" cy="5493623"/>
+          </a:xfrm>
+        </p:spPr>
+        <p:txBody>
+          <a:bodyPr/>
+          <a:lstStyle/>
+          <a:p>
+            <a:pPr>
+              <a:buFont typeface="Arial" panose="020B0604020202020204" pitchFamily="34" charset="0"/>
+              <a:buChar char="•"/>
+            </a:pPr>
+            <a:r>
+              <a:rPr lang="en-US" sz="2800" dirty="0" smtClean="0"/>
+              <a:t>Our anonymized graph might give us different schools (anonymous features) for 2 connected users</a:t>
+            </a:r>
+          </a:p>
+          <a:p>
+            <a:pPr>
+              <a:buFont typeface="Arial" panose="020B0604020202020204" pitchFamily="34" charset="0"/>
+              <a:buChar char="•"/>
+            </a:pPr>
+            <a:endParaRPr lang="en-US" sz="2800" dirty="0"/>
+          </a:p>
+          <a:p>
+            <a:pPr>
+              <a:buFont typeface="Arial" panose="020B0604020202020204" pitchFamily="34" charset="0"/>
+              <a:buChar char="•"/>
+            </a:pPr>
+            <a:r>
+              <a:rPr lang="en-US" sz="2800" dirty="0" smtClean="0"/>
+              <a:t>But which schools should we assign? Random ones?</a:t>
+            </a:r>
+          </a:p>
+          <a:p>
+            <a:pPr lvl="1">
+              <a:buFont typeface="Arial" panose="020B0604020202020204" pitchFamily="34" charset="0"/>
+              <a:buChar char="•"/>
+            </a:pPr>
+            <a:r>
+              <a:rPr lang="en-US" sz="2400" dirty="0" smtClean="0"/>
+              <a:t>Certainly, the likelihood for 2 people to be acquainted is higher if they attend geographically close schools (MIT / Harvard) than far apart (MIT / TU Graz)</a:t>
+            </a:r>
+          </a:p>
+          <a:p>
+            <a:pPr lvl="1">
+              <a:buFont typeface="Arial" panose="020B0604020202020204" pitchFamily="34" charset="0"/>
+              <a:buChar char="•"/>
+            </a:pPr>
+            <a:r>
+              <a:rPr lang="en-US" sz="2400" dirty="0" smtClean="0"/>
+              <a:t>What about qualifications / interests / languages etc.??</a:t>
+            </a:r>
+          </a:p>
+          <a:p>
+            <a:pPr lvl="1">
+              <a:buFont typeface="Arial" panose="020B0604020202020204" pitchFamily="34" charset="0"/>
+              <a:buChar char="•"/>
+            </a:pPr>
+            <a:endParaRPr lang="en-US" sz="2400" dirty="0"/>
+          </a:p>
+          <a:p>
+            <a:pPr>
+              <a:buFont typeface="Arial" panose="020B0604020202020204" pitchFamily="34" charset="0"/>
+              <a:buChar char="•"/>
+            </a:pPr>
+            <a:r>
+              <a:rPr lang="en-US" sz="2800" dirty="0" smtClean="0"/>
+              <a:t>We need to base our data generators on stochastic processes resembling reality =&gt; Probably a significant project in itself !</a:t>
+            </a:r>
+            <a:endParaRPr lang="en-US" sz="2800" dirty="0"/>
+          </a:p>
+        </p:txBody>
+      </p:sp>
+      <p:sp>
+        <p:nvSpPr>
+          <p:cNvPr id="4" name="Title 1"/>
+          <p:cNvSpPr txBox="1"/>
+          <p:nvPr/>
+        </p:nvSpPr>
+        <p:spPr>
+          <a:xfrm>
+            <a:off x="628650" y="-68582"/>
+            <a:ext cx="6106258" cy="584397"/>
+          </a:xfrm>
+          <a:prstGeom prst="rect">
+            <a:avLst/>
+          </a:prstGeom>
+          <a:ln w="12700">
+            <a:miter lim="400000"/>
+          </a:ln>
+        </p:spPr>
+        <p:txBody>
+          <a:bodyPr lIns="45718" tIns="45718" rIns="45718" bIns="45718" anchor="ctr">
+            <a:normAutofit/>
+          </a:bodyPr>
+          <a:lstStyle>
+            <a:lvl1pPr>
+              <a:defRPr sz="3600" b="1">
+                <a:solidFill>
+                  <a:srgbClr val="17375E"/>
+                </a:solidFill>
+                <a:latin typeface="Calibri"/>
+                <a:ea typeface="Calibri"/>
+                <a:cs typeface="Calibri"/>
+                <a:sym typeface="Calibri"/>
+              </a:defRPr>
+            </a:lvl1pPr>
+            <a:lvl2pPr>
+              <a:defRPr sz="2400" b="1">
+                <a:solidFill>
+                  <a:srgbClr val="1F497D"/>
+                </a:solidFill>
+                <a:latin typeface="Calibri"/>
+                <a:ea typeface="Calibri"/>
+                <a:cs typeface="Calibri"/>
+                <a:sym typeface="Calibri"/>
+              </a:defRPr>
+            </a:lvl2pPr>
+            <a:lvl3pPr>
+              <a:defRPr sz="2400" b="1">
+                <a:solidFill>
+                  <a:srgbClr val="1F497D"/>
+                </a:solidFill>
+                <a:latin typeface="Calibri"/>
+                <a:ea typeface="Calibri"/>
+                <a:cs typeface="Calibri"/>
+                <a:sym typeface="Calibri"/>
+              </a:defRPr>
+            </a:lvl3pPr>
+            <a:lvl4pPr>
+              <a:defRPr sz="2400" b="1">
+                <a:solidFill>
+                  <a:srgbClr val="1F497D"/>
+                </a:solidFill>
+                <a:latin typeface="Calibri"/>
+                <a:ea typeface="Calibri"/>
+                <a:cs typeface="Calibri"/>
+                <a:sym typeface="Calibri"/>
+              </a:defRPr>
+            </a:lvl4pPr>
+            <a:lvl5pPr>
+              <a:defRPr sz="2400" b="1">
+                <a:solidFill>
+                  <a:srgbClr val="1F497D"/>
+                </a:solidFill>
+                <a:latin typeface="Calibri"/>
+                <a:ea typeface="Calibri"/>
+                <a:cs typeface="Calibri"/>
+                <a:sym typeface="Calibri"/>
+              </a:defRPr>
+            </a:lvl5pPr>
+            <a:lvl6pPr>
+              <a:defRPr sz="2400" b="1">
+                <a:solidFill>
+                  <a:srgbClr val="1F497D"/>
+                </a:solidFill>
+                <a:latin typeface="Calibri"/>
+                <a:ea typeface="Calibri"/>
+                <a:cs typeface="Calibri"/>
+                <a:sym typeface="Calibri"/>
+              </a:defRPr>
+            </a:lvl6pPr>
+            <a:lvl7pPr>
+              <a:defRPr sz="2400" b="1">
+                <a:solidFill>
+                  <a:srgbClr val="1F497D"/>
+                </a:solidFill>
+                <a:latin typeface="Calibri"/>
+                <a:ea typeface="Calibri"/>
+                <a:cs typeface="Calibri"/>
+                <a:sym typeface="Calibri"/>
+              </a:defRPr>
+            </a:lvl7pPr>
+            <a:lvl8pPr>
+              <a:defRPr sz="2400" b="1">
+                <a:solidFill>
+                  <a:srgbClr val="1F497D"/>
+                </a:solidFill>
+                <a:latin typeface="Calibri"/>
+                <a:ea typeface="Calibri"/>
+                <a:cs typeface="Calibri"/>
+                <a:sym typeface="Calibri"/>
+              </a:defRPr>
+            </a:lvl8pPr>
+            <a:lvl9pPr>
+              <a:defRPr sz="2400" b="1">
+                <a:solidFill>
+                  <a:srgbClr val="1F497D"/>
+                </a:solidFill>
+                <a:latin typeface="Calibri"/>
+                <a:ea typeface="Calibri"/>
+                <a:cs typeface="Calibri"/>
+                <a:sym typeface="Calibri"/>
+              </a:defRPr>
+            </a:lvl9pPr>
+          </a:lstStyle>
+          <a:p>
+            <a:pPr defTabSz="676275">
+              <a:spcBef>
+                <a:spcPts val="0"/>
+              </a:spcBef>
+              <a:spcAft>
+                <a:spcPts val="600"/>
+              </a:spcAft>
+              <a:buClr>
+                <a:srgbClr val="1F497D"/>
+              </a:buClr>
+              <a:defRPr sz="1800">
+                <a:solidFill>
+                  <a:srgbClr val="000000"/>
+                </a:solidFill>
+              </a:defRPr>
+            </a:pPr>
+            <a:r>
+              <a:rPr lang="en-US" sz="2400" dirty="0">
+                <a:solidFill>
+                  <a:schemeClr val="accent1">
+                    <a:lumMod val="50000"/>
+                  </a:schemeClr>
+                </a:solidFill>
+              </a:rPr>
+              <a:t>Modeling a stochastic process</a:t>
+            </a:r>
+          </a:p>
+        </p:txBody>
+      </p:sp>
+    </p:spTree>
+    <p:extLst>
+      <p:ext uri="{BB962C8B-B14F-4D97-AF65-F5344CB8AC3E}">
+        <p14:creationId xmlns:p14="http://schemas.microsoft.com/office/powerpoint/2010/main" val="3161517077"/>
+      </p:ext>
+    </p:extLst>
+  </p:cSld>
+  <p:clrMapOvr>
+    <a:masterClrMapping/>
+  </p:clrMapOvr>
+  <p:transition spd="med"/>
+</p:sld>
+</file>
+
+<file path=ppt/slides/slide13.xml><?xml version="1.0" encoding="utf-8"?>
+<p:sld xmlns:a="http://schemas.openxmlformats.org/drawingml/2006/main" xmlns:r="http://schemas.openxmlformats.org/officeDocument/2006/relationships" xmlns:p="http://schemas.openxmlformats.org/presentationml/2006/main">
+  <p:cSld>
+    <p:spTree>
+      <p:nvGrpSpPr>
+        <p:cNvPr id="1" name=""/>
+        <p:cNvGrpSpPr/>
+        <p:nvPr/>
+      </p:nvGrpSpPr>
+      <p:grpSpPr>
+        <a:xfrm>
+          <a:off x="0" y="0"/>
+          <a:ext cx="0" cy="0"/>
+          <a:chOff x="0" y="0"/>
+          <a:chExt cx="0" cy="0"/>
+        </a:xfrm>
+      </p:grpSpPr>
+      <p:sp>
+        <p:nvSpPr>
+          <p:cNvPr id="4" name="Title 1"/>
+          <p:cNvSpPr txBox="1"/>
+          <p:nvPr/>
+        </p:nvSpPr>
+        <p:spPr>
+          <a:xfrm>
+            <a:off x="628650" y="-68582"/>
+            <a:ext cx="6106258" cy="584397"/>
+          </a:xfrm>
+          <a:prstGeom prst="rect">
+            <a:avLst/>
+          </a:prstGeom>
+          <a:ln w="12700">
+            <a:miter lim="400000"/>
+          </a:ln>
+        </p:spPr>
+        <p:txBody>
+          <a:bodyPr lIns="45718" tIns="45718" rIns="45718" bIns="45718" anchor="ctr">
+            <a:normAutofit/>
+          </a:bodyPr>
+          <a:lstStyle>
+            <a:lvl1pPr>
+              <a:defRPr sz="3600" b="1">
+                <a:solidFill>
+                  <a:srgbClr val="17375E"/>
+                </a:solidFill>
+                <a:latin typeface="Calibri"/>
+                <a:ea typeface="Calibri"/>
+                <a:cs typeface="Calibri"/>
+                <a:sym typeface="Calibri"/>
+              </a:defRPr>
+            </a:lvl1pPr>
+            <a:lvl2pPr>
+              <a:defRPr sz="2400" b="1">
+                <a:solidFill>
+                  <a:srgbClr val="1F497D"/>
+                </a:solidFill>
+                <a:latin typeface="Calibri"/>
+                <a:ea typeface="Calibri"/>
+                <a:cs typeface="Calibri"/>
+                <a:sym typeface="Calibri"/>
+              </a:defRPr>
+            </a:lvl2pPr>
+            <a:lvl3pPr>
+              <a:defRPr sz="2400" b="1">
+                <a:solidFill>
+                  <a:srgbClr val="1F497D"/>
+                </a:solidFill>
+                <a:latin typeface="Calibri"/>
+                <a:ea typeface="Calibri"/>
+                <a:cs typeface="Calibri"/>
+                <a:sym typeface="Calibri"/>
+              </a:defRPr>
+            </a:lvl3pPr>
+            <a:lvl4pPr>
+              <a:defRPr sz="2400" b="1">
+                <a:solidFill>
+                  <a:srgbClr val="1F497D"/>
+                </a:solidFill>
+                <a:latin typeface="Calibri"/>
+                <a:ea typeface="Calibri"/>
+                <a:cs typeface="Calibri"/>
+                <a:sym typeface="Calibri"/>
+              </a:defRPr>
+            </a:lvl4pPr>
+            <a:lvl5pPr>
+              <a:defRPr sz="2400" b="1">
+                <a:solidFill>
+                  <a:srgbClr val="1F497D"/>
+                </a:solidFill>
+                <a:latin typeface="Calibri"/>
+                <a:ea typeface="Calibri"/>
+                <a:cs typeface="Calibri"/>
+                <a:sym typeface="Calibri"/>
+              </a:defRPr>
+            </a:lvl5pPr>
+            <a:lvl6pPr>
+              <a:defRPr sz="2400" b="1">
+                <a:solidFill>
+                  <a:srgbClr val="1F497D"/>
+                </a:solidFill>
+                <a:latin typeface="Calibri"/>
+                <a:ea typeface="Calibri"/>
+                <a:cs typeface="Calibri"/>
+                <a:sym typeface="Calibri"/>
+              </a:defRPr>
+            </a:lvl6pPr>
+            <a:lvl7pPr>
+              <a:defRPr sz="2400" b="1">
+                <a:solidFill>
+                  <a:srgbClr val="1F497D"/>
+                </a:solidFill>
+                <a:latin typeface="Calibri"/>
+                <a:ea typeface="Calibri"/>
+                <a:cs typeface="Calibri"/>
+                <a:sym typeface="Calibri"/>
+              </a:defRPr>
+            </a:lvl7pPr>
+            <a:lvl8pPr>
+              <a:defRPr sz="2400" b="1">
+                <a:solidFill>
+                  <a:srgbClr val="1F497D"/>
+                </a:solidFill>
+                <a:latin typeface="Calibri"/>
+                <a:ea typeface="Calibri"/>
+                <a:cs typeface="Calibri"/>
+                <a:sym typeface="Calibri"/>
+              </a:defRPr>
+            </a:lvl8pPr>
+            <a:lvl9pPr>
+              <a:defRPr sz="2400" b="1">
+                <a:solidFill>
+                  <a:srgbClr val="1F497D"/>
+                </a:solidFill>
+                <a:latin typeface="Calibri"/>
+                <a:ea typeface="Calibri"/>
+                <a:cs typeface="Calibri"/>
+                <a:sym typeface="Calibri"/>
+              </a:defRPr>
+            </a:lvl9pPr>
+          </a:lstStyle>
+          <a:p>
+            <a:r>
+              <a:rPr lang="en-US" sz="2400" dirty="0">
+                <a:solidFill>
+                  <a:schemeClr val="accent1">
+                    <a:lumMod val="50000"/>
+                  </a:schemeClr>
+                </a:solidFill>
+              </a:rPr>
+              <a:t>Future </a:t>
+            </a:r>
+            <a:r>
+              <a:rPr lang="en-US" sz="2400" dirty="0" smtClean="0">
+                <a:solidFill>
+                  <a:schemeClr val="accent1">
+                    <a:lumMod val="50000"/>
+                  </a:schemeClr>
+                </a:solidFill>
+              </a:rPr>
+              <a:t>work</a:t>
+            </a:r>
+            <a:endParaRPr lang="en-US" sz="2400" dirty="0">
+              <a:solidFill>
+                <a:schemeClr val="accent1">
+                  <a:lumMod val="50000"/>
+                </a:schemeClr>
+              </a:solidFill>
+            </a:endParaRPr>
+          </a:p>
+        </p:txBody>
+      </p:sp>
+      <p:sp>
+        <p:nvSpPr>
+          <p:cNvPr id="3" name="Text Placeholder 2"/>
+          <p:cNvSpPr>
+            <a:spLocks noGrp="1"/>
+          </p:cNvSpPr>
+          <p:nvPr>
+            <p:ph type="body" idx="1"/>
+          </p:nvPr>
+        </p:nvSpPr>
+        <p:spPr>
+          <a:xfrm>
+            <a:off x="321276" y="828942"/>
+            <a:ext cx="8468497" cy="5357674"/>
+          </a:xfrm>
+        </p:spPr>
+        <p:txBody>
+          <a:bodyPr/>
+          <a:lstStyle/>
+          <a:p>
+            <a:pPr marL="514350" indent="-514350" algn="l">
+              <a:spcBef>
+                <a:spcPts val="0"/>
+              </a:spcBef>
+              <a:spcAft>
+                <a:spcPts val="1200"/>
+              </a:spcAft>
+              <a:buFont typeface="+mj-lt"/>
+              <a:buAutoNum type="arabicPeriod"/>
+            </a:pPr>
+            <a:r>
+              <a:rPr lang="en-US" sz="2800" dirty="0" smtClean="0"/>
+              <a:t>Scaling of graph algorithm to real-sized DBs?</a:t>
+            </a:r>
+          </a:p>
+          <a:p>
+            <a:pPr marL="514350" indent="-514350" algn="l">
+              <a:spcBef>
+                <a:spcPts val="0"/>
+              </a:spcBef>
+              <a:spcAft>
+                <a:spcPts val="1200"/>
+              </a:spcAft>
+              <a:buFont typeface="+mj-lt"/>
+              <a:buAutoNum type="arabicPeriod"/>
+            </a:pPr>
+            <a:r>
+              <a:rPr lang="en-US" sz="2800" dirty="0" smtClean="0"/>
+              <a:t>Implementation of local sphere idea</a:t>
+            </a:r>
+            <a:r>
+              <a:rPr lang="en-US" sz="2800" dirty="0" smtClean="0"/>
+              <a:t>?</a:t>
+            </a:r>
+          </a:p>
+          <a:p>
+            <a:pPr marL="955040" lvl="1" indent="-514350" algn="l">
+              <a:spcBef>
+                <a:spcPts val="0"/>
+              </a:spcBef>
+              <a:spcAft>
+                <a:spcPts val="1200"/>
+              </a:spcAft>
+              <a:buFont typeface="Arial" panose="020B0604020202020204" pitchFamily="34" charset="0"/>
+              <a:buChar char="•"/>
+            </a:pPr>
+            <a:r>
+              <a:rPr lang="en-US" sz="2400" dirty="0" smtClean="0"/>
+              <a:t>How to connect to a super-graph</a:t>
+            </a:r>
+            <a:endParaRPr lang="en-US" sz="2400" dirty="0" smtClean="0"/>
+          </a:p>
+          <a:p>
+            <a:pPr marL="514350" indent="-514350" algn="l">
+              <a:spcBef>
+                <a:spcPts val="0"/>
+              </a:spcBef>
+              <a:spcAft>
+                <a:spcPts val="1200"/>
+              </a:spcAft>
+              <a:buFont typeface="+mj-lt"/>
+              <a:buAutoNum type="arabicPeriod"/>
+            </a:pPr>
+            <a:r>
+              <a:rPr lang="en-US" sz="2800" dirty="0" smtClean="0"/>
+              <a:t>Perturbation of graphs:</a:t>
+            </a:r>
+          </a:p>
+          <a:p>
+            <a:pPr marL="955040" lvl="1" indent="-514350" algn="l">
+              <a:spcBef>
+                <a:spcPts val="0"/>
+              </a:spcBef>
+              <a:spcAft>
+                <a:spcPts val="1200"/>
+              </a:spcAft>
+              <a:buFont typeface="Arial" charset="0"/>
+              <a:buChar char="•"/>
+            </a:pPr>
+            <a:r>
+              <a:rPr lang="en-US" sz="2400" dirty="0" smtClean="0"/>
+              <a:t>adding / removing nodes / edges</a:t>
+            </a:r>
+          </a:p>
+          <a:p>
+            <a:pPr marL="955040" lvl="1" indent="-514350" algn="l">
+              <a:spcBef>
+                <a:spcPts val="0"/>
+              </a:spcBef>
+              <a:spcAft>
+                <a:spcPts val="1200"/>
+              </a:spcAft>
+              <a:buFont typeface="Arial" charset="0"/>
+              <a:buChar char="•"/>
+            </a:pPr>
+            <a:r>
+              <a:rPr lang="en-US" sz="2400" dirty="0" smtClean="0"/>
+              <a:t>Perturbing node feature vectors</a:t>
+            </a:r>
+          </a:p>
+          <a:p>
+            <a:pPr marL="955040" lvl="1" indent="-514350" algn="l">
+              <a:spcBef>
+                <a:spcPts val="0"/>
+              </a:spcBef>
+              <a:spcAft>
+                <a:spcPts val="1200"/>
+              </a:spcAft>
+              <a:buFont typeface="Arial" charset="0"/>
+              <a:buChar char="•"/>
+            </a:pPr>
+            <a:r>
+              <a:rPr lang="en-US" sz="2400" dirty="0" smtClean="0"/>
+              <a:t>Targeting specific graph metrics:</a:t>
+            </a:r>
+          </a:p>
+          <a:p>
+            <a:pPr marL="1390650" lvl="2" indent="-514350" algn="l">
+              <a:spcBef>
+                <a:spcPts val="0"/>
+              </a:spcBef>
+              <a:spcAft>
+                <a:spcPts val="1200"/>
+              </a:spcAft>
+              <a:buFont typeface="Wingdings" charset="2"/>
+              <a:buChar char="Ø"/>
+            </a:pPr>
+            <a:r>
+              <a:rPr lang="en-US" sz="2400" dirty="0" smtClean="0"/>
+              <a:t>Centralities</a:t>
+            </a:r>
+          </a:p>
+          <a:p>
+            <a:pPr marL="1390650" lvl="2" indent="-514350" algn="l">
+              <a:spcBef>
+                <a:spcPts val="0"/>
+              </a:spcBef>
+              <a:spcAft>
+                <a:spcPts val="1200"/>
+              </a:spcAft>
+              <a:buFont typeface="Wingdings" charset="2"/>
+              <a:buChar char="Ø"/>
+            </a:pPr>
+            <a:r>
+              <a:rPr lang="en-US" sz="2400" dirty="0" smtClean="0"/>
+              <a:t>Components</a:t>
+            </a:r>
+          </a:p>
+          <a:p>
+            <a:pPr marL="1390650" lvl="2" indent="-514350" algn="l">
+              <a:spcBef>
+                <a:spcPts val="0"/>
+              </a:spcBef>
+              <a:spcAft>
+                <a:spcPts val="1200"/>
+              </a:spcAft>
+              <a:buFont typeface="Wingdings" charset="2"/>
+              <a:buChar char="Ø"/>
+            </a:pPr>
+            <a:r>
+              <a:rPr lang="en-US" sz="2400" dirty="0" smtClean="0"/>
+              <a:t>Flow properties (</a:t>
+            </a:r>
+            <a:r>
+              <a:rPr lang="en-US" sz="2400" dirty="0" smtClean="0"/>
+              <a:t>throughput etc. </a:t>
+            </a:r>
+            <a:r>
+              <a:rPr lang="en-US" sz="2400" dirty="0" smtClean="0"/>
+              <a:t>…)</a:t>
+            </a:r>
+            <a:endParaRPr lang="en-US" sz="2400" dirty="0"/>
+          </a:p>
+          <a:p>
+            <a:pPr marL="514350" indent="-514350">
+              <a:buFont typeface="+mj-lt"/>
+              <a:buAutoNum type="arabicPeriod"/>
+            </a:pPr>
+            <a:endParaRPr lang="en-US" sz="2800" i="1" dirty="0" smtClean="0"/>
+          </a:p>
+          <a:p>
+            <a:pPr marL="514350" indent="-514350">
+              <a:buFont typeface="+mj-lt"/>
+              <a:buAutoNum type="arabicPeriod"/>
+            </a:pPr>
+            <a:endParaRPr lang="en-US" sz="2800" dirty="0"/>
+          </a:p>
+          <a:p>
+            <a:pPr>
+              <a:buFont typeface="Arial" charset="0"/>
+              <a:buChar char="•"/>
+            </a:pPr>
+            <a:endParaRPr lang="en-US" sz="2800" dirty="0"/>
+          </a:p>
+        </p:txBody>
+      </p:sp>
+    </p:spTree>
+  </p:cSld>
+  <p:clrMapOvr>
+    <a:masterClrMapping/>
+  </p:clrMapOvr>
+  <p:transition spd="med"/>
+</p:sld>
+</file>
+
+<file path=ppt/slides/slide14.xml><?xml version="1.0" encoding="utf-8"?>
+<p:sld xmlns:a="http://schemas.openxmlformats.org/drawingml/2006/main" xmlns:r="http://schemas.openxmlformats.org/officeDocument/2006/relationships" xmlns:p="http://schemas.openxmlformats.org/presentationml/2006/main">
+  <p:cSld>
+    <p:spTree>
+      <p:nvGrpSpPr>
+        <p:cNvPr id="1" name=""/>
+        <p:cNvGrpSpPr/>
+        <p:nvPr/>
+      </p:nvGrpSpPr>
+      <p:grpSpPr>
+        <a:xfrm>
+          <a:off x="0" y="0"/>
+          <a:ext cx="0" cy="0"/>
+          <a:chOff x="0" y="0"/>
+          <a:chExt cx="0" cy="0"/>
+        </a:xfrm>
+      </p:grpSpPr>
       <p:pic>
         <p:nvPicPr>
           <p:cNvPr id="48" name="image3.png"/>
@@ -2959,7 +4182,7 @@
           <p:nvPr/>
         </p:nvPicPr>
         <p:blipFill>
-          <a:blip r:embed="rId1"/>
+          <a:blip r:embed="rId3"/>
           <a:stretch>
             <a:fillRect/>
           </a:stretch>
@@ -3199,7 +4422,7 @@
         <p:spPr>
           <a:xfrm>
             <a:off x="397851" y="1021492"/>
-            <a:ext cx="8342495" cy="5049794"/>
+            <a:ext cx="8342495" cy="4628810"/>
           </a:xfrm>
           <a:prstGeom prst="rect">
             <a:avLst/>
@@ -3393,13 +4616,6 @@
               </a:rPr>
               <a:t>Main idea for local graph recommenders</a:t>
             </a:r>
-            <a:endParaRPr lang="en-US" sz="2800" dirty="0" smtClean="0">
-              <a:solidFill>
-                <a:schemeClr val="accent1">
-                  <a:lumMod val="50000"/>
-                </a:schemeClr>
-              </a:solidFill>
-            </a:endParaRPr>
           </a:p>
           <a:p>
             <a:pPr marL="457200" indent="-457200" defTabSz="676275">
@@ -3430,13 +4646,6 @@
               </a:rPr>
               <a:t>Desired outcome</a:t>
             </a:r>
-            <a:endParaRPr lang="en-US" sz="2800" dirty="0" smtClean="0">
-              <a:solidFill>
-                <a:schemeClr val="accent1">
-                  <a:lumMod val="50000"/>
-                </a:schemeClr>
-              </a:solidFill>
-            </a:endParaRPr>
           </a:p>
           <a:p>
             <a:pPr marL="457200" indent="-457200" defTabSz="676275">
@@ -3467,13 +4676,6 @@
               </a:rPr>
               <a:t>Experimental Workflow</a:t>
             </a:r>
-            <a:endParaRPr lang="en-US" sz="2800" dirty="0" smtClean="0">
-              <a:solidFill>
-                <a:schemeClr val="accent1">
-                  <a:lumMod val="50000"/>
-                </a:schemeClr>
-              </a:solidFill>
-            </a:endParaRPr>
           </a:p>
           <a:p>
             <a:pPr marL="457200" indent="-457200" defTabSz="676275">
@@ -3504,13 +4706,6 @@
               </a:rPr>
               <a:t>Visualization</a:t>
             </a:r>
-            <a:endParaRPr lang="en-US" sz="2800" dirty="0" smtClean="0">
-              <a:solidFill>
-                <a:schemeClr val="accent1">
-                  <a:lumMod val="50000"/>
-                </a:schemeClr>
-              </a:solidFill>
-            </a:endParaRPr>
           </a:p>
           <a:p>
             <a:pPr marL="457200" indent="-457200" defTabSz="676275">
@@ -3539,9 +4734,29 @@
                   </a:schemeClr>
                 </a:solidFill>
               </a:rPr>
-              <a:t>Datasets (anonymized FB graphs)</a:t>
-            </a:r>
-            <a:endParaRPr lang="en-US" sz="2800" dirty="0" smtClean="0">
+              <a:t>Graph </a:t>
+            </a:r>
+            <a:r>
+              <a:rPr lang="en-US" sz="2800" dirty="0" smtClean="0">
+                <a:solidFill>
+                  <a:schemeClr val="accent1">
+                    <a:lumMod val="50000"/>
+                  </a:schemeClr>
+                </a:solidFill>
+              </a:rPr>
+              <a:t>recommender </a:t>
+            </a:r>
+            <a:r>
+              <a:rPr lang="en-US" sz="2800" dirty="0" smtClean="0">
+                <a:solidFill>
+                  <a:schemeClr val="accent1">
+                    <a:lumMod val="50000"/>
+                  </a:schemeClr>
+                </a:solidFill>
+              </a:rPr>
+              <a:t>algorithm</a:t>
+            </a:r>
+            <a:endParaRPr lang="en-US" sz="2800" dirty="0">
               <a:solidFill>
                 <a:schemeClr val="accent1">
                   <a:lumMod val="50000"/>
@@ -3569,16 +4784,26 @@
               </a:defRPr>
             </a:pPr>
             <a:r>
-              <a:rPr lang="en-US" sz="2800" dirty="0" smtClean="0">
+              <a:rPr lang="en-US" sz="2800" dirty="0">
                 <a:solidFill>
                   <a:schemeClr val="accent1">
                     <a:lumMod val="50000"/>
                   </a:schemeClr>
                 </a:solidFill>
               </a:rPr>
-              <a:t>Enriching anonymized graphs</a:t>
-            </a:r>
-            <a:endParaRPr lang="en-US" sz="2800" dirty="0" smtClean="0">
+              <a:t>Datasets (anonymized FB graphs</a:t>
+            </a:r>
+            <a:r>
+              <a:rPr lang="en-US" sz="2800" dirty="0" smtClean="0">
+                <a:solidFill>
+                  <a:schemeClr val="accent1">
+                    <a:lumMod val="50000"/>
+                  </a:schemeClr>
+                </a:solidFill>
+              </a:rPr>
+              <a:t>)</a:t>
+            </a:r>
+            <a:endParaRPr lang="en-US" sz="2800" dirty="0">
               <a:solidFill>
                 <a:schemeClr val="accent1">
                   <a:lumMod val="50000"/>
@@ -3606,22 +4831,25 @@
               </a:defRPr>
             </a:pPr>
             <a:r>
-              <a:rPr lang="en-US" sz="2800" dirty="0" smtClean="0">
+              <a:rPr lang="en-US" sz="2800" dirty="0">
                 <a:solidFill>
                   <a:schemeClr val="accent1">
                     <a:lumMod val="50000"/>
                   </a:schemeClr>
                 </a:solidFill>
               </a:rPr>
-              <a:t>Graph recommender algorithm</a:t>
-            </a:r>
-            <a:endParaRPr lang="en-US" sz="2800" dirty="0" smtClean="0">
-              <a:solidFill>
-                <a:schemeClr val="accent1">
-                  <a:lumMod val="50000"/>
-                </a:schemeClr>
-              </a:solidFill>
-            </a:endParaRPr>
+              <a:t>Enriching anonymized </a:t>
+            </a:r>
+            <a:r>
+              <a:rPr lang="en-US" sz="2800" dirty="0" smtClean="0">
+                <a:solidFill>
+                  <a:schemeClr val="accent1">
+                    <a:lumMod val="50000"/>
+                  </a:schemeClr>
+                </a:solidFill>
+              </a:rPr>
+              <a:t>graphs</a:t>
+            </a:r>
           </a:p>
           <a:p>
             <a:pPr marL="457200" indent="-457200" defTabSz="676275">
@@ -3650,7 +4878,7 @@
                   </a:schemeClr>
                 </a:solidFill>
               </a:rPr>
-              <a:t>Future work</a:t>
+              <a:t>Modeling a stochastic process</a:t>
             </a:r>
             <a:endParaRPr lang="en-US" sz="2800" dirty="0" smtClean="0">
               <a:solidFill>
@@ -3659,6 +4887,36 @@
                 </a:schemeClr>
               </a:solidFill>
             </a:endParaRPr>
+          </a:p>
+          <a:p>
+            <a:pPr marL="457200" indent="-457200" defTabSz="676275">
+              <a:spcBef>
+                <a:spcPts val="0"/>
+              </a:spcBef>
+              <a:spcAft>
+                <a:spcPts val="600"/>
+              </a:spcAft>
+              <a:buClr>
+                <a:srgbClr val="1F497D"/>
+              </a:buClr>
+              <a:buFont typeface="+mj-lt"/>
+              <a:buAutoNum type="arabicPeriod"/>
+              <a:defRPr sz="1800">
+                <a:solidFill>
+                  <a:srgbClr val="000000"/>
+                </a:solidFill>
+              </a:defRPr>
+            </a:pPr>
+            <a:r>
+              <a:rPr lang="en-US" sz="2800" dirty="0" smtClean="0">
+                <a:solidFill>
+                  <a:schemeClr val="accent1">
+                    <a:lumMod val="50000"/>
+                  </a:schemeClr>
+                </a:solidFill>
+              </a:rPr>
+              <a:t>Future work</a:t>
+            </a:r>
           </a:p>
           <a:p>
             <a:pPr marL="457200" indent="-457200" defTabSz="676275">
@@ -3857,10 +5115,13 @@
               <a:buNone/>
             </a:pPr>
             <a:r>
+              <a:rPr lang="en-US" dirty="0" smtClean="0"/>
+              <a:t>Motivation: The </a:t>
+            </a:r>
+            <a:r>
               <a:rPr lang="en-US" dirty="0"/>
-              <a:t>The local sphere ( idea ) 1/2</a:t>
-            </a:r>
-            <a:endParaRPr lang="en-US" dirty="0"/>
+              <a:t>local sphere ( idea ) 1/2</a:t>
+            </a:r>
           </a:p>
         </p:txBody>
       </p:sp>
@@ -3873,7 +5134,7 @@
           <p:nvPr/>
         </p:nvPicPr>
         <p:blipFill>
-          <a:blip r:embed="rId1">
+          <a:blip r:embed="rId2">
             <a:extLst>
               <a:ext uri="{28A0092B-C50C-407E-A947-70E740481C1C}">
                 <a14:useLocalDpi xmlns:a14="http://schemas.microsoft.com/office/drawing/2010/main" val="0"/>
@@ -3902,7 +5163,7 @@
         </p:nvSpPr>
         <p:spPr>
           <a:xfrm>
-            <a:off x="794951" y="5978778"/>
+            <a:off x="794949" y="5937631"/>
             <a:ext cx="7554097" cy="461665"/>
           </a:xfrm>
           <a:prstGeom prst="rect">
@@ -4081,16 +5342,6 @@
               </a:rPr>
               <a:t>users showed that:</a:t>
             </a:r>
-            <a:endParaRPr lang="en-US" sz="2400" dirty="0" smtClean="0">
-              <a:solidFill>
-                <a:schemeClr val="accent1">
-                  <a:lumMod val="50000"/>
-                </a:schemeClr>
-              </a:solidFill>
-              <a:latin typeface="Calibri"/>
-              <a:ea typeface="Calibri"/>
-              <a:cs typeface="Calibri"/>
-            </a:endParaRPr>
           </a:p>
           <a:p>
             <a:pPr marR="0" algn="l" defTabSz="676275" rtl="0" fontAlgn="auto" latinLnBrk="1" hangingPunct="0">
@@ -4154,16 +5405,6 @@
               </a:rPr>
               <a:t>The average size of cascades was relatively small (maximum ~10 for all but DVDs)</a:t>
             </a:r>
-            <a:endParaRPr lang="en-US" sz="2400" dirty="0" smtClean="0">
-              <a:solidFill>
-                <a:schemeClr val="accent1">
-                  <a:lumMod val="50000"/>
-                </a:schemeClr>
-              </a:solidFill>
-              <a:latin typeface="Calibri"/>
-              <a:ea typeface="Calibri"/>
-              <a:cs typeface="Calibri"/>
-            </a:endParaRPr>
           </a:p>
           <a:p>
             <a:pPr marL="342900" marR="0" indent="-342900" algn="l" defTabSz="676275" rtl="0" fontAlgn="auto" latinLnBrk="1" hangingPunct="0">
@@ -4253,7 +5494,7 @@
         <p:spPr>
           <a:xfrm>
             <a:off x="585216" y="-11495"/>
-            <a:ext cx="3929119" cy="427420"/>
+            <a:ext cx="5487780" cy="427420"/>
           </a:xfrm>
           <a:prstGeom prst="rect">
             <a:avLst/>
@@ -4380,7 +5621,11 @@
             </a:pPr>
             <a:r>
               <a:rPr lang="en-US" dirty="0"/>
-              <a:t>The local sphere ( idea ) </a:t>
+              <a:t>Motivation: The </a:t>
+            </a:r>
+            <a:r>
+              <a:rPr lang="en-US" dirty="0"/>
+              <a:t>local sphere ( idea ) </a:t>
             </a:r>
             <a:r>
               <a:rPr lang="en-US" dirty="0" smtClean="0"/>
@@ -4399,7 +5644,7 @@
           <p:nvPr/>
         </p:nvPicPr>
         <p:blipFill>
-          <a:blip r:embed="rId1">
+          <a:blip r:embed="rId2">
             <a:extLst>
               <a:ext uri="{28A0092B-C50C-407E-A947-70E740481C1C}">
                 <a14:useLocalDpi xmlns:a14="http://schemas.microsoft.com/office/drawing/2010/main" val="0"/>
@@ -4412,7 +5657,7 @@
         </p:blipFill>
         <p:spPr>
           <a:xfrm>
-            <a:off x="222707" y="1400432"/>
+            <a:off x="222707" y="1391886"/>
             <a:ext cx="8618297" cy="5099221"/>
           </a:xfrm>
           <a:prstGeom prst="rect">
@@ -4657,7 +5902,6 @@
               <a:rPr lang="en-US" sz="2800" dirty="0" smtClean="0"/>
               <a:t>Better understanding of the influence factors in graph based recommendations</a:t>
             </a:r>
-            <a:endParaRPr lang="en-US" sz="2800" dirty="0" smtClean="0"/>
           </a:p>
           <a:p>
             <a:pPr>
@@ -4675,7 +5919,6 @@
               <a:rPr lang="en-US" sz="2800" dirty="0" smtClean="0"/>
               <a:t>Better understanding of the complexity / runtime behavior of graph based recommenders</a:t>
             </a:r>
-            <a:endParaRPr lang="en-US" sz="2800" dirty="0" smtClean="0"/>
           </a:p>
           <a:p>
             <a:pPr lvl="1">
@@ -4686,7 +5929,6 @@
               <a:rPr lang="en-US" sz="2400" dirty="0" smtClean="0"/>
               <a:t>Especially useful for larger graphs outside our experimental scope</a:t>
             </a:r>
-            <a:endParaRPr lang="en-US" sz="2400" dirty="0" smtClean="0"/>
           </a:p>
           <a:p>
             <a:pPr marL="514350" indent="-514350">
@@ -4702,7 +5944,11 @@
             </a:pPr>
             <a:r>
               <a:rPr lang="en-US" sz="2800" dirty="0" smtClean="0"/>
-              <a:t>Basis for further experiments in ML on perturbed knowledge bases</a:t>
+              <a:t>Basis for further experiments in ML on perturbed knowledge </a:t>
+            </a:r>
+            <a:r>
+              <a:rPr lang="en-US" sz="2800" dirty="0" smtClean="0"/>
+              <a:t>bases =&gt; “Playground project”</a:t>
             </a:r>
             <a:endParaRPr lang="en-US" sz="2800" dirty="0" smtClean="0"/>
           </a:p>
@@ -4801,8 +6047,8 @@
         </p:nvSpPr>
         <p:spPr>
           <a:xfrm>
-            <a:off x="321276" y="746473"/>
-            <a:ext cx="8468497" cy="5440143"/>
+            <a:off x="329902" y="599827"/>
+            <a:ext cx="8468497" cy="5723338"/>
           </a:xfrm>
         </p:spPr>
         <p:txBody>
@@ -4827,7 +6073,6 @@
               <a:rPr lang="en-US" sz="2800" dirty="0"/>
               <a:t>navigate to the Website</a:t>
             </a:r>
-            <a:endParaRPr lang="en-US" sz="2800" dirty="0"/>
           </a:p>
           <a:p>
             <a:pPr marL="514350" indent="-514350" algn="l">
@@ -4852,7 +6097,6 @@
               <a:rPr lang="en-US" sz="2800" dirty="0" smtClean="0"/>
               <a:t>graphs</a:t>
             </a:r>
-            <a:endParaRPr lang="en-US" sz="2800" dirty="0" smtClean="0"/>
           </a:p>
           <a:p>
             <a:pPr marL="514350" indent="-514350" algn="l">
@@ -4867,9 +6111,29 @@
             </a:pPr>
             <a:r>
               <a:rPr lang="en-US" sz="2800" dirty="0" smtClean="0"/>
-              <a:t>Recommendation mode: single / all users</a:t>
-            </a:r>
-            <a:endParaRPr lang="en-US" sz="2800" dirty="0" smtClean="0"/>
+              <a:t>Recommendation mode: single / all </a:t>
+            </a:r>
+            <a:r>
+              <a:rPr lang="en-US" sz="2800" dirty="0" smtClean="0"/>
+              <a:t>users</a:t>
+            </a:r>
+          </a:p>
+          <a:p>
+            <a:pPr marL="955040" lvl="1" indent="-514350" algn="l">
+              <a:spcBef>
+                <a:spcPts val="0"/>
+              </a:spcBef>
+              <a:spcAft>
+                <a:spcPts val="1200"/>
+              </a:spcAft>
+              <a:buFont typeface="Arial" panose="020B0604020202020204" pitchFamily="34" charset="0"/>
+              <a:buChar char="•"/>
+            </a:pPr>
+            <a:r>
+              <a:rPr lang="en-US" sz="2400" dirty="0" smtClean="0"/>
+              <a:t>We are recommending Udemy courses</a:t>
+            </a:r>
+            <a:endParaRPr lang="en-US" sz="2400" dirty="0" smtClean="0"/>
           </a:p>
           <a:p>
             <a:pPr marL="514350" indent="-514350" algn="l">
@@ -4915,7 +6179,6 @@
               <a:rPr lang="en-US" sz="2800" dirty="0" smtClean="0"/>
               <a:t>The feedback alters the underlying feature vectors</a:t>
             </a:r>
-            <a:endParaRPr lang="en-US" sz="2800" dirty="0" smtClean="0"/>
           </a:p>
           <a:p>
             <a:pPr marL="955040" lvl="1" indent="-514350" algn="l">
@@ -4930,7 +6193,19 @@
             </a:pPr>
             <a:r>
               <a:rPr lang="en-US" sz="2400" dirty="0" smtClean="0"/>
-              <a:t>This can also affect graph structure (through user similarities)</a:t>
+              <a:t>This can also affect graph </a:t>
+            </a:r>
+            <a:r>
+              <a:rPr lang="en-US" sz="2400" dirty="0" smtClean="0"/>
+              <a:t>features / metrics (e.g. edge weights through </a:t>
+            </a:r>
+            <a:r>
+              <a:rPr lang="en-US" sz="2400" dirty="0" smtClean="0"/>
+              <a:t>user </a:t>
+            </a:r>
+            <a:r>
+              <a:rPr lang="en-US" sz="2400" dirty="0" smtClean="0"/>
+              <a:t>similarities)</a:t>
             </a:r>
             <a:endParaRPr lang="en-US" sz="1400" dirty="0" smtClean="0"/>
           </a:p>
@@ -4949,7 +6224,6 @@
               <a:rPr lang="en-US" sz="2800" dirty="0" smtClean="0"/>
               <a:t>Recommendations are re-computed… this cycle continues until researcher has enough data to write a paper about it ;)</a:t>
             </a:r>
-            <a:endParaRPr lang="en-US" sz="2800" dirty="0" smtClean="0"/>
           </a:p>
           <a:p>
             <a:pPr marL="514350" indent="-514350">
@@ -5148,7 +6422,7 @@
           <p:nvPr/>
         </p:nvPicPr>
         <p:blipFill>
-          <a:blip r:embed="rId1">
+          <a:blip r:embed="rId3">
             <a:extLst>
               <a:ext uri="{28A0092B-C50C-407E-A947-70E740481C1C}">
                 <a14:useLocalDpi xmlns:a14="http://schemas.microsoft.com/office/drawing/2010/main" val="0"/>
@@ -5319,6 +6593,22 @@
             </a:lvl9pPr>
           </a:lstStyle>
           <a:p>
+            <a:pPr defTabSz="676275">
+              <a:spcBef>
+                <a:spcPts val="0"/>
+              </a:spcBef>
+              <a:spcAft>
+                <a:spcPts val="600"/>
+              </a:spcAft>
+              <a:buClr>
+                <a:srgbClr val="1F497D"/>
+              </a:buClr>
+              <a:defRPr sz="1800">
+                <a:solidFill>
+                  <a:srgbClr val="000000"/>
+                </a:solidFill>
+              </a:defRPr>
+            </a:pPr>
             <a:r>
               <a:rPr lang="en-US" sz="2400" dirty="0">
                 <a:solidFill>
@@ -5327,61 +6617,14 @@
                   </a:schemeClr>
                 </a:solidFill>
               </a:rPr>
-              <a:t>Datasets (anonymized FB graphs</a:t>
-            </a:r>
-            <a:r>
-              <a:rPr lang="en-US" sz="2400" dirty="0" smtClean="0">
-                <a:solidFill>
-                  <a:schemeClr val="accent1">
-                    <a:lumMod val="50000"/>
-                  </a:schemeClr>
-                </a:solidFill>
-              </a:rPr>
-              <a:t>)</a:t>
-            </a:r>
-            <a:endParaRPr lang="en-US" sz="2400" dirty="0">
-              <a:solidFill>
-                <a:schemeClr val="accent1">
-                  <a:lumMod val="50000"/>
-                </a:schemeClr>
-              </a:solidFill>
-            </a:endParaRPr>
+              <a:t>Graph recommender algorithm</a:t>
+            </a:r>
           </a:p>
         </p:txBody>
       </p:sp>
-      <p:pic>
-        <p:nvPicPr>
-          <p:cNvPr id="2" name="Picture 1"/>
-          <p:cNvPicPr>
-            <a:picLocks noChangeAspect="1"/>
-          </p:cNvPicPr>
-          <p:nvPr/>
-        </p:nvPicPr>
-        <p:blipFill>
-          <a:blip r:embed="rId1">
-            <a:extLst>
-              <a:ext uri="{28A0092B-C50C-407E-A947-70E740481C1C}">
-                <a14:useLocalDpi xmlns:a14="http://schemas.microsoft.com/office/drawing/2010/main" val="0"/>
-              </a:ext>
-            </a:extLst>
-          </a:blip>
-          <a:stretch>
-            <a:fillRect/>
-          </a:stretch>
-        </p:blipFill>
-        <p:spPr>
-          <a:xfrm>
-            <a:off x="3482216" y="2875005"/>
-            <a:ext cx="5422887" cy="3690552"/>
-          </a:xfrm>
-          <a:prstGeom prst="rect">
-            <a:avLst/>
-          </a:prstGeom>
-        </p:spPr>
-      </p:pic>
       <p:sp>
         <p:nvSpPr>
-          <p:cNvPr id="5" name="Text Placeholder 2"/>
+          <p:cNvPr id="3" name="Text Placeholder 2"/>
           <p:cNvSpPr>
             <a:spLocks noGrp="1"/>
           </p:cNvSpPr>
@@ -5391,8 +6634,8 @@
         </p:nvSpPr>
         <p:spPr>
           <a:xfrm>
-            <a:off x="354226" y="815545"/>
-            <a:ext cx="8468497" cy="5090984"/>
+            <a:off x="293841" y="815544"/>
+            <a:ext cx="8468497" cy="5542123"/>
           </a:xfrm>
         </p:spPr>
         <p:txBody>
@@ -5405,42 +6648,103 @@
             </a:pPr>
             <a:r>
               <a:rPr lang="en-US" sz="2800" dirty="0" smtClean="0"/>
-              <a:t>Anonymized FB graphs provided by SNAP (Stanford Network Analysis Project)</a:t>
-            </a:r>
-            <a:endParaRPr lang="en-US" sz="2800" dirty="0" smtClean="0"/>
+              <a:t>Not yet determined, but recommenders can build on several factors:</a:t>
+            </a:r>
           </a:p>
           <a:p>
             <a:pPr>
               <a:buFont typeface="Arial" charset="0"/>
               <a:buChar char="•"/>
             </a:pPr>
-            <a:r>
-              <a:rPr lang="en-US" sz="2800" dirty="0" smtClean="0"/>
-              <a:t>10 FB EGO-graphs: social network from the perspective of one user =&gt; shows only relations among friends</a:t>
-            </a:r>
-            <a:endParaRPr lang="en-US" sz="2800" dirty="0" smtClean="0"/>
-          </a:p>
-          <a:p>
-            <a:pPr>
+            <a:endParaRPr lang="en-US" sz="1200" dirty="0" smtClean="0"/>
+          </a:p>
+          <a:p>
+            <a:pPr lvl="1">
               <a:buFont typeface="Arial" charset="0"/>
               <a:buChar char="•"/>
             </a:pPr>
             <a:r>
-              <a:rPr lang="en-US" sz="2800" dirty="0" smtClean="0"/>
-              <a:t>Just the structure is provided</a:t>
-            </a:r>
-            <a:endParaRPr lang="en-US" sz="2800" dirty="0" smtClean="0"/>
-          </a:p>
-          <a:p>
-            <a:pPr>
+              <a:rPr lang="en-US" sz="2400" dirty="0" smtClean="0"/>
+              <a:t>Collaborative filtering – recommend what others have done / chosen (the typical amazon recommender)</a:t>
+            </a:r>
+          </a:p>
+          <a:p>
+            <a:pPr lvl="1">
               <a:buFont typeface="Arial" charset="0"/>
               <a:buChar char="•"/>
             </a:pPr>
-            <a:r>
-              <a:rPr lang="en-US" sz="2800" dirty="0" smtClean="0"/>
-              <a:t>Content has to be re-generated</a:t>
-            </a:r>
-            <a:endParaRPr lang="en-US" sz="2800" dirty="0" smtClean="0"/>
+            <a:endParaRPr lang="en-US" sz="1200" dirty="0" smtClean="0"/>
+          </a:p>
+          <a:p>
+            <a:pPr lvl="1">
+              <a:buFont typeface="Arial" charset="0"/>
+              <a:buChar char="•"/>
+            </a:pPr>
+            <a:r>
+              <a:rPr lang="en-US" sz="2400" dirty="0" smtClean="0"/>
+              <a:t>Content based filtering (b</a:t>
+            </a:r>
+            <a:r>
+              <a:rPr lang="en-US" sz="2400" dirty="0" smtClean="0"/>
+              <a:t>uilding a user profile)</a:t>
+            </a:r>
+          </a:p>
+          <a:p>
+            <a:pPr lvl="2">
+              <a:buFont typeface="Arial" panose="020B0604020202020204" pitchFamily="34" charset="0"/>
+              <a:buChar char="•"/>
+            </a:pPr>
+            <a:r>
+              <a:rPr lang="en-US" sz="2400" dirty="0"/>
+              <a:t>A model of the user's </a:t>
+            </a:r>
+            <a:r>
+              <a:rPr lang="en-US" sz="2400" dirty="0" smtClean="0"/>
+              <a:t>preference</a:t>
+            </a:r>
+          </a:p>
+          <a:p>
+            <a:pPr lvl="2">
+              <a:buFont typeface="Arial" panose="020B0604020202020204" pitchFamily="34" charset="0"/>
+              <a:buChar char="•"/>
+            </a:pPr>
+            <a:r>
+              <a:rPr lang="en-US" sz="2400" dirty="0" smtClean="0"/>
+              <a:t>A </a:t>
+            </a:r>
+            <a:r>
+              <a:rPr lang="en-US" sz="2400" dirty="0"/>
+              <a:t>history of the user's interaction with the </a:t>
+            </a:r>
+            <a:r>
+              <a:rPr lang="en-US" sz="2400" dirty="0" smtClean="0"/>
+              <a:t>recommender</a:t>
+            </a:r>
+          </a:p>
+          <a:p>
+            <a:pPr lvl="2">
+              <a:buFont typeface="Arial" charset="0"/>
+              <a:buChar char="•"/>
+            </a:pPr>
+            <a:endParaRPr lang="en-US" sz="1200" dirty="0" smtClean="0"/>
+          </a:p>
+          <a:p>
+            <a:pPr lvl="1">
+              <a:buFont typeface="Arial" charset="0"/>
+              <a:buChar char="•"/>
+            </a:pPr>
+            <a:r>
+              <a:rPr lang="en-US" sz="2400" dirty="0" smtClean="0"/>
+              <a:t>Network structure</a:t>
+            </a:r>
+            <a:endParaRPr lang="en-US" sz="2400" dirty="0" smtClean="0"/>
+          </a:p>
+          <a:p>
+            <a:pPr lvl="1">
+              <a:buFont typeface="Arial" charset="0"/>
+              <a:buChar char="•"/>
+            </a:pPr>
+            <a:endParaRPr lang="en-US" sz="2400" dirty="0" smtClean="0"/>
           </a:p>
           <a:p>
             <a:pPr marL="0" indent="0">
@@ -5448,130 +6752,12 @@
             </a:pPr>
             <a:r>
               <a:rPr lang="en-US" sz="2800" dirty="0" smtClean="0"/>
-              <a:t>	(if necessary)</a:t>
-            </a:r>
+              <a:t>So which dataset is accessible to us ?</a:t>
+            </a:r>
+            <a:endParaRPr lang="en-US" sz="2800" dirty="0" smtClean="0"/>
           </a:p>
         </p:txBody>
       </p:sp>
-      <p:pic>
-        <p:nvPicPr>
-          <p:cNvPr id="3" name="Picture 2"/>
-          <p:cNvPicPr>
-            <a:picLocks noChangeAspect="1"/>
-          </p:cNvPicPr>
-          <p:nvPr/>
-        </p:nvPicPr>
-        <p:blipFill>
-          <a:blip r:embed="rId2" cstate="print">
-            <a:extLst>
-              <a:ext uri="{28A0092B-C50C-407E-A947-70E740481C1C}">
-                <a14:useLocalDpi xmlns:a14="http://schemas.microsoft.com/office/drawing/2010/main" val="0"/>
-              </a:ext>
-            </a:extLst>
-          </a:blip>
-          <a:stretch>
-            <a:fillRect/>
-          </a:stretch>
-        </p:blipFill>
-        <p:spPr>
-          <a:xfrm>
-            <a:off x="743982" y="4521544"/>
-            <a:ext cx="1406698" cy="1747451"/>
-          </a:xfrm>
-          <a:prstGeom prst="rect">
-            <a:avLst/>
-          </a:prstGeom>
-        </p:spPr>
-      </p:pic>
-      <p:sp>
-        <p:nvSpPr>
-          <p:cNvPr id="6" name="Rectangle 5"/>
-          <p:cNvSpPr/>
-          <p:nvPr/>
-        </p:nvSpPr>
-        <p:spPr>
-          <a:xfrm>
-            <a:off x="2035348" y="4315876"/>
-            <a:ext cx="938267" cy="2092881"/>
-          </a:xfrm>
-          <a:prstGeom prst="rect">
-            <a:avLst/>
-          </a:prstGeom>
-          <a:noFill/>
-        </p:spPr>
-        <p:txBody>
-          <a:bodyPr wrap="square" lIns="91440" tIns="45720" rIns="91440" bIns="45720">
-            <a:spAutoFit/>
-          </a:bodyPr>
-          <a:lstStyle/>
-          <a:p>
-            <a:pPr algn="ctr"/>
-            <a:r>
-              <a:rPr lang="en-US" sz="13000" b="1" cap="none" spc="0" dirty="0" smtClean="0">
-                <a:ln w="22225">
-                  <a:solidFill>
-                    <a:schemeClr val="accent2"/>
-                  </a:solidFill>
-                  <a:prstDash val="solid"/>
-                </a:ln>
-                <a:solidFill>
-                  <a:schemeClr val="accent2">
-                    <a:lumMod val="40000"/>
-                    <a:lumOff val="60000"/>
-                  </a:schemeClr>
-                </a:solidFill>
-                <a:effectLst/>
-              </a:rPr>
-              <a:t>?</a:t>
-            </a:r>
-            <a:endParaRPr lang="en-US" sz="13000" b="1" cap="none" spc="0" dirty="0">
-              <a:ln w="22225">
-                <a:solidFill>
-                  <a:schemeClr val="accent2"/>
-                </a:solidFill>
-                <a:prstDash val="solid"/>
-              </a:ln>
-              <a:solidFill>
-                <a:schemeClr val="accent2">
-                  <a:lumMod val="40000"/>
-                  <a:lumOff val="60000"/>
-                </a:schemeClr>
-              </a:solidFill>
-              <a:effectLst/>
-            </a:endParaRPr>
-          </a:p>
-        </p:txBody>
-      </p:sp>
-      <p:pic>
-        <p:nvPicPr>
-          <p:cNvPr id="7" name="Picture 6"/>
-          <p:cNvPicPr>
-            <a:picLocks noChangeAspect="1"/>
-          </p:cNvPicPr>
-          <p:nvPr/>
-        </p:nvPicPr>
-        <p:blipFill>
-          <a:blip r:embed="rId3" cstate="print">
-            <a:extLst>
-              <a:ext uri="{28A0092B-C50C-407E-A947-70E740481C1C}">
-                <a14:useLocalDpi xmlns:a14="http://schemas.microsoft.com/office/drawing/2010/main" val="0"/>
-              </a:ext>
-            </a:extLst>
-          </a:blip>
-          <a:stretch>
-            <a:fillRect/>
-          </a:stretch>
-        </p:blipFill>
-        <p:spPr>
-          <a:xfrm>
-            <a:off x="6510667" y="4868421"/>
-            <a:ext cx="1485627" cy="1289222"/>
-          </a:xfrm>
-          <a:prstGeom prst="rect">
-            <a:avLst/>
-          </a:prstGeom>
-        </p:spPr>
-      </p:pic>
     </p:spTree>
   </p:cSld>
   <p:clrMapOvr>
@@ -5730,7 +6916,7 @@
                   </a:schemeClr>
                 </a:solidFill>
               </a:rPr>
-              <a:t>Enriching anonymized </a:t>
+              <a:t>Datasets (anonymized FB graphs</a:t>
             </a:r>
             <a:r>
               <a:rPr lang="en-US" sz="2400" dirty="0" smtClean="0">
@@ -5740,7 +6926,7 @@
                   </a:schemeClr>
                 </a:solidFill>
               </a:rPr>
-              <a:t>graphs</a:t>
+              <a:t>)</a:t>
             </a:r>
             <a:endParaRPr lang="en-US" sz="2400" dirty="0">
               <a:solidFill>
@@ -5752,6 +6938,225 @@
           </a:p>
         </p:txBody>
       </p:sp>
+      <p:pic>
+        <p:nvPicPr>
+          <p:cNvPr id="2" name="Picture 1"/>
+          <p:cNvPicPr>
+            <a:picLocks noChangeAspect="1"/>
+          </p:cNvPicPr>
+          <p:nvPr/>
+        </p:nvPicPr>
+        <p:blipFill>
+          <a:blip r:embed="rId2">
+            <a:extLst>
+              <a:ext uri="{28A0092B-C50C-407E-A947-70E740481C1C}">
+                <a14:useLocalDpi xmlns:a14="http://schemas.microsoft.com/office/drawing/2010/main" val="0"/>
+              </a:ext>
+            </a:extLst>
+          </a:blip>
+          <a:stretch>
+            <a:fillRect/>
+          </a:stretch>
+        </p:blipFill>
+        <p:spPr>
+          <a:xfrm>
+            <a:off x="3482216" y="2875005"/>
+            <a:ext cx="5422887" cy="3690552"/>
+          </a:xfrm>
+          <a:prstGeom prst="rect">
+            <a:avLst/>
+          </a:prstGeom>
+        </p:spPr>
+      </p:pic>
+      <p:sp>
+        <p:nvSpPr>
+          <p:cNvPr id="5" name="Text Placeholder 2"/>
+          <p:cNvSpPr>
+            <a:spLocks noGrp="1"/>
+          </p:cNvSpPr>
+          <p:nvPr>
+            <p:ph type="body" idx="1"/>
+          </p:nvPr>
+        </p:nvSpPr>
+        <p:spPr>
+          <a:xfrm>
+            <a:off x="354226" y="815545"/>
+            <a:ext cx="8468497" cy="5090984"/>
+          </a:xfrm>
+        </p:spPr>
+        <p:txBody>
+          <a:bodyPr/>
+          <a:lstStyle/>
+          <a:p>
+            <a:pPr>
+              <a:buFont typeface="Arial" charset="0"/>
+              <a:buChar char="•"/>
+            </a:pPr>
+            <a:r>
+              <a:rPr lang="en-US" sz="2800" dirty="0" smtClean="0"/>
+              <a:t>Anonymized FB graphs provided by SNAP (Stanford Network Analysis Project)</a:t>
+            </a:r>
+          </a:p>
+          <a:p>
+            <a:pPr>
+              <a:buFont typeface="Arial" charset="0"/>
+              <a:buChar char="•"/>
+            </a:pPr>
+            <a:r>
+              <a:rPr lang="en-US" sz="2800" dirty="0" smtClean="0"/>
+              <a:t>10 FB EGO-graphs: social network from the perspective of one user =&gt; shows only relations among friends</a:t>
+            </a:r>
+          </a:p>
+          <a:p>
+            <a:pPr>
+              <a:buFont typeface="Arial" charset="0"/>
+              <a:buChar char="•"/>
+            </a:pPr>
+            <a:r>
+              <a:rPr lang="en-US" sz="2800" dirty="0" smtClean="0"/>
+              <a:t>Just the structure is provided</a:t>
+            </a:r>
+          </a:p>
+          <a:p>
+            <a:pPr>
+              <a:buFont typeface="Arial" charset="0"/>
+              <a:buChar char="•"/>
+            </a:pPr>
+            <a:r>
+              <a:rPr lang="en-US" sz="2800" dirty="0" smtClean="0"/>
+              <a:t>Content has to be re-generated</a:t>
+            </a:r>
+          </a:p>
+          <a:p>
+            <a:pPr marL="0" indent="0">
+              <a:buNone/>
+            </a:pPr>
+            <a:r>
+              <a:rPr lang="en-US" sz="2800" dirty="0" smtClean="0"/>
+              <a:t>	(if necessary)</a:t>
+            </a:r>
+          </a:p>
+        </p:txBody>
+      </p:sp>
+      <p:pic>
+        <p:nvPicPr>
+          <p:cNvPr id="3" name="Picture 2"/>
+          <p:cNvPicPr>
+            <a:picLocks noChangeAspect="1"/>
+          </p:cNvPicPr>
+          <p:nvPr/>
+        </p:nvPicPr>
+        <p:blipFill>
+          <a:blip r:embed="rId3" cstate="print">
+            <a:extLst>
+              <a:ext uri="{28A0092B-C50C-407E-A947-70E740481C1C}">
+                <a14:useLocalDpi xmlns:a14="http://schemas.microsoft.com/office/drawing/2010/main" val="0"/>
+              </a:ext>
+            </a:extLst>
+          </a:blip>
+          <a:stretch>
+            <a:fillRect/>
+          </a:stretch>
+        </p:blipFill>
+        <p:spPr>
+          <a:xfrm>
+            <a:off x="743982" y="4521544"/>
+            <a:ext cx="1406698" cy="1747451"/>
+          </a:xfrm>
+          <a:prstGeom prst="rect">
+            <a:avLst/>
+          </a:prstGeom>
+        </p:spPr>
+      </p:pic>
+      <p:sp>
+        <p:nvSpPr>
+          <p:cNvPr id="6" name="Rectangle 5"/>
+          <p:cNvSpPr/>
+          <p:nvPr/>
+        </p:nvSpPr>
+        <p:spPr>
+          <a:xfrm>
+            <a:off x="2035348" y="4315876"/>
+            <a:ext cx="938267" cy="2092881"/>
+          </a:xfrm>
+          <a:prstGeom prst="rect">
+            <a:avLst/>
+          </a:prstGeom>
+          <a:noFill/>
+        </p:spPr>
+        <p:txBody>
+          <a:bodyPr wrap="square" lIns="91440" tIns="45720" rIns="91440" bIns="45720">
+            <a:spAutoFit/>
+          </a:bodyPr>
+          <a:lstStyle/>
+          <a:p>
+            <a:pPr algn="ctr"/>
+            <a:r>
+              <a:rPr lang="en-US" sz="13000" b="1" cap="none" spc="0" dirty="0" smtClean="0">
+                <a:ln w="22225">
+                  <a:solidFill>
+                    <a:schemeClr val="accent2"/>
+                  </a:solidFill>
+                  <a:prstDash val="solid"/>
+                </a:ln>
+                <a:solidFill>
+                  <a:schemeClr val="accent2">
+                    <a:lumMod val="40000"/>
+                    <a:lumOff val="60000"/>
+                  </a:schemeClr>
+                </a:solidFill>
+                <a:effectLst/>
+              </a:rPr>
+              <a:t>?</a:t>
+            </a:r>
+            <a:endParaRPr lang="en-US" sz="13000" b="1" cap="none" spc="0" dirty="0">
+              <a:ln w="22225">
+                <a:solidFill>
+                  <a:schemeClr val="accent2"/>
+                </a:solidFill>
+                <a:prstDash val="solid"/>
+              </a:ln>
+              <a:solidFill>
+                <a:schemeClr val="accent2">
+                  <a:lumMod val="40000"/>
+                  <a:lumOff val="60000"/>
+                </a:schemeClr>
+              </a:solidFill>
+              <a:effectLst/>
+            </a:endParaRPr>
+          </a:p>
+        </p:txBody>
+      </p:sp>
+      <p:pic>
+        <p:nvPicPr>
+          <p:cNvPr id="7" name="Picture 6"/>
+          <p:cNvPicPr>
+            <a:picLocks noChangeAspect="1"/>
+          </p:cNvPicPr>
+          <p:nvPr/>
+        </p:nvPicPr>
+        <p:blipFill>
+          <a:blip r:embed="rId4" cstate="print">
+            <a:extLst>
+              <a:ext uri="{28A0092B-C50C-407E-A947-70E740481C1C}">
+                <a14:useLocalDpi xmlns:a14="http://schemas.microsoft.com/office/drawing/2010/main" val="0"/>
+              </a:ext>
+            </a:extLst>
+          </a:blip>
+          <a:stretch>
+            <a:fillRect/>
+          </a:stretch>
+        </p:blipFill>
+        <p:spPr>
+          <a:xfrm>
+            <a:off x="6510667" y="4868421"/>
+            <a:ext cx="1485627" cy="1289222"/>
+          </a:xfrm>
+          <a:prstGeom prst="rect">
+            <a:avLst/>
+          </a:prstGeom>
+        </p:spPr>
+      </p:pic>
     </p:spTree>
   </p:cSld>
   <p:clrMapOvr>

</xml_diff>